<commit_message>
update the ppt and uml
Signed-off-by: zhangzhenan <zhangzhenan@vivo.com.cn>
</commit_message>
<xml_diff>
--- a/11月25号答辩准备.pptx
+++ b/11月25号答辩准备.pptx
@@ -2,10 +2,10 @@
 <file path=ppt/presentation.xml><?xml version="1.0" encoding="utf-8"?>
 <p:presentation xmlns:a="http://schemas.openxmlformats.org/drawingml/2006/main" xmlns:r="http://schemas.openxmlformats.org/officeDocument/2006/relationships" xmlns:p="http://schemas.openxmlformats.org/presentationml/2006/main" saveSubsetFonts="1">
   <p:sldMasterIdLst>
-    <p:sldMasterId id="2147483648" r:id="rId1"/>
+    <p:sldMasterId id="2147483696" r:id="rId1"/>
   </p:sldMasterIdLst>
   <p:notesMasterIdLst>
-    <p:notesMasterId r:id="rId13"/>
+    <p:notesMasterId r:id="rId17"/>
   </p:notesMasterIdLst>
   <p:sldIdLst>
     <p:sldId id="257" r:id="rId2"/>
@@ -14,11 +14,15 @@
     <p:sldId id="261" r:id="rId5"/>
     <p:sldId id="263" r:id="rId6"/>
     <p:sldId id="264" r:id="rId7"/>
-    <p:sldId id="262" r:id="rId8"/>
-    <p:sldId id="265" r:id="rId9"/>
+    <p:sldId id="270" r:id="rId8"/>
+    <p:sldId id="262" r:id="rId9"/>
     <p:sldId id="266" r:id="rId10"/>
-    <p:sldId id="267" r:id="rId11"/>
-    <p:sldId id="259" r:id="rId12"/>
+    <p:sldId id="265" r:id="rId11"/>
+    <p:sldId id="267" r:id="rId12"/>
+    <p:sldId id="268" r:id="rId13"/>
+    <p:sldId id="269" r:id="rId14"/>
+    <p:sldId id="271" r:id="rId15"/>
+    <p:sldId id="259" r:id="rId16"/>
   </p:sldIdLst>
   <p:sldSz cx="9144000" cy="6858000" type="screen4x3"/>
   <p:notesSz cx="6858000" cy="9144000"/>
@@ -202,7 +206,8 @@
           <a:p>
             <a:fld id="{73AFBD9E-6B2F-4020-8679-B62729E68172}" type="datetimeFigureOut">
               <a:rPr lang="zh-CN" altLang="en-US" smtClean="0"/>
-              <a:t>2014/11/23</a:t>
+              <a:pPr/>
+              <a:t>2014/11/24</a:t>
             </a:fld>
             <a:endParaRPr lang="zh-CN" altLang="en-US"/>
           </a:p>
@@ -363,6 +368,7 @@
           <a:p>
             <a:fld id="{D350629B-5C7B-404E-93AF-6E6AD907B67B}" type="slidenum">
               <a:rPr lang="zh-CN" altLang="en-US" smtClean="0"/>
+              <a:pPr/>
               <a:t>‹#›</a:t>
             </a:fld>
             <a:endParaRPr lang="zh-CN" altLang="en-US"/>
@@ -494,7 +500,12 @@
             <p:ph type="sldImg"/>
           </p:nvPr>
         </p:nvSpPr>
-        <p:spPr/>
+        <p:spPr>
+          <a:xfrm>
+            <a:off x="1143000" y="685800"/>
+            <a:ext cx="4572000" cy="3429000"/>
+          </a:xfrm>
+        </p:spPr>
       </p:sp>
       <p:sp>
         <p:nvSpPr>
@@ -514,7 +525,7 @@
           <a:lstStyle/>
           <a:p>
             <a:r>
-              <a:rPr lang="en-US" altLang="zh-CN" dirty="0" smtClean="0"/>
+              <a:rPr lang="en-US" altLang="zh-CN" dirty="0" err="1" smtClean="0"/>
               <a:t>AbstractGalleryActvity</a:t>
             </a:r>
             <a:r>
@@ -676,6 +687,7 @@
           <a:p>
             <a:fld id="{D350629B-5C7B-404E-93AF-6E6AD907B67B}" type="slidenum">
               <a:rPr lang="zh-CN" altLang="en-US" smtClean="0"/>
+              <a:pPr/>
               <a:t>4</a:t>
             </a:fld>
             <a:endParaRPr lang="zh-CN" altLang="en-US"/>
@@ -717,7 +729,12 @@
             <p:ph type="sldImg"/>
           </p:nvPr>
         </p:nvSpPr>
-        <p:spPr/>
+        <p:spPr>
+          <a:xfrm>
+            <a:off x="1143000" y="685800"/>
+            <a:ext cx="4572000" cy="3429000"/>
+          </a:xfrm>
+        </p:spPr>
       </p:sp>
       <p:sp>
         <p:nvSpPr>
@@ -757,6 +774,7 @@
           <a:p>
             <a:fld id="{D350629B-5C7B-404E-93AF-6E6AD907B67B}" type="slidenum">
               <a:rPr lang="zh-CN" altLang="en-US" smtClean="0"/>
+              <a:pPr/>
               <a:t>5</a:t>
             </a:fld>
             <a:endParaRPr lang="zh-CN" altLang="en-US"/>
@@ -798,7 +816,12 @@
             <p:ph type="sldImg"/>
           </p:nvPr>
         </p:nvSpPr>
-        <p:spPr/>
+        <p:spPr>
+          <a:xfrm>
+            <a:off x="1143000" y="685800"/>
+            <a:ext cx="4572000" cy="3429000"/>
+          </a:xfrm>
+        </p:spPr>
       </p:sp>
       <p:sp>
         <p:nvSpPr>
@@ -858,6 +881,7 @@
           <a:p>
             <a:fld id="{D350629B-5C7B-404E-93AF-6E6AD907B67B}" type="slidenum">
               <a:rPr lang="zh-CN" altLang="en-US" smtClean="0"/>
+              <a:pPr/>
               <a:t>6</a:t>
             </a:fld>
             <a:endParaRPr lang="zh-CN" altLang="en-US"/>
@@ -899,7 +923,12 @@
             <p:ph type="sldImg"/>
           </p:nvPr>
         </p:nvSpPr>
-        <p:spPr/>
+        <p:spPr>
+          <a:xfrm>
+            <a:off x="1143000" y="685800"/>
+            <a:ext cx="4572000" cy="3429000"/>
+          </a:xfrm>
+        </p:spPr>
       </p:sp>
       <p:sp>
         <p:nvSpPr>
@@ -920,6 +949,113 @@
           <a:p>
             <a:r>
               <a:rPr lang="zh-CN" altLang="en-US" dirty="0" smtClean="0"/>
+              <a:t>打开电子表格 </a:t>
+            </a:r>
+            <a:r>
+              <a:rPr lang="en-US" altLang="zh-CN" dirty="0" smtClean="0"/>
+              <a:t>DataManager</a:t>
+            </a:r>
+            <a:r>
+              <a:rPr lang="zh-CN" altLang="en-US" dirty="0" smtClean="0"/>
+              <a:t>获取对应的</a:t>
+            </a:r>
+            <a:r>
+              <a:rPr lang="en-US" altLang="zh-CN" dirty="0" smtClean="0"/>
+              <a:t>MediaObject</a:t>
+            </a:r>
+            <a:r>
+              <a:rPr lang="zh-CN" altLang="en-US" dirty="0" smtClean="0"/>
+              <a:t>子类过程</a:t>
+            </a:r>
+            <a:endParaRPr lang="zh-CN" altLang="en-US" dirty="0"/>
+          </a:p>
+        </p:txBody>
+      </p:sp>
+      <p:sp>
+        <p:nvSpPr>
+          <p:cNvPr id="4" name="灯片编号占位符 3"/>
+          <p:cNvSpPr>
+            <a:spLocks noGrp="1"/>
+          </p:cNvSpPr>
+          <p:nvPr>
+            <p:ph type="sldNum" sz="quarter" idx="10"/>
+          </p:nvPr>
+        </p:nvSpPr>
+        <p:spPr/>
+        <p:txBody>
+          <a:bodyPr/>
+          <a:lstStyle/>
+          <a:p>
+            <a:fld id="{D350629B-5C7B-404E-93AF-6E6AD907B67B}" type="slidenum">
+              <a:rPr lang="zh-CN" altLang="en-US" smtClean="0"/>
+              <a:pPr/>
+              <a:t>7</a:t>
+            </a:fld>
+            <a:endParaRPr lang="zh-CN" altLang="en-US"/>
+          </a:p>
+        </p:txBody>
+      </p:sp>
+    </p:spTree>
+  </p:cSld>
+  <p:clrMapOvr>
+    <a:masterClrMapping/>
+  </p:clrMapOvr>
+</p:notes>
+</file>
+
+<file path=ppt/notesSlides/notesSlide5.xml><?xml version="1.0" encoding="utf-8"?>
+<p:notes xmlns:a="http://schemas.openxmlformats.org/drawingml/2006/main" xmlns:r="http://schemas.openxmlformats.org/officeDocument/2006/relationships" xmlns:p="http://schemas.openxmlformats.org/presentationml/2006/main">
+  <p:cSld>
+    <p:spTree>
+      <p:nvGrpSpPr>
+        <p:cNvPr id="1" name=""/>
+        <p:cNvGrpSpPr/>
+        <p:nvPr/>
+      </p:nvGrpSpPr>
+      <p:grpSpPr>
+        <a:xfrm>
+          <a:off x="0" y="0"/>
+          <a:ext cx="0" cy="0"/>
+          <a:chOff x="0" y="0"/>
+          <a:chExt cx="0" cy="0"/>
+        </a:xfrm>
+      </p:grpSpPr>
+      <p:sp>
+        <p:nvSpPr>
+          <p:cNvPr id="2" name="幻灯片图像占位符 1"/>
+          <p:cNvSpPr>
+            <a:spLocks noGrp="1" noRot="1" noChangeAspect="1"/>
+          </p:cNvSpPr>
+          <p:nvPr>
+            <p:ph type="sldImg"/>
+          </p:nvPr>
+        </p:nvSpPr>
+        <p:spPr>
+          <a:xfrm>
+            <a:off x="1143000" y="685800"/>
+            <a:ext cx="4572000" cy="3429000"/>
+          </a:xfrm>
+        </p:spPr>
+      </p:sp>
+      <p:sp>
+        <p:nvSpPr>
+          <p:cNvPr id="3" name="备注占位符 2"/>
+          <p:cNvSpPr>
+            <a:spLocks noGrp="1"/>
+          </p:cNvSpPr>
+          <p:nvPr>
+            <p:ph type="body" idx="1"/>
+          </p:nvPr>
+        </p:nvSpPr>
+        <p:spPr/>
+        <p:txBody>
+          <a:bodyPr>
+            <a:normAutofit/>
+          </a:bodyPr>
+          <a:lstStyle/>
+          <a:p>
+            <a:r>
+              <a:rPr lang="zh-CN" altLang="en-US" dirty="0" smtClean="0"/>
               <a:t>数据更新：</a:t>
             </a:r>
             <a:r>
@@ -947,7 +1083,90 @@
           <a:p>
             <a:fld id="{D350629B-5C7B-404E-93AF-6E6AD907B67B}" type="slidenum">
               <a:rPr lang="zh-CN" altLang="en-US" smtClean="0"/>
-              <a:t>7</a:t>
+              <a:pPr/>
+              <a:t>8</a:t>
+            </a:fld>
+            <a:endParaRPr lang="zh-CN" altLang="en-US"/>
+          </a:p>
+        </p:txBody>
+      </p:sp>
+    </p:spTree>
+  </p:cSld>
+  <p:clrMapOvr>
+    <a:masterClrMapping/>
+  </p:clrMapOvr>
+</p:notes>
+</file>
+
+<file path=ppt/notesSlides/notesSlide6.xml><?xml version="1.0" encoding="utf-8"?>
+<p:notes xmlns:a="http://schemas.openxmlformats.org/drawingml/2006/main" xmlns:r="http://schemas.openxmlformats.org/officeDocument/2006/relationships" xmlns:p="http://schemas.openxmlformats.org/presentationml/2006/main">
+  <p:cSld>
+    <p:spTree>
+      <p:nvGrpSpPr>
+        <p:cNvPr id="1" name=""/>
+        <p:cNvGrpSpPr/>
+        <p:nvPr/>
+      </p:nvGrpSpPr>
+      <p:grpSpPr>
+        <a:xfrm>
+          <a:off x="0" y="0"/>
+          <a:ext cx="0" cy="0"/>
+          <a:chOff x="0" y="0"/>
+          <a:chExt cx="0" cy="0"/>
+        </a:xfrm>
+      </p:grpSpPr>
+      <p:sp>
+        <p:nvSpPr>
+          <p:cNvPr id="2" name="幻灯片图像占位符 1"/>
+          <p:cNvSpPr>
+            <a:spLocks noGrp="1" noRot="1" noChangeAspect="1"/>
+          </p:cNvSpPr>
+          <p:nvPr>
+            <p:ph type="sldImg"/>
+          </p:nvPr>
+        </p:nvSpPr>
+        <p:spPr/>
+      </p:sp>
+      <p:sp>
+        <p:nvSpPr>
+          <p:cNvPr id="3" name="备注占位符 2"/>
+          <p:cNvSpPr>
+            <a:spLocks noGrp="1"/>
+          </p:cNvSpPr>
+          <p:nvPr>
+            <p:ph type="body" idx="1"/>
+          </p:nvPr>
+        </p:nvSpPr>
+        <p:spPr/>
+        <p:txBody>
+          <a:bodyPr>
+            <a:normAutofit/>
+          </a:bodyPr>
+          <a:lstStyle/>
+          <a:p>
+            <a:endParaRPr lang="zh-CN" altLang="en-US" dirty="0"/>
+          </a:p>
+        </p:txBody>
+      </p:sp>
+      <p:sp>
+        <p:nvSpPr>
+          <p:cNvPr id="4" name="灯片编号占位符 3"/>
+          <p:cNvSpPr>
+            <a:spLocks noGrp="1"/>
+          </p:cNvSpPr>
+          <p:nvPr>
+            <p:ph type="sldNum" sz="quarter" idx="10"/>
+          </p:nvPr>
+        </p:nvSpPr>
+        <p:spPr/>
+        <p:txBody>
+          <a:bodyPr/>
+          <a:lstStyle/>
+          <a:p>
+            <a:fld id="{D350629B-5C7B-404E-93AF-6E6AD907B67B}" type="slidenum">
+              <a:rPr lang="zh-CN" altLang="en-US" smtClean="0"/>
+              <a:pPr/>
+              <a:t>10</a:t>
             </a:fld>
             <a:endParaRPr lang="zh-CN" altLang="en-US"/>
           </a:p>
@@ -990,7 +1209,7 @@
         </p:nvSpPr>
         <p:spPr>
           <a:xfrm>
-            <a:off x="685800" y="2130425"/>
+            <a:off x="685800" y="2130430"/>
             <a:ext cx="7772400" cy="1470025"/>
           </a:xfrm>
         </p:spPr>
@@ -1143,7 +1362,7 @@
             <a:fld id="{530820CF-B880-4189-942D-D702A7CBA730}" type="datetimeFigureOut">
               <a:rPr lang="zh-CN" altLang="en-US" smtClean="0"/>
               <a:pPr/>
-              <a:t>2014/11/23</a:t>
+              <a:t>2014/11/24</a:t>
             </a:fld>
             <a:endParaRPr lang="zh-CN" altLang="en-US"/>
           </a:p>
@@ -1310,7 +1529,7 @@
             <a:fld id="{530820CF-B880-4189-942D-D702A7CBA730}" type="datetimeFigureOut">
               <a:rPr lang="zh-CN" altLang="en-US" smtClean="0"/>
               <a:pPr/>
-              <a:t>2014/11/23</a:t>
+              <a:t>2014/11/24</a:t>
             </a:fld>
             <a:endParaRPr lang="zh-CN" altLang="en-US"/>
           </a:p>
@@ -1396,7 +1615,7 @@
         </p:nvSpPr>
         <p:spPr>
           <a:xfrm>
-            <a:off x="6629400" y="274638"/>
+            <a:off x="6629400" y="274640"/>
             <a:ext cx="2057400" cy="5851525"/>
           </a:xfrm>
         </p:spPr>
@@ -1424,7 +1643,7 @@
         </p:nvSpPr>
         <p:spPr>
           <a:xfrm>
-            <a:off x="457200" y="274638"/>
+            <a:off x="457200" y="274640"/>
             <a:ext cx="6019800" cy="5851525"/>
           </a:xfrm>
         </p:spPr>
@@ -1487,7 +1706,7 @@
             <a:fld id="{530820CF-B880-4189-942D-D702A7CBA730}" type="datetimeFigureOut">
               <a:rPr lang="zh-CN" altLang="en-US" smtClean="0"/>
               <a:pPr/>
-              <a:t>2014/11/23</a:t>
+              <a:t>2014/11/24</a:t>
             </a:fld>
             <a:endParaRPr lang="zh-CN" altLang="en-US"/>
           </a:p>
@@ -1654,7 +1873,7 @@
             <a:fld id="{530820CF-B880-4189-942D-D702A7CBA730}" type="datetimeFigureOut">
               <a:rPr lang="zh-CN" altLang="en-US" smtClean="0"/>
               <a:pPr/>
-              <a:t>2014/11/23</a:t>
+              <a:t>2014/11/24</a:t>
             </a:fld>
             <a:endParaRPr lang="zh-CN" altLang="en-US"/>
           </a:p>
@@ -1740,7 +1959,7 @@
         </p:nvSpPr>
         <p:spPr>
           <a:xfrm>
-            <a:off x="722313" y="4406900"/>
+            <a:off x="722313" y="4406901"/>
             <a:ext cx="7772400" cy="1362075"/>
           </a:xfrm>
         </p:spPr>
@@ -1897,7 +2116,7 @@
             <a:fld id="{530820CF-B880-4189-942D-D702A7CBA730}" type="datetimeFigureOut">
               <a:rPr lang="zh-CN" altLang="en-US" smtClean="0"/>
               <a:pPr/>
-              <a:t>2014/11/23</a:t>
+              <a:t>2014/11/24</a:t>
             </a:fld>
             <a:endParaRPr lang="zh-CN" altLang="en-US"/>
           </a:p>
@@ -2006,7 +2225,7 @@
         </p:nvSpPr>
         <p:spPr>
           <a:xfrm>
-            <a:off x="457200" y="1600200"/>
+            <a:off x="457200" y="1600201"/>
             <a:ext cx="4038600" cy="4525963"/>
           </a:xfrm>
         </p:spPr>
@@ -2091,7 +2310,7 @@
         </p:nvSpPr>
         <p:spPr>
           <a:xfrm>
-            <a:off x="4648200" y="1600200"/>
+            <a:off x="4648200" y="1600201"/>
             <a:ext cx="4038600" cy="4525963"/>
           </a:xfrm>
         </p:spPr>
@@ -2182,7 +2401,7 @@
             <a:fld id="{530820CF-B880-4189-942D-D702A7CBA730}" type="datetimeFigureOut">
               <a:rPr lang="zh-CN" altLang="en-US" smtClean="0"/>
               <a:pPr/>
-              <a:t>2014/11/23</a:t>
+              <a:t>2014/11/24</a:t>
             </a:fld>
             <a:endParaRPr lang="zh-CN" altLang="en-US"/>
           </a:p>
@@ -2296,7 +2515,7 @@
         <p:spPr>
           <a:xfrm>
             <a:off x="457200" y="1535113"/>
-            <a:ext cx="4040188" cy="639762"/>
+            <a:ext cx="4040188" cy="639763"/>
           </a:xfrm>
         </p:spPr>
         <p:txBody>
@@ -2445,8 +2664,8 @@
         </p:nvSpPr>
         <p:spPr>
           <a:xfrm>
-            <a:off x="4645025" y="1535113"/>
-            <a:ext cx="4041775" cy="639762"/>
+            <a:off x="4645033" y="1535113"/>
+            <a:ext cx="4041775" cy="639763"/>
           </a:xfrm>
         </p:spPr>
         <p:txBody>
@@ -2510,7 +2729,7 @@
         </p:nvSpPr>
         <p:spPr>
           <a:xfrm>
-            <a:off x="4645025" y="2174875"/>
+            <a:off x="4645033" y="2174875"/>
             <a:ext cx="4041775" cy="3951288"/>
           </a:xfrm>
         </p:spPr>
@@ -2601,7 +2820,7 @@
             <a:fld id="{530820CF-B880-4189-942D-D702A7CBA730}" type="datetimeFigureOut">
               <a:rPr lang="zh-CN" altLang="en-US" smtClean="0"/>
               <a:pPr/>
-              <a:t>2014/11/23</a:t>
+              <a:t>2014/11/24</a:t>
             </a:fld>
             <a:endParaRPr lang="zh-CN" altLang="en-US"/>
           </a:p>
@@ -2716,7 +2935,7 @@
             <a:fld id="{530820CF-B880-4189-942D-D702A7CBA730}" type="datetimeFigureOut">
               <a:rPr lang="zh-CN" altLang="en-US" smtClean="0"/>
               <a:pPr/>
-              <a:t>2014/11/23</a:t>
+              <a:t>2014/11/24</a:t>
             </a:fld>
             <a:endParaRPr lang="zh-CN" altLang="en-US"/>
           </a:p>
@@ -2808,7 +3027,7 @@
             <a:fld id="{530820CF-B880-4189-942D-D702A7CBA730}" type="datetimeFigureOut">
               <a:rPr lang="zh-CN" altLang="en-US" smtClean="0"/>
               <a:pPr/>
-              <a:t>2014/11/23</a:t>
+              <a:t>2014/11/24</a:t>
             </a:fld>
             <a:endParaRPr lang="zh-CN" altLang="en-US"/>
           </a:p>
@@ -2894,8 +3113,8 @@
         </p:nvSpPr>
         <p:spPr>
           <a:xfrm>
-            <a:off x="457200" y="273050"/>
-            <a:ext cx="3008313" cy="1162050"/>
+            <a:off x="457208" y="273049"/>
+            <a:ext cx="3008313" cy="1162051"/>
           </a:xfrm>
         </p:spPr>
         <p:txBody>
@@ -2926,7 +3145,7 @@
         </p:nvSpPr>
         <p:spPr>
           <a:xfrm>
-            <a:off x="3575050" y="273050"/>
+            <a:off x="3575050" y="273056"/>
             <a:ext cx="5111750" cy="5853113"/>
           </a:xfrm>
         </p:spPr>
@@ -3011,7 +3230,7 @@
         </p:nvSpPr>
         <p:spPr>
           <a:xfrm>
-            <a:off x="457200" y="1435100"/>
+            <a:off x="457208" y="1435104"/>
             <a:ext cx="3008313" cy="4691063"/>
           </a:xfrm>
         </p:spPr>
@@ -3082,7 +3301,7 @@
             <a:fld id="{530820CF-B880-4189-942D-D702A7CBA730}" type="datetimeFigureOut">
               <a:rPr lang="zh-CN" altLang="en-US" smtClean="0"/>
               <a:pPr/>
-              <a:t>2014/11/23</a:t>
+              <a:t>2014/11/24</a:t>
             </a:fld>
             <a:endParaRPr lang="zh-CN" altLang="en-US"/>
           </a:p>
@@ -3168,8 +3387,8 @@
         </p:nvSpPr>
         <p:spPr>
           <a:xfrm>
-            <a:off x="1792288" y="4800600"/>
-            <a:ext cx="5486400" cy="566738"/>
+            <a:off x="1792288" y="4800601"/>
+            <a:ext cx="5486400" cy="566739"/>
           </a:xfrm>
         </p:spPr>
         <p:txBody>
@@ -3245,6 +3464,10 @@
             </a:lvl9pPr>
           </a:lstStyle>
           <a:p>
+            <a:r>
+              <a:rPr lang="zh-CN" altLang="en-US" smtClean="0"/>
+              <a:t>单击图标添加图片</a:t>
+            </a:r>
             <a:endParaRPr lang="zh-CN" altLang="en-US"/>
           </a:p>
         </p:txBody>
@@ -3261,8 +3484,8 @@
         </p:nvSpPr>
         <p:spPr>
           <a:xfrm>
-            <a:off x="1792288" y="5367338"/>
-            <a:ext cx="5486400" cy="804862"/>
+            <a:off x="1792288" y="5367342"/>
+            <a:ext cx="5486400" cy="804863"/>
           </a:xfrm>
         </p:spPr>
         <p:txBody>
@@ -3332,7 +3555,7 @@
             <a:fld id="{530820CF-B880-4189-942D-D702A7CBA730}" type="datetimeFigureOut">
               <a:rPr lang="zh-CN" altLang="en-US" smtClean="0"/>
               <a:pPr/>
-              <a:t>2014/11/23</a:t>
+              <a:t>2014/11/24</a:t>
             </a:fld>
             <a:endParaRPr lang="zh-CN" altLang="en-US"/>
           </a:p>
@@ -3423,7 +3646,7 @@
         </p:nvSpPr>
         <p:spPr>
           <a:xfrm>
-            <a:off x="457200" y="274638"/>
+            <a:off x="457200" y="274639"/>
             <a:ext cx="8229600" cy="1143000"/>
           </a:xfrm>
           <a:prstGeom prst="rect">
@@ -3456,7 +3679,7 @@
         </p:nvSpPr>
         <p:spPr>
           <a:xfrm>
-            <a:off x="457200" y="1600200"/>
+            <a:off x="457200" y="1600201"/>
             <a:ext cx="8229600" cy="4525963"/>
           </a:xfrm>
           <a:prstGeom prst="rect">
@@ -3518,7 +3741,7 @@
         </p:nvSpPr>
         <p:spPr>
           <a:xfrm>
-            <a:off x="457200" y="6356350"/>
+            <a:off x="457200" y="6356352"/>
             <a:ext cx="2133600" cy="365125"/>
           </a:xfrm>
           <a:prstGeom prst="rect">
@@ -3542,7 +3765,7 @@
             <a:fld id="{530820CF-B880-4189-942D-D702A7CBA730}" type="datetimeFigureOut">
               <a:rPr lang="zh-CN" altLang="en-US" smtClean="0"/>
               <a:pPr/>
-              <a:t>2014/11/23</a:t>
+              <a:t>2014/11/24</a:t>
             </a:fld>
             <a:endParaRPr lang="zh-CN" altLang="en-US"/>
           </a:p>
@@ -3560,7 +3783,7 @@
         </p:nvSpPr>
         <p:spPr>
           <a:xfrm>
-            <a:off x="3124200" y="6356350"/>
+            <a:off x="3124200" y="6356352"/>
             <a:ext cx="2895600" cy="365125"/>
           </a:xfrm>
           <a:prstGeom prst="rect">
@@ -3597,7 +3820,7 @@
         </p:nvSpPr>
         <p:spPr>
           <a:xfrm>
-            <a:off x="6553200" y="6356350"/>
+            <a:off x="6553200" y="6356352"/>
             <a:ext cx="2133600" cy="365125"/>
           </a:xfrm>
           <a:prstGeom prst="rect">
@@ -3627,21 +3850,53 @@
           </a:p>
         </p:txBody>
       </p:sp>
+      <p:pic>
+        <p:nvPicPr>
+          <p:cNvPr id="7" name="图片 6" descr="PPT-02.jpg"/>
+          <p:cNvPicPr>
+            <a:picLocks noChangeAspect="1"/>
+          </p:cNvPicPr>
+          <p:nvPr/>
+        </p:nvPicPr>
+        <p:blipFill>
+          <a:blip r:embed="rId13"/>
+          <a:srcRect/>
+          <a:stretch>
+            <a:fillRect/>
+          </a:stretch>
+        </p:blipFill>
+        <p:spPr bwMode="auto">
+          <a:xfrm>
+            <a:off x="0" y="0"/>
+            <a:ext cx="9144000" cy="6858000"/>
+          </a:xfrm>
+          <a:prstGeom prst="rect">
+            <a:avLst/>
+          </a:prstGeom>
+          <a:noFill/>
+          <a:ln w="9525">
+            <a:noFill/>
+            <a:miter lim="800000"/>
+            <a:headEnd/>
+            <a:tailEnd/>
+          </a:ln>
+        </p:spPr>
+      </p:pic>
     </p:spTree>
   </p:cSld>
   <p:clrMap bg1="lt1" tx1="dk1" bg2="lt2" tx2="dk2" accent1="accent1" accent2="accent2" accent3="accent3" accent4="accent4" accent5="accent5" accent6="accent6" hlink="hlink" folHlink="folHlink"/>
   <p:sldLayoutIdLst>
-    <p:sldLayoutId id="2147483649" r:id="rId1"/>
-    <p:sldLayoutId id="2147483650" r:id="rId2"/>
-    <p:sldLayoutId id="2147483651" r:id="rId3"/>
-    <p:sldLayoutId id="2147483652" r:id="rId4"/>
-    <p:sldLayoutId id="2147483653" r:id="rId5"/>
-    <p:sldLayoutId id="2147483654" r:id="rId6"/>
-    <p:sldLayoutId id="2147483655" r:id="rId7"/>
-    <p:sldLayoutId id="2147483656" r:id="rId8"/>
-    <p:sldLayoutId id="2147483657" r:id="rId9"/>
-    <p:sldLayoutId id="2147483658" r:id="rId10"/>
-    <p:sldLayoutId id="2147483659" r:id="rId11"/>
+    <p:sldLayoutId id="2147483697" r:id="rId1"/>
+    <p:sldLayoutId id="2147483698" r:id="rId2"/>
+    <p:sldLayoutId id="2147483699" r:id="rId3"/>
+    <p:sldLayoutId id="2147483700" r:id="rId4"/>
+    <p:sldLayoutId id="2147483701" r:id="rId5"/>
+    <p:sldLayoutId id="2147483702" r:id="rId6"/>
+    <p:sldLayoutId id="2147483703" r:id="rId7"/>
+    <p:sldLayoutId id="2147483704" r:id="rId8"/>
+    <p:sldLayoutId id="2147483705" r:id="rId9"/>
+    <p:sldLayoutId id="2147483706" r:id="rId10"/>
+    <p:sldLayoutId id="2147483707" r:id="rId11"/>
   </p:sldLayoutIdLst>
   <p:txStyles>
     <p:titleStyle>
@@ -3913,6 +4168,38 @@
           <a:chExt cx="0" cy="0"/>
         </a:xfrm>
       </p:grpSpPr>
+      <p:pic>
+        <p:nvPicPr>
+          <p:cNvPr id="4" name="图片 3" descr="PPT-01.jpg"/>
+          <p:cNvPicPr>
+            <a:picLocks noChangeAspect="1"/>
+          </p:cNvPicPr>
+          <p:nvPr/>
+        </p:nvPicPr>
+        <p:blipFill>
+          <a:blip r:embed="rId2" cstate="print"/>
+          <a:srcRect/>
+          <a:stretch>
+            <a:fillRect/>
+          </a:stretch>
+        </p:blipFill>
+        <p:spPr bwMode="auto">
+          <a:xfrm>
+            <a:off x="0" y="0"/>
+            <a:ext cx="9144000" cy="6858000"/>
+          </a:xfrm>
+          <a:prstGeom prst="rect">
+            <a:avLst/>
+          </a:prstGeom>
+          <a:noFill/>
+          <a:ln w="9525">
+            <a:noFill/>
+            <a:miter lim="800000"/>
+            <a:headEnd/>
+            <a:tailEnd/>
+          </a:ln>
+        </p:spPr>
+      </p:pic>
       <p:sp>
         <p:nvSpPr>
           <p:cNvPr id="2" name="标题 1"/>
@@ -3941,25 +4228,6 @@
               <a:latin typeface="黑体" pitchFamily="49" charset="-122"/>
               <a:ea typeface="黑体" pitchFamily="49" charset="-122"/>
             </a:endParaRPr>
-          </a:p>
-        </p:txBody>
-      </p:sp>
-      <p:sp>
-        <p:nvSpPr>
-          <p:cNvPr id="3" name="副标题 2"/>
-          <p:cNvSpPr>
-            <a:spLocks noGrp="1"/>
-          </p:cNvSpPr>
-          <p:nvPr>
-            <p:ph type="subTitle" idx="1"/>
-          </p:nvPr>
-        </p:nvSpPr>
-        <p:spPr/>
-        <p:txBody>
-          <a:bodyPr/>
-          <a:lstStyle/>
-          <a:p>
-            <a:endParaRPr lang="zh-CN" altLang="en-US"/>
           </a:p>
         </p:txBody>
       </p:sp>
@@ -4007,8 +4275,8 @@
         </p:nvSpPr>
         <p:spPr>
           <a:xfrm>
-            <a:off x="285720" y="214290"/>
-            <a:ext cx="6615130" cy="654032"/>
+            <a:off x="285720" y="642918"/>
+            <a:ext cx="6615130" cy="582594"/>
           </a:xfrm>
         </p:spPr>
         <p:txBody>
@@ -4023,12 +4291,38 @@
             </a:pPr>
             <a:r>
               <a:rPr lang="zh-CN" altLang="en-US" sz="2400" dirty="0" smtClean="0"/>
-              <a:t>数据获取</a:t>
+              <a:t>按钮状态改变与选择管理</a:t>
             </a:r>
             <a:endParaRPr lang="zh-CN" altLang="en-US" sz="2400" dirty="0"/>
           </a:p>
         </p:txBody>
       </p:sp>
+      <p:pic>
+        <p:nvPicPr>
+          <p:cNvPr id="5122" name="Picture 2" descr="D:\我的文档\桌面\SelectionManager.jpg"/>
+          <p:cNvPicPr>
+            <a:picLocks noChangeAspect="1" noChangeArrowheads="1"/>
+          </p:cNvPicPr>
+          <p:nvPr/>
+        </p:nvPicPr>
+        <p:blipFill>
+          <a:blip r:embed="rId3"/>
+          <a:srcRect/>
+          <a:stretch>
+            <a:fillRect/>
+          </a:stretch>
+        </p:blipFill>
+        <p:spPr bwMode="auto">
+          <a:xfrm>
+            <a:off x="714348" y="1214422"/>
+            <a:ext cx="7786742" cy="5027942"/>
+          </a:xfrm>
+          <a:prstGeom prst="rect">
+            <a:avLst/>
+          </a:prstGeom>
+          <a:noFill/>
+        </p:spPr>
+      </p:pic>
     </p:spTree>
   </p:cSld>
   <p:clrMapOvr>
@@ -4071,22 +4365,824 @@
             <p:ph type="title"/>
           </p:nvPr>
         </p:nvSpPr>
-        <p:spPr/>
+        <p:spPr>
+          <a:xfrm>
+            <a:off x="285720" y="214291"/>
+            <a:ext cx="6615130" cy="654032"/>
+          </a:xfrm>
+        </p:spPr>
         <p:txBody>
           <a:bodyPr>
             <a:normAutofit/>
           </a:bodyPr>
           <a:lstStyle/>
           <a:p>
+            <a:pPr algn="l">
+              <a:buFont typeface="Wingdings" pitchFamily="2" charset="2"/>
+              <a:buChar char="l"/>
+            </a:pPr>
+            <a:r>
+              <a:rPr lang="zh-CN" altLang="en-US" sz="2400" dirty="0" smtClean="0"/>
+              <a:t>图片数据库结构</a:t>
+            </a:r>
+            <a:endParaRPr lang="zh-CN" altLang="en-US" sz="2400" dirty="0"/>
+          </a:p>
+        </p:txBody>
+      </p:sp>
+      <p:graphicFrame>
+        <p:nvGraphicFramePr>
+          <p:cNvPr id="4" name="表格 3"/>
+          <p:cNvGraphicFramePr>
+            <a:graphicFrameLocks noGrp="1"/>
+          </p:cNvGraphicFramePr>
+          <p:nvPr/>
+        </p:nvGraphicFramePr>
+        <p:xfrm>
+          <a:off x="928662" y="928671"/>
+          <a:ext cx="7143800" cy="5334000"/>
+        </p:xfrm>
+        <a:graphic>
+          <a:graphicData uri="http://schemas.openxmlformats.org/drawingml/2006/table">
+            <a:tbl>
+              <a:tblPr firstRow="1" bandRow="1">
+                <a:tableStyleId>{5C22544A-7EE6-4342-B048-85BDC9FD1C3A}</a:tableStyleId>
+              </a:tblPr>
+              <a:tblGrid>
+                <a:gridCol w="3571900"/>
+                <a:gridCol w="3571900"/>
+              </a:tblGrid>
+              <a:tr h="381000">
+                <a:tc>
+                  <a:txBody>
+                    <a:bodyPr/>
+                    <a:lstStyle/>
+                    <a:p>
+                      <a:pPr algn="ctr"/>
+                      <a:r>
+                        <a:rPr lang="zh-CN" altLang="en-US" sz="1900" dirty="0" smtClean="0"/>
+                        <a:t>字段名</a:t>
+                      </a:r>
+                      <a:endParaRPr lang="zh-CN" altLang="en-US" sz="1900" dirty="0"/>
+                    </a:p>
+                  </a:txBody>
+                  <a:tcPr/>
+                </a:tc>
+                <a:tc>
+                  <a:txBody>
+                    <a:bodyPr/>
+                    <a:lstStyle/>
+                    <a:p>
+                      <a:pPr algn="ctr"/>
+                      <a:endParaRPr lang="zh-CN" altLang="en-US" sz="1900"/>
+                    </a:p>
+                  </a:txBody>
+                  <a:tcPr/>
+                </a:tc>
+              </a:tr>
+              <a:tr h="381000">
+                <a:tc>
+                  <a:txBody>
+                    <a:bodyPr/>
+                    <a:lstStyle/>
+                    <a:p>
+                      <a:pPr algn="ctr"/>
+                      <a:r>
+                        <a:rPr lang="en-US" altLang="zh-CN" sz="1900" dirty="0" smtClean="0"/>
+                        <a:t>_id</a:t>
+                      </a:r>
+                      <a:endParaRPr lang="zh-CN" altLang="en-US" sz="1900" dirty="0"/>
+                    </a:p>
+                  </a:txBody>
+                  <a:tcPr/>
+                </a:tc>
+                <a:tc>
+                  <a:txBody>
+                    <a:bodyPr/>
+                    <a:lstStyle/>
+                    <a:p>
+                      <a:pPr algn="ctr"/>
+                      <a:endParaRPr lang="zh-CN" altLang="en-US" sz="1900"/>
+                    </a:p>
+                  </a:txBody>
+                  <a:tcPr/>
+                </a:tc>
+              </a:tr>
+              <a:tr h="381000">
+                <a:tc>
+                  <a:txBody>
+                    <a:bodyPr/>
+                    <a:lstStyle/>
+                    <a:p>
+                      <a:pPr algn="ctr"/>
+                      <a:r>
+                        <a:rPr lang="en-US" altLang="zh-CN" sz="1900" dirty="0" smtClean="0"/>
+                        <a:t>_data</a:t>
+                      </a:r>
+                      <a:endParaRPr lang="zh-CN" altLang="en-US" sz="1900" dirty="0"/>
+                    </a:p>
+                  </a:txBody>
+                  <a:tcPr/>
+                </a:tc>
+                <a:tc>
+                  <a:txBody>
+                    <a:bodyPr/>
+                    <a:lstStyle/>
+                    <a:p>
+                      <a:pPr algn="ctr"/>
+                      <a:r>
+                        <a:rPr lang="zh-CN" altLang="en-US" sz="1900" dirty="0" smtClean="0"/>
+                        <a:t>路径</a:t>
+                      </a:r>
+                      <a:endParaRPr lang="zh-CN" altLang="en-US" sz="1900" dirty="0"/>
+                    </a:p>
+                  </a:txBody>
+                  <a:tcPr/>
+                </a:tc>
+              </a:tr>
+              <a:tr h="381000">
+                <a:tc>
+                  <a:txBody>
+                    <a:bodyPr/>
+                    <a:lstStyle/>
+                    <a:p>
+                      <a:pPr algn="ctr"/>
+                      <a:r>
+                        <a:rPr lang="en-US" altLang="zh-CN" sz="1900" dirty="0" smtClean="0"/>
+                        <a:t>_size</a:t>
+                      </a:r>
+                      <a:endParaRPr lang="zh-CN" altLang="en-US" sz="1900" dirty="0"/>
+                    </a:p>
+                  </a:txBody>
+                  <a:tcPr/>
+                </a:tc>
+                <a:tc>
+                  <a:txBody>
+                    <a:bodyPr/>
+                    <a:lstStyle/>
+                    <a:p>
+                      <a:pPr algn="ctr"/>
+                      <a:endParaRPr lang="zh-CN" altLang="en-US" sz="1900" dirty="0"/>
+                    </a:p>
+                  </a:txBody>
+                  <a:tcPr/>
+                </a:tc>
+              </a:tr>
+              <a:tr h="381000">
+                <a:tc>
+                  <a:txBody>
+                    <a:bodyPr/>
+                    <a:lstStyle/>
+                    <a:p>
+                      <a:pPr algn="ctr"/>
+                      <a:r>
+                        <a:rPr lang="en-US" altLang="zh-CN" sz="1900" dirty="0" smtClean="0"/>
+                        <a:t>_</a:t>
+                      </a:r>
+                      <a:r>
+                        <a:rPr lang="en-US" altLang="zh-CN" sz="1900" dirty="0" err="1" smtClean="0"/>
+                        <a:t>display_name</a:t>
+                      </a:r>
+                      <a:endParaRPr lang="zh-CN" altLang="en-US" sz="1900" dirty="0"/>
+                    </a:p>
+                  </a:txBody>
+                  <a:tcPr/>
+                </a:tc>
+                <a:tc>
+                  <a:txBody>
+                    <a:bodyPr/>
+                    <a:lstStyle/>
+                    <a:p>
+                      <a:pPr algn="ctr"/>
+                      <a:r>
+                        <a:rPr lang="en-US" altLang="zh-CN" sz="1900" dirty="0" smtClean="0"/>
+                        <a:t>Eg : IMG_25570701_073407.jpg</a:t>
+                      </a:r>
+                      <a:endParaRPr lang="zh-CN" altLang="en-US" sz="1900" dirty="0"/>
+                    </a:p>
+                  </a:txBody>
+                  <a:tcPr/>
+                </a:tc>
+              </a:tr>
+              <a:tr h="381000">
+                <a:tc>
+                  <a:txBody>
+                    <a:bodyPr/>
+                    <a:lstStyle/>
+                    <a:p>
+                      <a:pPr algn="ctr"/>
+                      <a:r>
+                        <a:rPr lang="en-US" altLang="zh-CN" sz="1900" dirty="0" err="1" smtClean="0"/>
+                        <a:t>mime_type</a:t>
+                      </a:r>
+                      <a:endParaRPr lang="zh-CN" altLang="en-US" sz="1900" dirty="0"/>
+                    </a:p>
+                  </a:txBody>
+                  <a:tcPr/>
+                </a:tc>
+                <a:tc>
+                  <a:txBody>
+                    <a:bodyPr/>
+                    <a:lstStyle/>
+                    <a:p>
+                      <a:pPr algn="ctr"/>
+                      <a:r>
+                        <a:rPr lang="zh-CN" altLang="en-US" sz="1900" dirty="0" smtClean="0"/>
+                        <a:t>图片类型</a:t>
+                      </a:r>
+                      <a:endParaRPr lang="zh-CN" altLang="en-US" sz="1900" dirty="0"/>
+                    </a:p>
+                  </a:txBody>
+                  <a:tcPr/>
+                </a:tc>
+              </a:tr>
+              <a:tr h="381000">
+                <a:tc>
+                  <a:txBody>
+                    <a:bodyPr/>
+                    <a:lstStyle/>
+                    <a:p>
+                      <a:pPr algn="ctr"/>
+                      <a:r>
+                        <a:rPr lang="en-US" altLang="zh-CN" sz="1900" dirty="0" smtClean="0"/>
+                        <a:t>title</a:t>
+                      </a:r>
+                      <a:endParaRPr lang="zh-CN" altLang="en-US" sz="1900" dirty="0"/>
+                    </a:p>
+                  </a:txBody>
+                  <a:tcPr/>
+                </a:tc>
+                <a:tc>
+                  <a:txBody>
+                    <a:bodyPr/>
+                    <a:lstStyle/>
+                    <a:p>
+                      <a:pPr algn="ctr"/>
+                      <a:r>
+                        <a:rPr lang="en-US" altLang="zh-CN" sz="1900" dirty="0" smtClean="0"/>
+                        <a:t>Eg : IMG_25570701_073407</a:t>
+                      </a:r>
+                      <a:endParaRPr lang="zh-CN" altLang="en-US" sz="1900" dirty="0"/>
+                    </a:p>
+                  </a:txBody>
+                  <a:tcPr/>
+                </a:tc>
+              </a:tr>
+              <a:tr h="381000">
+                <a:tc>
+                  <a:txBody>
+                    <a:bodyPr/>
+                    <a:lstStyle/>
+                    <a:p>
+                      <a:pPr algn="ctr"/>
+                      <a:r>
+                        <a:rPr lang="en-US" altLang="zh-CN" sz="1900" dirty="0" smtClean="0"/>
+                        <a:t>date_added/date_modified</a:t>
+                      </a:r>
+                      <a:endParaRPr lang="zh-CN" altLang="en-US" sz="1900" dirty="0"/>
+                    </a:p>
+                  </a:txBody>
+                  <a:tcPr/>
+                </a:tc>
+                <a:tc>
+                  <a:txBody>
+                    <a:bodyPr/>
+                    <a:lstStyle/>
+                    <a:p>
+                      <a:pPr algn="ctr"/>
+                      <a:r>
+                        <a:rPr lang="zh-CN" altLang="en-US" sz="1900" dirty="0" smtClean="0"/>
+                        <a:t>用于排序</a:t>
+                      </a:r>
+                      <a:endParaRPr lang="zh-CN" altLang="en-US" sz="1900" dirty="0"/>
+                    </a:p>
+                  </a:txBody>
+                  <a:tcPr/>
+                </a:tc>
+              </a:tr>
+              <a:tr h="381000">
+                <a:tc>
+                  <a:txBody>
+                    <a:bodyPr/>
+                    <a:lstStyle/>
+                    <a:p>
+                      <a:pPr algn="ctr"/>
+                      <a:r>
+                        <a:rPr lang="en-US" altLang="zh-CN" sz="1900" dirty="0" err="1" smtClean="0"/>
+                        <a:t>datetaken</a:t>
+                      </a:r>
+                      <a:endParaRPr lang="zh-CN" altLang="en-US" sz="1900" dirty="0"/>
+                    </a:p>
+                  </a:txBody>
+                  <a:tcPr/>
+                </a:tc>
+                <a:tc>
+                  <a:txBody>
+                    <a:bodyPr/>
+                    <a:lstStyle/>
+                    <a:p>
+                      <a:pPr algn="ctr"/>
+                      <a:r>
+                        <a:rPr lang="zh-CN" altLang="en-US" sz="1900" dirty="0" smtClean="0"/>
+                        <a:t>时间检索</a:t>
+                      </a:r>
+                      <a:endParaRPr lang="zh-CN" altLang="en-US" sz="1900" dirty="0"/>
+                    </a:p>
+                  </a:txBody>
+                  <a:tcPr/>
+                </a:tc>
+              </a:tr>
+              <a:tr h="381000">
+                <a:tc>
+                  <a:txBody>
+                    <a:bodyPr/>
+                    <a:lstStyle/>
+                    <a:p>
+                      <a:pPr algn="ctr"/>
+                      <a:r>
+                        <a:rPr lang="en-US" altLang="zh-CN" sz="1900" dirty="0" err="1" smtClean="0"/>
+                        <a:t>bucket_id</a:t>
+                      </a:r>
+                      <a:endParaRPr lang="zh-CN" altLang="en-US" sz="1900" dirty="0"/>
+                    </a:p>
+                  </a:txBody>
+                  <a:tcPr/>
+                </a:tc>
+                <a:tc>
+                  <a:txBody>
+                    <a:bodyPr/>
+                    <a:lstStyle/>
+                    <a:p>
+                      <a:pPr algn="ctr"/>
+                      <a:r>
+                        <a:rPr lang="zh-CN" altLang="en-US" sz="1900" dirty="0" smtClean="0"/>
+                        <a:t>所在相册</a:t>
+                      </a:r>
+                      <a:r>
+                        <a:rPr lang="en-US" altLang="zh-CN" sz="1900" dirty="0" smtClean="0"/>
+                        <a:t>ID</a:t>
+                      </a:r>
+                      <a:endParaRPr lang="zh-CN" altLang="en-US" sz="1900" dirty="0"/>
+                    </a:p>
+                  </a:txBody>
+                  <a:tcPr/>
+                </a:tc>
+              </a:tr>
+              <a:tr h="381000">
+                <a:tc>
+                  <a:txBody>
+                    <a:bodyPr/>
+                    <a:lstStyle/>
+                    <a:p>
+                      <a:pPr algn="ctr"/>
+                      <a:r>
+                        <a:rPr lang="en-US" altLang="zh-CN" sz="1900" dirty="0" err="1" smtClean="0"/>
+                        <a:t>bucket_display_name</a:t>
+                      </a:r>
+                      <a:endParaRPr lang="zh-CN" altLang="en-US" sz="1900" dirty="0"/>
+                    </a:p>
+                  </a:txBody>
+                  <a:tcPr/>
+                </a:tc>
+                <a:tc>
+                  <a:txBody>
+                    <a:bodyPr/>
+                    <a:lstStyle/>
+                    <a:p>
+                      <a:pPr algn="ctr"/>
+                      <a:r>
+                        <a:rPr lang="zh-CN" altLang="en-US" sz="1900" dirty="0" smtClean="0"/>
+                        <a:t>相册</a:t>
+                      </a:r>
+                      <a:endParaRPr lang="zh-CN" altLang="en-US" sz="1900" dirty="0"/>
+                    </a:p>
+                  </a:txBody>
+                  <a:tcPr/>
+                </a:tc>
+              </a:tr>
+              <a:tr h="381000">
+                <a:tc>
+                  <a:txBody>
+                    <a:bodyPr/>
+                    <a:lstStyle/>
+                    <a:p>
+                      <a:pPr algn="ctr"/>
+                      <a:r>
+                        <a:rPr lang="en-US" altLang="zh-CN" sz="1900" dirty="0" smtClean="0"/>
+                        <a:t>width/height</a:t>
+                      </a:r>
+                      <a:endParaRPr lang="zh-CN" altLang="en-US" sz="1900" dirty="0"/>
+                    </a:p>
+                  </a:txBody>
+                  <a:tcPr/>
+                </a:tc>
+                <a:tc>
+                  <a:txBody>
+                    <a:bodyPr/>
+                    <a:lstStyle/>
+                    <a:p>
+                      <a:pPr algn="ctr"/>
+                      <a:endParaRPr lang="zh-CN" altLang="en-US" sz="1900" dirty="0"/>
+                    </a:p>
+                  </a:txBody>
+                  <a:tcPr/>
+                </a:tc>
+              </a:tr>
+              <a:tr h="381000">
+                <a:tc>
+                  <a:txBody>
+                    <a:bodyPr/>
+                    <a:lstStyle/>
+                    <a:p>
+                      <a:pPr algn="ctr"/>
+                      <a:r>
+                        <a:rPr lang="en-US" altLang="zh-CN" sz="1900" dirty="0" err="1" smtClean="0"/>
+                        <a:t>group_index</a:t>
+                      </a:r>
+                      <a:endParaRPr lang="zh-CN" altLang="en-US" sz="1900" dirty="0"/>
+                    </a:p>
+                  </a:txBody>
+                  <a:tcPr/>
+                </a:tc>
+                <a:tc>
+                  <a:txBody>
+                    <a:bodyPr/>
+                    <a:lstStyle/>
+                    <a:p>
+                      <a:pPr algn="ctr"/>
+                      <a:r>
+                        <a:rPr lang="zh-CN" altLang="en-US" sz="1900" dirty="0" smtClean="0"/>
+                        <a:t>连拍排序</a:t>
+                      </a:r>
+                      <a:endParaRPr lang="zh-CN" altLang="en-US" sz="1900" dirty="0"/>
+                    </a:p>
+                  </a:txBody>
+                  <a:tcPr/>
+                </a:tc>
+              </a:tr>
+              <a:tr h="381000">
+                <a:tc>
+                  <a:txBody>
+                    <a:bodyPr/>
+                    <a:lstStyle/>
+                    <a:p>
+                      <a:pPr algn="ctr"/>
+                      <a:r>
+                        <a:rPr lang="en-US" altLang="zh-CN" sz="1900" dirty="0" err="1" smtClean="0"/>
+                        <a:t>group_id</a:t>
+                      </a:r>
+                      <a:endParaRPr lang="zh-CN" altLang="en-US" sz="1900" dirty="0"/>
+                    </a:p>
+                  </a:txBody>
+                  <a:tcPr/>
+                </a:tc>
+                <a:tc>
+                  <a:txBody>
+                    <a:bodyPr/>
+                    <a:lstStyle/>
+                    <a:p>
+                      <a:pPr algn="ctr"/>
+                      <a:r>
+                        <a:rPr lang="zh-CN" altLang="en-US" sz="1900" dirty="0" smtClean="0"/>
+                        <a:t>非连拍照片的值为</a:t>
+                      </a:r>
+                      <a:r>
+                        <a:rPr lang="en-US" altLang="zh-CN" sz="1900" dirty="0" smtClean="0"/>
+                        <a:t>0</a:t>
+                      </a:r>
+                      <a:endParaRPr lang="zh-CN" altLang="en-US" sz="1900" dirty="0"/>
+                    </a:p>
+                  </a:txBody>
+                  <a:tcPr/>
+                </a:tc>
+              </a:tr>
+            </a:tbl>
+          </a:graphicData>
+        </a:graphic>
+      </p:graphicFrame>
+    </p:spTree>
+  </p:cSld>
+  <p:clrMapOvr>
+    <a:masterClrMapping/>
+  </p:clrMapOvr>
+  <p:timing>
+    <p:tnLst>
+      <p:par>
+        <p:cTn id="1" dur="indefinite" restart="never" nodeType="tmRoot"/>
+      </p:par>
+    </p:tnLst>
+  </p:timing>
+</p:sld>
+</file>
+
+<file path=ppt/slides/slide12.xml><?xml version="1.0" encoding="utf-8"?>
+<p:sld xmlns:a="http://schemas.openxmlformats.org/drawingml/2006/main" xmlns:r="http://schemas.openxmlformats.org/officeDocument/2006/relationships" xmlns:p="http://schemas.openxmlformats.org/presentationml/2006/main">
+  <p:cSld>
+    <p:spTree>
+      <p:nvGrpSpPr>
+        <p:cNvPr id="1" name=""/>
+        <p:cNvGrpSpPr/>
+        <p:nvPr/>
+      </p:nvGrpSpPr>
+      <p:grpSpPr>
+        <a:xfrm>
+          <a:off x="0" y="0"/>
+          <a:ext cx="0" cy="0"/>
+          <a:chOff x="0" y="0"/>
+          <a:chExt cx="0" cy="0"/>
+        </a:xfrm>
+      </p:grpSpPr>
+      <p:sp>
+        <p:nvSpPr>
+          <p:cNvPr id="2" name="标题 1"/>
+          <p:cNvSpPr>
+            <a:spLocks noGrp="1"/>
+          </p:cNvSpPr>
+          <p:nvPr>
+            <p:ph type="title"/>
+          </p:nvPr>
+        </p:nvSpPr>
+        <p:spPr>
+          <a:xfrm>
+            <a:off x="285720" y="642918"/>
+            <a:ext cx="6615130" cy="582594"/>
+          </a:xfrm>
+        </p:spPr>
+        <p:txBody>
+          <a:bodyPr>
+            <a:normAutofit/>
+          </a:bodyPr>
+          <a:lstStyle/>
+          <a:p>
+            <a:pPr algn="l">
+              <a:buFont typeface="Wingdings" pitchFamily="2" charset="2"/>
+              <a:buChar char="l"/>
+            </a:pPr>
+            <a:r>
+              <a:rPr lang="zh-CN" altLang="en-US" sz="2400" dirty="0" smtClean="0"/>
+              <a:t>图片数据库结构</a:t>
+            </a:r>
+            <a:endParaRPr lang="zh-CN" altLang="en-US" sz="2400" dirty="0"/>
+          </a:p>
+        </p:txBody>
+      </p:sp>
+      <p:pic>
+        <p:nvPicPr>
+          <p:cNvPr id="2050" name="Picture 2"/>
+          <p:cNvPicPr>
+            <a:picLocks noChangeAspect="1" noChangeArrowheads="1"/>
+          </p:cNvPicPr>
+          <p:nvPr/>
+        </p:nvPicPr>
+        <p:blipFill>
+          <a:blip r:embed="rId2"/>
+          <a:srcRect/>
+          <a:stretch>
+            <a:fillRect/>
+          </a:stretch>
+        </p:blipFill>
+        <p:spPr bwMode="auto">
+          <a:xfrm>
+            <a:off x="642914" y="1571613"/>
+            <a:ext cx="7916425" cy="4086227"/>
+          </a:xfrm>
+          <a:prstGeom prst="rect">
+            <a:avLst/>
+          </a:prstGeom>
+          <a:noFill/>
+          <a:ln w="9525">
+            <a:noFill/>
+            <a:miter lim="800000"/>
+            <a:headEnd/>
+            <a:tailEnd/>
+          </a:ln>
+          <a:effectLst/>
+        </p:spPr>
+      </p:pic>
+    </p:spTree>
+  </p:cSld>
+  <p:clrMapOvr>
+    <a:masterClrMapping/>
+  </p:clrMapOvr>
+  <p:timing>
+    <p:tnLst>
+      <p:par>
+        <p:cTn id="1" dur="indefinite" restart="never" nodeType="tmRoot"/>
+      </p:par>
+    </p:tnLst>
+  </p:timing>
+</p:sld>
+</file>
+
+<file path=ppt/slides/slide13.xml><?xml version="1.0" encoding="utf-8"?>
+<p:sld xmlns:a="http://schemas.openxmlformats.org/drawingml/2006/main" xmlns:r="http://schemas.openxmlformats.org/officeDocument/2006/relationships" xmlns:p="http://schemas.openxmlformats.org/presentationml/2006/main">
+  <p:cSld>
+    <p:spTree>
+      <p:nvGrpSpPr>
+        <p:cNvPr id="1" name=""/>
+        <p:cNvGrpSpPr/>
+        <p:nvPr/>
+      </p:nvGrpSpPr>
+      <p:grpSpPr>
+        <a:xfrm>
+          <a:off x="0" y="0"/>
+          <a:ext cx="0" cy="0"/>
+          <a:chOff x="0" y="0"/>
+          <a:chExt cx="0" cy="0"/>
+        </a:xfrm>
+      </p:grpSpPr>
+      <p:sp>
+        <p:nvSpPr>
+          <p:cNvPr id="2" name="标题 1"/>
+          <p:cNvSpPr>
+            <a:spLocks noGrp="1"/>
+          </p:cNvSpPr>
+          <p:nvPr>
+            <p:ph type="title"/>
+          </p:nvPr>
+        </p:nvSpPr>
+        <p:spPr>
+          <a:xfrm>
+            <a:off x="285720" y="642918"/>
+            <a:ext cx="6615130" cy="582594"/>
+          </a:xfrm>
+        </p:spPr>
+        <p:txBody>
+          <a:bodyPr>
+            <a:normAutofit/>
+          </a:bodyPr>
+          <a:lstStyle/>
+          <a:p>
+            <a:pPr algn="l">
+              <a:buFont typeface="Wingdings" pitchFamily="2" charset="2"/>
+              <a:buChar char="l"/>
+            </a:pPr>
+            <a:r>
+              <a:rPr lang="zh-CN" altLang="en-US" sz="2400" dirty="0" smtClean="0"/>
+              <a:t>照片</a:t>
+            </a:r>
+            <a:r>
+              <a:rPr lang="zh-CN" altLang="en-US" sz="2400" dirty="0" smtClean="0"/>
+              <a:t>编辑</a:t>
+            </a:r>
+            <a:endParaRPr lang="zh-CN" altLang="en-US" sz="2400" dirty="0"/>
+          </a:p>
+        </p:txBody>
+      </p:sp>
+      <p:pic>
+        <p:nvPicPr>
+          <p:cNvPr id="2054" name="Picture 6" descr="D:\我的文档\桌面\{A72A7646-A39D-4054-BF7E-ED43B6853089}.bmp"/>
+          <p:cNvPicPr>
+            <a:picLocks noChangeAspect="1" noChangeArrowheads="1"/>
+          </p:cNvPicPr>
+          <p:nvPr/>
+        </p:nvPicPr>
+        <p:blipFill>
+          <a:blip r:embed="rId2"/>
+          <a:srcRect/>
+          <a:stretch>
+            <a:fillRect/>
+          </a:stretch>
+        </p:blipFill>
+        <p:spPr bwMode="auto">
+          <a:xfrm>
+            <a:off x="285720" y="1357298"/>
+            <a:ext cx="8496557" cy="4071966"/>
+          </a:xfrm>
+          <a:prstGeom prst="rect">
+            <a:avLst/>
+          </a:prstGeom>
+          <a:noFill/>
+        </p:spPr>
+      </p:pic>
+    </p:spTree>
+  </p:cSld>
+  <p:clrMapOvr>
+    <a:masterClrMapping/>
+  </p:clrMapOvr>
+  <p:timing>
+    <p:tnLst>
+      <p:par>
+        <p:cTn id="1" dur="indefinite" restart="never" nodeType="tmRoot"/>
+      </p:par>
+    </p:tnLst>
+  </p:timing>
+</p:sld>
+</file>
+
+<file path=ppt/slides/slide14.xml><?xml version="1.0" encoding="utf-8"?>
+<p:sld xmlns:a="http://schemas.openxmlformats.org/drawingml/2006/main" xmlns:r="http://schemas.openxmlformats.org/officeDocument/2006/relationships" xmlns:p="http://schemas.openxmlformats.org/presentationml/2006/main">
+  <p:cSld>
+    <p:spTree>
+      <p:nvGrpSpPr>
+        <p:cNvPr id="1" name=""/>
+        <p:cNvGrpSpPr/>
+        <p:nvPr/>
+      </p:nvGrpSpPr>
+      <p:grpSpPr>
+        <a:xfrm>
+          <a:off x="0" y="0"/>
+          <a:ext cx="0" cy="0"/>
+          <a:chOff x="0" y="0"/>
+          <a:chExt cx="0" cy="0"/>
+        </a:xfrm>
+      </p:grpSpPr>
+      <p:sp>
+        <p:nvSpPr>
+          <p:cNvPr id="2" name="标题 1"/>
+          <p:cNvSpPr>
+            <a:spLocks noGrp="1"/>
+          </p:cNvSpPr>
+          <p:nvPr>
+            <p:ph type="title"/>
+          </p:nvPr>
+        </p:nvSpPr>
+        <p:spPr>
+          <a:xfrm>
+            <a:off x="285720" y="642918"/>
+            <a:ext cx="6615130" cy="582594"/>
+          </a:xfrm>
+        </p:spPr>
+        <p:txBody>
+          <a:bodyPr>
+            <a:normAutofit/>
+          </a:bodyPr>
+          <a:lstStyle/>
+          <a:p>
+            <a:pPr algn="l">
+              <a:buFont typeface="Wingdings" pitchFamily="2" charset="2"/>
+              <a:buChar char="l"/>
+            </a:pPr>
+            <a:r>
+              <a:rPr lang="zh-CN" altLang="en-US" sz="2400" dirty="0" smtClean="0"/>
+              <a:t>手势操作</a:t>
+            </a:r>
+            <a:endParaRPr lang="zh-CN" altLang="en-US" sz="2400" dirty="0"/>
+          </a:p>
+        </p:txBody>
+      </p:sp>
+    </p:spTree>
+  </p:cSld>
+  <p:clrMapOvr>
+    <a:masterClrMapping/>
+  </p:clrMapOvr>
+  <p:timing>
+    <p:tnLst>
+      <p:par>
+        <p:cTn id="1" dur="indefinite" restart="never" nodeType="tmRoot"/>
+      </p:par>
+    </p:tnLst>
+  </p:timing>
+</p:sld>
+</file>
+
+<file path=ppt/slides/slide15.xml><?xml version="1.0" encoding="utf-8"?>
+<p:sld xmlns:a="http://schemas.openxmlformats.org/drawingml/2006/main" xmlns:r="http://schemas.openxmlformats.org/officeDocument/2006/relationships" xmlns:p="http://schemas.openxmlformats.org/presentationml/2006/main">
+  <p:cSld>
+    <p:spTree>
+      <p:nvGrpSpPr>
+        <p:cNvPr id="1" name=""/>
+        <p:cNvGrpSpPr/>
+        <p:nvPr/>
+      </p:nvGrpSpPr>
+      <p:grpSpPr>
+        <a:xfrm>
+          <a:off x="0" y="0"/>
+          <a:ext cx="0" cy="0"/>
+          <a:chOff x="0" y="0"/>
+          <a:chExt cx="0" cy="0"/>
+        </a:xfrm>
+      </p:grpSpPr>
+      <p:sp>
+        <p:nvSpPr>
+          <p:cNvPr id="2" name="标题 1"/>
+          <p:cNvSpPr>
+            <a:spLocks noGrp="1"/>
+          </p:cNvSpPr>
+          <p:nvPr>
+            <p:ph type="title"/>
+          </p:nvPr>
+        </p:nvSpPr>
+        <p:spPr>
+          <a:xfrm>
+            <a:off x="428596" y="642918"/>
+            <a:ext cx="8229600" cy="1143000"/>
+          </a:xfrm>
+        </p:spPr>
+        <p:txBody>
+          <a:bodyPr>
+            <a:normAutofit/>
+          </a:bodyPr>
+          <a:lstStyle/>
+          <a:p>
             <a:pPr algn="l"/>
             <a:r>
-              <a:rPr lang="zh-CN" altLang="en-US" sz="4000" dirty="0" smtClean="0">
+              <a:rPr lang="zh-CN" altLang="en-US" sz="4000" b="1" dirty="0" smtClean="0">
                 <a:latin typeface="黑体" pitchFamily="49" charset="-122"/>
                 <a:ea typeface="黑体" pitchFamily="49" charset="-122"/>
               </a:rPr>
-              <a:t>工具掌握</a:t>
-            </a:r>
-            <a:endParaRPr lang="zh-CN" altLang="en-US" sz="4000" dirty="0">
+              <a:t>其他工作</a:t>
+            </a:r>
+            <a:endParaRPr lang="zh-CN" altLang="en-US" sz="4000" b="1" dirty="0">
               <a:latin typeface="黑体" pitchFamily="49" charset="-122"/>
               <a:ea typeface="黑体" pitchFamily="49" charset="-122"/>
             </a:endParaRPr>
@@ -4110,7 +5206,7 @@
         </p:blipFill>
         <p:spPr bwMode="auto">
           <a:xfrm>
-            <a:off x="7072330" y="1643050"/>
+            <a:off x="7072330" y="1142984"/>
             <a:ext cx="1219200" cy="1219201"/>
           </a:xfrm>
           <a:prstGeom prst="rect">
@@ -4121,83 +5217,85 @@
       </p:pic>
       <p:sp>
         <p:nvSpPr>
-          <p:cNvPr id="8" name="TextBox 7"/>
-          <p:cNvSpPr txBox="1"/>
-          <p:nvPr/>
+          <p:cNvPr id="5" name="内容占位符 2"/>
+          <p:cNvSpPr>
+            <a:spLocks noGrp="1"/>
+          </p:cNvSpPr>
+          <p:nvPr>
+            <p:ph idx="1"/>
+          </p:nvPr>
         </p:nvSpPr>
         <p:spPr>
           <a:xfrm>
-            <a:off x="500034" y="1428736"/>
-            <a:ext cx="6357982" cy="2862322"/>
-          </a:xfrm>
-          <a:prstGeom prst="rect">
-            <a:avLst/>
-          </a:prstGeom>
-          <a:noFill/>
-        </p:spPr>
-        <p:txBody>
-          <a:bodyPr wrap="square" rtlCol="0">
-            <a:spAutoFit/>
-          </a:bodyPr>
-          <a:lstStyle/>
-          <a:p>
-            <a:r>
-              <a:rPr lang="zh-CN" altLang="en-US" sz="3600" b="1" dirty="0" smtClean="0">
-                <a:latin typeface="+mn-ea"/>
-              </a:rPr>
-              <a:t>烧写工具：</a:t>
-            </a:r>
-            <a:endParaRPr lang="en-US" altLang="zh-CN" sz="3600" b="1" dirty="0" smtClean="0">
-              <a:latin typeface="+mn-ea"/>
-            </a:endParaRPr>
-          </a:p>
-          <a:p>
-            <a:r>
-              <a:rPr lang="zh-CN" altLang="en-US" sz="3600" b="1" dirty="0" smtClean="0">
-                <a:latin typeface="+mn-ea"/>
-              </a:rPr>
-              <a:t>实用工具：</a:t>
-            </a:r>
-            <a:endParaRPr lang="en-US" altLang="zh-CN" sz="3600" b="1" dirty="0" smtClean="0">
-              <a:latin typeface="+mn-ea"/>
-            </a:endParaRPr>
-          </a:p>
-          <a:p>
-            <a:r>
-              <a:rPr lang="en-US" altLang="zh-CN" sz="3600" dirty="0" smtClean="0">
-                <a:latin typeface="+mn-ea"/>
-              </a:rPr>
-              <a:t>	</a:t>
-            </a:r>
-            <a:r>
-              <a:rPr lang="en-US" altLang="zh-CN" sz="3600" dirty="0" smtClean="0">
-                <a:latin typeface="Arial" pitchFamily="34" charset="0"/>
-                <a:cs typeface="Arial" pitchFamily="34" charset="0"/>
-              </a:rPr>
-              <a:t>Beyond Compare 3</a:t>
-            </a:r>
-          </a:p>
-          <a:p>
-            <a:r>
-              <a:rPr lang="en-US" altLang="zh-CN" sz="3600" dirty="0" smtClean="0">
-                <a:latin typeface="Arial" pitchFamily="34" charset="0"/>
-                <a:cs typeface="Arial" pitchFamily="34" charset="0"/>
-              </a:rPr>
-              <a:t>	SQLiteSpy </a:t>
-            </a:r>
-          </a:p>
-          <a:p>
-            <a:r>
-              <a:rPr lang="en-US" altLang="zh-CN" sz="3600" dirty="0" smtClean="0">
-                <a:latin typeface="Arial" pitchFamily="34" charset="0"/>
-                <a:cs typeface="Arial" pitchFamily="34" charset="0"/>
-              </a:rPr>
-              <a:t>	Source Insight</a:t>
-            </a:r>
-            <a:endParaRPr lang="zh-CN" altLang="en-US" sz="3600" dirty="0">
-              <a:latin typeface="Arial" pitchFamily="34" charset="0"/>
-              <a:cs typeface="Arial" pitchFamily="34" charset="0"/>
-            </a:endParaRPr>
+            <a:off x="428596" y="1785926"/>
+            <a:ext cx="8229600" cy="3757625"/>
+          </a:xfrm>
+        </p:spPr>
+        <p:txBody>
+          <a:bodyPr/>
+          <a:lstStyle/>
+          <a:p>
+            <a:r>
+              <a:rPr lang="zh-CN" altLang="en-US" dirty="0" smtClean="0"/>
+              <a:t>日常：</a:t>
+            </a:r>
+            <a:r>
+              <a:rPr lang="en-US" altLang="zh-CN" dirty="0" smtClean="0"/>
+              <a:t>patch/BUG</a:t>
+            </a:r>
+            <a:r>
+              <a:rPr lang="zh-CN" altLang="en-US" dirty="0" smtClean="0"/>
+              <a:t>处理 </a:t>
+            </a:r>
+            <a:endParaRPr lang="en-US" altLang="zh-CN" dirty="0" smtClean="0"/>
+          </a:p>
+          <a:p>
+            <a:pPr>
+              <a:buNone/>
+            </a:pPr>
+            <a:r>
+              <a:rPr lang="en-US" altLang="zh-CN" dirty="0" smtClean="0"/>
+              <a:t>		       </a:t>
+            </a:r>
+            <a:r>
+              <a:rPr lang="zh-CN" altLang="en-US" dirty="0" smtClean="0"/>
+              <a:t>缅甸文超长字符串处理</a:t>
+            </a:r>
+            <a:endParaRPr lang="en-US" altLang="zh-CN" dirty="0" smtClean="0"/>
+          </a:p>
+          <a:p>
+            <a:pPr>
+              <a:buNone/>
+            </a:pPr>
+            <a:r>
+              <a:rPr lang="en-US" altLang="zh-CN" dirty="0" smtClean="0"/>
+              <a:t>		       </a:t>
+            </a:r>
+            <a:r>
+              <a:rPr lang="zh-CN" altLang="en-US" dirty="0" smtClean="0"/>
+              <a:t>源码阅读与文档整理</a:t>
+            </a:r>
+            <a:endParaRPr lang="en-US" altLang="zh-CN" dirty="0" smtClean="0"/>
+          </a:p>
+          <a:p>
+            <a:r>
+              <a:rPr lang="zh-CN" altLang="en-US" dirty="0" smtClean="0"/>
+              <a:t>学习：</a:t>
+            </a:r>
+            <a:r>
+              <a:rPr lang="en-US" altLang="zh-CN" dirty="0" smtClean="0"/>
+              <a:t>Android&amp;Java / OpenGL / Git</a:t>
+            </a:r>
+          </a:p>
+          <a:p>
+            <a:r>
+              <a:rPr lang="zh-CN" altLang="en-US" dirty="0" smtClean="0"/>
+              <a:t>专利：文档书写、想法记录</a:t>
+            </a:r>
+            <a:endParaRPr lang="en-US" altLang="zh-CN" dirty="0" smtClean="0"/>
+          </a:p>
+          <a:p>
+            <a:endParaRPr lang="zh-CN" altLang="en-US" dirty="0"/>
           </a:p>
         </p:txBody>
       </p:sp>
@@ -4243,7 +5341,12 @@
             <p:ph type="title"/>
           </p:nvPr>
         </p:nvSpPr>
-        <p:spPr/>
+        <p:spPr>
+          <a:xfrm>
+            <a:off x="428596" y="642918"/>
+            <a:ext cx="8229600" cy="1143000"/>
+          </a:xfrm>
+        </p:spPr>
         <p:txBody>
           <a:bodyPr>
             <a:normAutofit/>
@@ -4275,7 +5378,12 @@
             <p:ph idx="1"/>
           </p:nvPr>
         </p:nvSpPr>
-        <p:spPr/>
+        <p:spPr>
+          <a:xfrm>
+            <a:off x="500034" y="2071678"/>
+            <a:ext cx="8229600" cy="1828799"/>
+          </a:xfrm>
+        </p:spPr>
         <p:txBody>
           <a:bodyPr>
             <a:normAutofit/>
@@ -4286,99 +5394,18 @@
               <a:rPr lang="zh-CN" altLang="en-US" sz="3600" dirty="0" smtClean="0">
                 <a:latin typeface="+mn-ea"/>
               </a:rPr>
-              <a:t>前期实践：照片查看器（主要方法流程）去掉或合并到</a:t>
-            </a:r>
-            <a:r>
-              <a:rPr lang="en-US" altLang="zh-CN" sz="3600" dirty="0" smtClean="0">
-                <a:latin typeface="+mn-ea"/>
-              </a:rPr>
-              <a:t>2</a:t>
-            </a:r>
+              <a:t>模块学习（主要）</a:t>
+            </a:r>
+            <a:endParaRPr lang="en-US" altLang="zh-CN" sz="3600" dirty="0" smtClean="0">
+              <a:latin typeface="+mn-ea"/>
+            </a:endParaRPr>
           </a:p>
           <a:p>
             <a:r>
               <a:rPr lang="zh-CN" altLang="en-US" sz="3600" dirty="0" smtClean="0">
                 <a:latin typeface="+mn-ea"/>
               </a:rPr>
-              <a:t>源码阅读：结合</a:t>
-            </a:r>
-            <a:r>
-              <a:rPr lang="en-US" altLang="zh-CN" sz="3600" dirty="0" smtClean="0">
-                <a:latin typeface="Arial" pitchFamily="34" charset="0"/>
-                <a:cs typeface="Arial" pitchFamily="34" charset="0"/>
-              </a:rPr>
-              <a:t>UML</a:t>
-            </a:r>
-            <a:r>
-              <a:rPr lang="zh-CN" altLang="en-US" sz="3600" dirty="0" smtClean="0">
-                <a:latin typeface="+mn-ea"/>
-              </a:rPr>
-              <a:t>图说明主要模块的实现</a:t>
-            </a:r>
-            <a:endParaRPr lang="en-US" altLang="zh-CN" sz="3600" dirty="0" smtClean="0">
-              <a:latin typeface="+mn-ea"/>
-            </a:endParaRPr>
-          </a:p>
-          <a:p>
-            <a:r>
-              <a:rPr lang="zh-CN" altLang="en-US" sz="3600" dirty="0" smtClean="0">
-                <a:latin typeface="+mn-ea"/>
-              </a:rPr>
-              <a:t>拓展学习：其他技能（</a:t>
-            </a:r>
-            <a:r>
-              <a:rPr lang="en-US" altLang="zh-CN" sz="3600" dirty="0" smtClean="0">
-                <a:latin typeface="Arial" pitchFamily="34" charset="0"/>
-                <a:cs typeface="Arial" pitchFamily="34" charset="0"/>
-              </a:rPr>
-              <a:t>patch/</a:t>
-            </a:r>
-            <a:r>
-              <a:rPr lang="zh-CN" altLang="en-US" sz="3600" dirty="0" smtClean="0">
-                <a:latin typeface="+mn-ea"/>
-              </a:rPr>
-              <a:t>工具使用</a:t>
-            </a:r>
-            <a:r>
-              <a:rPr lang="en-US" altLang="zh-CN" sz="3600" dirty="0" smtClean="0">
-                <a:latin typeface="Arial" pitchFamily="34" charset="0"/>
-                <a:cs typeface="Arial" pitchFamily="34" charset="0"/>
-              </a:rPr>
-              <a:t>/</a:t>
-            </a:r>
-            <a:r>
-              <a:rPr lang="en-US" altLang="zh-CN" sz="3600" dirty="0" err="1" smtClean="0">
-                <a:latin typeface="Arial" pitchFamily="34" charset="0"/>
-                <a:cs typeface="Arial" pitchFamily="34" charset="0"/>
-              </a:rPr>
-              <a:t>git&amp;github</a:t>
-            </a:r>
-            <a:r>
-              <a:rPr lang="en-US" altLang="zh-CN" sz="3600" dirty="0" smtClean="0">
-                <a:latin typeface="Arial" pitchFamily="34" charset="0"/>
-                <a:cs typeface="Arial" pitchFamily="34" charset="0"/>
-              </a:rPr>
-              <a:t>/</a:t>
-            </a:r>
-            <a:r>
-              <a:rPr lang="en-US" altLang="zh-CN" sz="3600" dirty="0" err="1" smtClean="0">
-                <a:latin typeface="Arial" pitchFamily="34" charset="0"/>
-                <a:cs typeface="Arial" pitchFamily="34" charset="0"/>
-              </a:rPr>
-              <a:t>opengl</a:t>
-            </a:r>
-            <a:r>
-              <a:rPr lang="en-US" altLang="zh-CN" sz="3600" dirty="0" smtClean="0">
-                <a:latin typeface="Arial" pitchFamily="34" charset="0"/>
-                <a:cs typeface="Arial" pitchFamily="34" charset="0"/>
-              </a:rPr>
-              <a:t>/</a:t>
-            </a:r>
-            <a:r>
-              <a:rPr lang="zh-CN" altLang="en-US" sz="3600" dirty="0" smtClean="0">
-                <a:latin typeface="+mn-ea"/>
-              </a:rPr>
-              <a:t>等）</a:t>
+              <a:t>其他工作</a:t>
             </a:r>
             <a:endParaRPr lang="zh-CN" altLang="en-US" sz="3600" dirty="0">
               <a:latin typeface="+mn-ea"/>
@@ -4428,45 +5455,56 @@
             <p:ph type="title"/>
           </p:nvPr>
         </p:nvSpPr>
-        <p:spPr/>
+        <p:spPr>
+          <a:xfrm>
+            <a:off x="428596" y="642918"/>
+            <a:ext cx="8229600" cy="1143000"/>
+          </a:xfrm>
+        </p:spPr>
+        <p:txBody>
+          <a:bodyPr>
+            <a:normAutofit/>
+          </a:bodyPr>
+          <a:lstStyle/>
+          <a:p>
+            <a:pPr algn="l"/>
+            <a:r>
+              <a:rPr lang="zh-CN" altLang="en-US" sz="4000" b="1" dirty="0" smtClean="0">
+                <a:latin typeface="黑体" pitchFamily="49" charset="-122"/>
+                <a:ea typeface="黑体" pitchFamily="49" charset="-122"/>
+              </a:rPr>
+              <a:t>模块学习</a:t>
+            </a:r>
+            <a:endParaRPr lang="zh-CN" altLang="en-US" sz="4000" b="1" dirty="0">
+              <a:latin typeface="黑体" pitchFamily="49" charset="-122"/>
+              <a:ea typeface="黑体" pitchFamily="49" charset="-122"/>
+            </a:endParaRPr>
+          </a:p>
+        </p:txBody>
+      </p:sp>
+      <p:sp>
+        <p:nvSpPr>
+          <p:cNvPr id="3" name="内容占位符 2"/>
+          <p:cNvSpPr>
+            <a:spLocks noGrp="1"/>
+          </p:cNvSpPr>
+          <p:nvPr>
+            <p:ph idx="1"/>
+          </p:nvPr>
+        </p:nvSpPr>
+        <p:spPr>
+          <a:xfrm>
+            <a:off x="428596" y="1785926"/>
+            <a:ext cx="8229600" cy="3757625"/>
+          </a:xfrm>
+        </p:spPr>
         <p:txBody>
           <a:bodyPr/>
           <a:lstStyle/>
           <a:p>
             <a:r>
               <a:rPr lang="zh-CN" altLang="en-US" dirty="0" smtClean="0"/>
-              <a:t>模块学习</a:t>
-            </a:r>
-            <a:endParaRPr lang="zh-CN" altLang="en-US" dirty="0"/>
-          </a:p>
-        </p:txBody>
-      </p:sp>
-      <p:sp>
-        <p:nvSpPr>
-          <p:cNvPr id="3" name="内容占位符 2"/>
-          <p:cNvSpPr>
-            <a:spLocks noGrp="1"/>
-          </p:cNvSpPr>
-          <p:nvPr>
-            <p:ph idx="1"/>
-          </p:nvPr>
-        </p:nvSpPr>
-        <p:spPr/>
-        <p:txBody>
-          <a:bodyPr/>
-          <a:lstStyle/>
-          <a:p>
-            <a:r>
-              <a:rPr lang="zh-CN" altLang="en-US" dirty="0" smtClean="0"/>
-              <a:t>主体结构与</a:t>
-            </a:r>
-            <a:r>
-              <a:rPr lang="zh-CN" altLang="en-US" dirty="0" smtClean="0"/>
-              <a:t>界</a:t>
-            </a:r>
-            <a:r>
-              <a:rPr lang="zh-CN" altLang="en-US" dirty="0" smtClean="0"/>
-              <a:t>面管理</a:t>
+              <a:t>主体结构与界面管理</a:t>
             </a:r>
             <a:endParaRPr lang="en-US" altLang="zh-CN" dirty="0" smtClean="0"/>
           </a:p>
@@ -4476,7 +5514,7 @@
               <a:t>数据获取（以</a:t>
             </a:r>
             <a:r>
-              <a:rPr lang="en-US" altLang="zh-CN" dirty="0" err="1" smtClean="0"/>
+              <a:rPr lang="en-US" altLang="zh-CN" dirty="0" smtClean="0"/>
               <a:t>VivoAlbumSetPage</a:t>
             </a:r>
             <a:r>
@@ -4488,18 +5526,21 @@
           <a:p>
             <a:r>
               <a:rPr lang="zh-CN" altLang="en-US" dirty="0" smtClean="0"/>
-              <a:t>选择管理</a:t>
+              <a:t>按钮状态改变与选择管理</a:t>
             </a:r>
             <a:endParaRPr lang="en-US" altLang="zh-CN" dirty="0" smtClean="0"/>
           </a:p>
           <a:p>
             <a:r>
               <a:rPr lang="zh-CN" altLang="en-US" dirty="0" smtClean="0"/>
-              <a:t>图片</a:t>
-            </a:r>
+              <a:t>图片数据库结构（连拍与时间检索）</a:t>
+            </a:r>
+            <a:endParaRPr lang="en-US" altLang="zh-CN" dirty="0" smtClean="0"/>
+          </a:p>
+          <a:p>
             <a:r>
               <a:rPr lang="zh-CN" altLang="en-US" dirty="0" smtClean="0"/>
-              <a:t>数据库结构</a:t>
+              <a:t>照片编辑与手势操作</a:t>
             </a:r>
             <a:endParaRPr lang="en-US" altLang="zh-CN" dirty="0" smtClean="0"/>
           </a:p>
@@ -4555,8 +5596,8 @@
         </p:nvSpPr>
         <p:spPr>
           <a:xfrm>
-            <a:off x="214282" y="214290"/>
-            <a:ext cx="6615130" cy="654032"/>
+            <a:off x="285720" y="642918"/>
+            <a:ext cx="6615130" cy="571504"/>
           </a:xfrm>
         </p:spPr>
         <p:txBody>
@@ -4594,8 +5635,8 @@
         </p:blipFill>
         <p:spPr bwMode="auto">
           <a:xfrm>
-            <a:off x="262340" y="928670"/>
-            <a:ext cx="8881660" cy="5929330"/>
+            <a:off x="785786" y="1142984"/>
+            <a:ext cx="7572428" cy="5055298"/>
           </a:xfrm>
           <a:prstGeom prst="rect">
             <a:avLst/>
@@ -4647,8 +5688,8 @@
         </p:nvSpPr>
         <p:spPr>
           <a:xfrm>
-            <a:off x="285720" y="214290"/>
-            <a:ext cx="6615130" cy="654032"/>
+            <a:off x="285720" y="642918"/>
+            <a:ext cx="6615130" cy="582594"/>
           </a:xfrm>
         </p:spPr>
         <p:txBody>
@@ -4682,8 +5723,8 @@
           <p:nvPr/>
         </p:nvGraphicFramePr>
         <p:xfrm>
-          <a:off x="928662" y="1071546"/>
-          <a:ext cx="7072362" cy="4286280"/>
+          <a:off x="928662" y="1214422"/>
+          <a:ext cx="6929486" cy="4000528"/>
         </p:xfrm>
         <a:graphic>
           <a:graphicData uri="http://schemas.openxmlformats.org/drawingml/2006/table">
@@ -4692,10 +5733,10 @@
                 <a:tableStyleId>{5C22544A-7EE6-4342-B048-85BDC9FD1C3A}</a:tableStyleId>
               </a:tblPr>
               <a:tblGrid>
-                <a:gridCol w="3536181"/>
-                <a:gridCol w="3536181"/>
+                <a:gridCol w="3464743"/>
+                <a:gridCol w="3464743"/>
               </a:tblGrid>
-              <a:tr h="535785">
+              <a:tr h="500066">
                 <a:tc>
                   <a:txBody>
                     <a:bodyPr/>
@@ -4703,10 +5744,10 @@
                     <a:p>
                       <a:pPr algn="ctr"/>
                       <a:r>
-                        <a:rPr lang="en-US" altLang="zh-CN" dirty="0" smtClean="0"/>
+                        <a:rPr lang="en-US" altLang="zh-CN" sz="1900" dirty="0" smtClean="0"/>
                         <a:t>Key</a:t>
                       </a:r>
-                      <a:endParaRPr lang="zh-CN" altLang="en-US" dirty="0"/>
+                      <a:endParaRPr lang="zh-CN" altLang="en-US" sz="1900" dirty="0"/>
                     </a:p>
                   </a:txBody>
                   <a:tcPr/>
@@ -4718,16 +5759,16 @@
                     <a:p>
                       <a:pPr algn="ctr"/>
                       <a:r>
-                        <a:rPr lang="en-US" altLang="zh-CN" dirty="0" smtClean="0"/>
+                        <a:rPr lang="en-US" altLang="zh-CN" sz="1900" dirty="0" smtClean="0"/>
                         <a:t>data</a:t>
                       </a:r>
-                      <a:endParaRPr lang="zh-CN" altLang="en-US" dirty="0"/>
+                      <a:endParaRPr lang="zh-CN" altLang="en-US" sz="1900" dirty="0"/>
                     </a:p>
                   </a:txBody>
                   <a:tcPr/>
                 </a:tc>
               </a:tr>
-              <a:tr h="535785">
+              <a:tr h="500066">
                 <a:tc>
                   <a:txBody>
                     <a:bodyPr/>
@@ -4767,7 +5808,7 @@
                   <a:tcPr marL="9525" marR="9525" marT="9525" marB="0" anchor="ctr"/>
                 </a:tc>
               </a:tr>
-              <a:tr h="535785">
+              <a:tr h="500066">
                 <a:tc>
                   <a:txBody>
                     <a:bodyPr/>
@@ -4807,7 +5848,7 @@
                   <a:tcPr marL="9525" marR="9525" marT="9525" marB="0" anchor="ctr"/>
                 </a:tc>
               </a:tr>
-              <a:tr h="535785">
+              <a:tr h="500066">
                 <a:tc>
                   <a:txBody>
                     <a:bodyPr/>
@@ -4847,7 +5888,7 @@
                   <a:tcPr marL="9525" marR="9525" marT="9525" marB="0" anchor="ctr"/>
                 </a:tc>
               </a:tr>
-              <a:tr h="535785">
+              <a:tr h="500066">
                 <a:tc>
                   <a:txBody>
                     <a:bodyPr/>
@@ -4887,7 +5928,7 @@
                   <a:tcPr marL="9525" marR="9525" marT="9525" marB="0" anchor="ctr"/>
                 </a:tc>
               </a:tr>
-              <a:tr h="535785">
+              <a:tr h="500066">
                 <a:tc>
                   <a:txBody>
                     <a:bodyPr/>
@@ -4927,7 +5968,7 @@
                   <a:tcPr marL="9525" marR="9525" marT="9525" marB="0" anchor="ctr"/>
                 </a:tc>
               </a:tr>
-              <a:tr h="535785">
+              <a:tr h="500066">
                 <a:tc>
                   <a:txBody>
                     <a:bodyPr/>
@@ -4967,7 +6008,7 @@
                   <a:tcPr marL="9525" marR="9525" marT="9525" marB="0" anchor="ctr"/>
                 </a:tc>
               </a:tr>
-              <a:tr h="535785">
+              <a:tr h="500066">
                 <a:tc>
                   <a:txBody>
                     <a:bodyPr/>
@@ -5011,25 +6052,666 @@
           </a:graphicData>
         </a:graphic>
       </p:graphicFrame>
+    </p:spTree>
+  </p:cSld>
+  <p:clrMapOvr>
+    <a:masterClrMapping/>
+  </p:clrMapOvr>
+  <p:timing>
+    <p:tnLst>
+      <p:par>
+        <p:cTn id="1" dur="indefinite" restart="never" nodeType="tmRoot"/>
+      </p:par>
+    </p:tnLst>
+  </p:timing>
+</p:sld>
+</file>
+
+<file path=ppt/slides/slide6.xml><?xml version="1.0" encoding="utf-8"?>
+<p:sld xmlns:a="http://schemas.openxmlformats.org/drawingml/2006/main" xmlns:r="http://schemas.openxmlformats.org/officeDocument/2006/relationships" xmlns:p="http://schemas.openxmlformats.org/presentationml/2006/main">
+  <p:cSld>
+    <p:spTree>
+      <p:nvGrpSpPr>
+        <p:cNvPr id="1" name=""/>
+        <p:cNvGrpSpPr/>
+        <p:nvPr/>
+      </p:nvGrpSpPr>
+      <p:grpSpPr>
+        <a:xfrm>
+          <a:off x="0" y="0"/>
+          <a:ext cx="0" cy="0"/>
+          <a:chOff x="0" y="0"/>
+          <a:chExt cx="0" cy="0"/>
+        </a:xfrm>
+      </p:grpSpPr>
+      <p:sp>
+        <p:nvSpPr>
+          <p:cNvPr id="2" name="标题 1"/>
+          <p:cNvSpPr>
+            <a:spLocks noGrp="1"/>
+          </p:cNvSpPr>
+          <p:nvPr>
+            <p:ph type="title"/>
+          </p:nvPr>
+        </p:nvSpPr>
+        <p:spPr>
+          <a:xfrm>
+            <a:off x="285720" y="642918"/>
+            <a:ext cx="6615130" cy="571504"/>
+          </a:xfrm>
+        </p:spPr>
+        <p:txBody>
+          <a:bodyPr>
+            <a:normAutofit/>
+          </a:bodyPr>
+          <a:lstStyle/>
+          <a:p>
+            <a:pPr algn="l">
+              <a:buFont typeface="Wingdings" pitchFamily="2" charset="2"/>
+              <a:buChar char="l"/>
+            </a:pPr>
+            <a:r>
+              <a:rPr lang="zh-CN" altLang="en-US" sz="2400" dirty="0" smtClean="0"/>
+              <a:t>数据获取</a:t>
+            </a:r>
+            <a:r>
+              <a:rPr lang="en-US" altLang="zh-CN" sz="2400" dirty="0" smtClean="0"/>
+              <a:t>: PathMatcher</a:t>
+            </a:r>
+            <a:endParaRPr lang="zh-CN" altLang="en-US" sz="2400" dirty="0"/>
+          </a:p>
+        </p:txBody>
+      </p:sp>
+      <p:sp>
+        <p:nvSpPr>
+          <p:cNvPr id="4" name="TextBox 3"/>
+          <p:cNvSpPr txBox="1"/>
+          <p:nvPr/>
+        </p:nvSpPr>
+        <p:spPr>
+          <a:xfrm>
+            <a:off x="1000100" y="1285860"/>
+            <a:ext cx="4929222" cy="461665"/>
+          </a:xfrm>
+          <a:prstGeom prst="rect">
+            <a:avLst/>
+          </a:prstGeom>
+          <a:noFill/>
+        </p:spPr>
+        <p:txBody>
+          <a:bodyPr wrap="square" rtlCol="0">
+            <a:spAutoFit/>
+          </a:bodyPr>
+          <a:lstStyle/>
+          <a:p>
+            <a:r>
+              <a:rPr lang="en-US" altLang="zh-CN" sz="2400" dirty="0" smtClean="0"/>
+              <a:t>add(String pattern, int kind)</a:t>
+            </a:r>
+            <a:endParaRPr lang="zh-CN" altLang="en-US" sz="2400" dirty="0"/>
+          </a:p>
+        </p:txBody>
+      </p:sp>
+      <p:sp>
+        <p:nvSpPr>
+          <p:cNvPr id="5" name="椭圆 4"/>
+          <p:cNvSpPr/>
+          <p:nvPr/>
+        </p:nvSpPr>
+        <p:spPr>
+          <a:xfrm>
+            <a:off x="1500166" y="1857364"/>
+            <a:ext cx="1285884" cy="857256"/>
+          </a:xfrm>
+          <a:prstGeom prst="ellipse">
+            <a:avLst/>
+          </a:prstGeom>
+        </p:spPr>
+        <p:style>
+          <a:lnRef idx="2">
+            <a:schemeClr val="accent1">
+              <a:shade val="50000"/>
+            </a:schemeClr>
+          </a:lnRef>
+          <a:fillRef idx="1">
+            <a:schemeClr val="accent1"/>
+          </a:fillRef>
+          <a:effectRef idx="0">
+            <a:schemeClr val="accent1"/>
+          </a:effectRef>
+          <a:fontRef idx="minor">
+            <a:schemeClr val="lt1"/>
+          </a:fontRef>
+        </p:style>
+        <p:txBody>
+          <a:bodyPr rtlCol="0" anchor="ctr"/>
+          <a:lstStyle/>
+          <a:p>
+            <a:pPr algn="ctr"/>
+            <a:r>
+              <a:rPr lang="en-US" altLang="zh-CN" dirty="0" smtClean="0"/>
+              <a:t>mRoot</a:t>
+            </a:r>
+            <a:endParaRPr lang="zh-CN" altLang="en-US" dirty="0"/>
+          </a:p>
+        </p:txBody>
+      </p:sp>
+      <p:cxnSp>
+        <p:nvCxnSpPr>
+          <p:cNvPr id="7" name="直接连接符 6"/>
+          <p:cNvCxnSpPr>
+            <a:stCxn id="5" idx="4"/>
+            <a:endCxn id="11" idx="0"/>
+          </p:cNvCxnSpPr>
+          <p:nvPr/>
+        </p:nvCxnSpPr>
+        <p:spPr>
+          <a:xfrm rot="5400000">
+            <a:off x="2035951" y="2821777"/>
+            <a:ext cx="214314" cy="1588"/>
+          </a:xfrm>
+          <a:prstGeom prst="line">
+            <a:avLst/>
+          </a:prstGeom>
+        </p:spPr>
+        <p:style>
+          <a:lnRef idx="1">
+            <a:schemeClr val="accent1"/>
+          </a:lnRef>
+          <a:fillRef idx="0">
+            <a:schemeClr val="accent1"/>
+          </a:fillRef>
+          <a:effectRef idx="0">
+            <a:schemeClr val="accent1"/>
+          </a:effectRef>
+          <a:fontRef idx="minor">
+            <a:schemeClr val="tx1"/>
+          </a:fontRef>
+        </p:style>
+      </p:cxnSp>
+      <p:sp>
+        <p:nvSpPr>
+          <p:cNvPr id="10" name="TextBox 9"/>
+          <p:cNvSpPr txBox="1"/>
+          <p:nvPr/>
+        </p:nvSpPr>
+        <p:spPr>
+          <a:xfrm>
+            <a:off x="3143240" y="1714488"/>
+            <a:ext cx="5786478" cy="707886"/>
+          </a:xfrm>
+          <a:prstGeom prst="rect">
+            <a:avLst/>
+          </a:prstGeom>
+          <a:noFill/>
+        </p:spPr>
+        <p:txBody>
+          <a:bodyPr wrap="square" rtlCol="0">
+            <a:spAutoFit/>
+          </a:bodyPr>
+          <a:lstStyle/>
+          <a:p>
+            <a:r>
+              <a:rPr lang="en-US" altLang="zh-CN" sz="2000" dirty="0" err="1" smtClean="0"/>
+              <a:t>mMatcher.add</a:t>
+            </a:r>
+            <a:r>
+              <a:rPr lang="en-US" altLang="zh-CN" sz="2000" dirty="0" smtClean="0"/>
+              <a:t>("/combo/*", COMBO_ALBUMSET);</a:t>
+            </a:r>
+          </a:p>
+          <a:p>
+            <a:r>
+              <a:rPr lang="en-US" altLang="zh-CN" sz="2000" dirty="0" err="1" smtClean="0"/>
+              <a:t>mMatcher.add</a:t>
+            </a:r>
+            <a:r>
+              <a:rPr lang="en-US" altLang="zh-CN" sz="2000" dirty="0" smtClean="0"/>
+              <a:t>("/combo/*/*", COMBO_ALBUM);</a:t>
+            </a:r>
+            <a:endParaRPr lang="zh-CN" altLang="en-US" sz="2000" dirty="0"/>
+          </a:p>
+        </p:txBody>
+      </p:sp>
+      <p:sp>
+        <p:nvSpPr>
+          <p:cNvPr id="11" name="椭圆 10"/>
+          <p:cNvSpPr/>
+          <p:nvPr/>
+        </p:nvSpPr>
+        <p:spPr>
+          <a:xfrm>
+            <a:off x="1428728" y="2928934"/>
+            <a:ext cx="1428760" cy="857256"/>
+          </a:xfrm>
+          <a:prstGeom prst="ellipse">
+            <a:avLst/>
+          </a:prstGeom>
+        </p:spPr>
+        <p:style>
+          <a:lnRef idx="2">
+            <a:schemeClr val="accent1">
+              <a:shade val="50000"/>
+            </a:schemeClr>
+          </a:lnRef>
+          <a:fillRef idx="1">
+            <a:schemeClr val="accent1"/>
+          </a:fillRef>
+          <a:effectRef idx="0">
+            <a:schemeClr val="accent1"/>
+          </a:effectRef>
+          <a:fontRef idx="minor">
+            <a:schemeClr val="lt1"/>
+          </a:fontRef>
+        </p:style>
+        <p:txBody>
+          <a:bodyPr rtlCol="0" anchor="ctr"/>
+          <a:lstStyle/>
+          <a:p>
+            <a:pPr algn="ctr"/>
+            <a:r>
+              <a:rPr lang="en-US" altLang="zh-CN" dirty="0" smtClean="0"/>
+              <a:t>combo</a:t>
+            </a:r>
+            <a:endParaRPr lang="zh-CN" altLang="en-US" dirty="0"/>
+          </a:p>
+        </p:txBody>
+      </p:sp>
+      <p:sp>
+        <p:nvSpPr>
+          <p:cNvPr id="16" name="椭圆 15"/>
+          <p:cNvSpPr/>
+          <p:nvPr/>
+        </p:nvSpPr>
+        <p:spPr>
+          <a:xfrm>
+            <a:off x="1428728" y="4286256"/>
+            <a:ext cx="1428760" cy="857256"/>
+          </a:xfrm>
+          <a:prstGeom prst="ellipse">
+            <a:avLst/>
+          </a:prstGeom>
+        </p:spPr>
+        <p:style>
+          <a:lnRef idx="2">
+            <a:schemeClr val="accent1">
+              <a:shade val="50000"/>
+            </a:schemeClr>
+          </a:lnRef>
+          <a:fillRef idx="1">
+            <a:schemeClr val="accent1"/>
+          </a:fillRef>
+          <a:effectRef idx="0">
+            <a:schemeClr val="accent1"/>
+          </a:effectRef>
+          <a:fontRef idx="minor">
+            <a:schemeClr val="lt1"/>
+          </a:fontRef>
+        </p:style>
+        <p:txBody>
+          <a:bodyPr rtlCol="0" anchor="ctr"/>
+          <a:lstStyle/>
+          <a:p>
+            <a:pPr algn="ctr"/>
+            <a:r>
+              <a:rPr lang="en-US" altLang="zh-CN" dirty="0" smtClean="0"/>
+              <a:t>*</a:t>
+            </a:r>
+            <a:endParaRPr lang="zh-CN" altLang="en-US" dirty="0"/>
+          </a:p>
+        </p:txBody>
+      </p:sp>
+      <p:sp>
+        <p:nvSpPr>
+          <p:cNvPr id="17" name="椭圆 16"/>
+          <p:cNvSpPr/>
+          <p:nvPr/>
+        </p:nvSpPr>
+        <p:spPr>
+          <a:xfrm>
+            <a:off x="1428728" y="5429264"/>
+            <a:ext cx="1428760" cy="857256"/>
+          </a:xfrm>
+          <a:prstGeom prst="ellipse">
+            <a:avLst/>
+          </a:prstGeom>
+        </p:spPr>
+        <p:style>
+          <a:lnRef idx="2">
+            <a:schemeClr val="accent1">
+              <a:shade val="50000"/>
+            </a:schemeClr>
+          </a:lnRef>
+          <a:fillRef idx="1">
+            <a:schemeClr val="accent1"/>
+          </a:fillRef>
+          <a:effectRef idx="0">
+            <a:schemeClr val="accent1"/>
+          </a:effectRef>
+          <a:fontRef idx="minor">
+            <a:schemeClr val="lt1"/>
+          </a:fontRef>
+        </p:style>
+        <p:txBody>
+          <a:bodyPr rtlCol="0" anchor="ctr"/>
+          <a:lstStyle/>
+          <a:p>
+            <a:pPr algn="ctr"/>
+            <a:r>
+              <a:rPr lang="en-US" altLang="zh-CN" dirty="0" smtClean="0"/>
+              <a:t>*</a:t>
+            </a:r>
+            <a:endParaRPr lang="zh-CN" altLang="en-US" dirty="0"/>
+          </a:p>
+        </p:txBody>
+      </p:sp>
+      <p:cxnSp>
+        <p:nvCxnSpPr>
+          <p:cNvPr id="19" name="直接连接符 18"/>
+          <p:cNvCxnSpPr>
+            <a:stCxn id="11" idx="4"/>
+            <a:endCxn id="16" idx="0"/>
+          </p:cNvCxnSpPr>
+          <p:nvPr/>
+        </p:nvCxnSpPr>
+        <p:spPr>
+          <a:xfrm rot="5400000">
+            <a:off x="1893075" y="4036223"/>
+            <a:ext cx="500066" cy="1588"/>
+          </a:xfrm>
+          <a:prstGeom prst="line">
+            <a:avLst/>
+          </a:prstGeom>
+        </p:spPr>
+        <p:style>
+          <a:lnRef idx="1">
+            <a:schemeClr val="accent1"/>
+          </a:lnRef>
+          <a:fillRef idx="0">
+            <a:schemeClr val="accent1"/>
+          </a:fillRef>
+          <a:effectRef idx="0">
+            <a:schemeClr val="accent1"/>
+          </a:effectRef>
+          <a:fontRef idx="minor">
+            <a:schemeClr val="tx1"/>
+          </a:fontRef>
+        </p:style>
+      </p:cxnSp>
+      <p:cxnSp>
+        <p:nvCxnSpPr>
+          <p:cNvPr id="21" name="直接连接符 20"/>
+          <p:cNvCxnSpPr>
+            <a:stCxn id="16" idx="4"/>
+            <a:endCxn id="17" idx="0"/>
+          </p:cNvCxnSpPr>
+          <p:nvPr/>
+        </p:nvCxnSpPr>
+        <p:spPr>
+          <a:xfrm rot="5400000">
+            <a:off x="2000232" y="5286388"/>
+            <a:ext cx="285752" cy="1588"/>
+          </a:xfrm>
+          <a:prstGeom prst="line">
+            <a:avLst/>
+          </a:prstGeom>
+        </p:spPr>
+        <p:style>
+          <a:lnRef idx="1">
+            <a:schemeClr val="accent1"/>
+          </a:lnRef>
+          <a:fillRef idx="0">
+            <a:schemeClr val="accent1"/>
+          </a:fillRef>
+          <a:effectRef idx="0">
+            <a:schemeClr val="accent1"/>
+          </a:effectRef>
+          <a:fontRef idx="minor">
+            <a:schemeClr val="tx1"/>
+          </a:fontRef>
+        </p:style>
+      </p:cxnSp>
+      <p:sp>
+        <p:nvSpPr>
+          <p:cNvPr id="22" name="矩形 21"/>
+          <p:cNvSpPr/>
+          <p:nvPr/>
+        </p:nvSpPr>
+        <p:spPr>
+          <a:xfrm>
+            <a:off x="3071802" y="4429132"/>
+            <a:ext cx="2357454" cy="571504"/>
+          </a:xfrm>
+          <a:prstGeom prst="rect">
+            <a:avLst/>
+          </a:prstGeom>
+        </p:spPr>
+        <p:style>
+          <a:lnRef idx="2">
+            <a:schemeClr val="accent1">
+              <a:shade val="50000"/>
+            </a:schemeClr>
+          </a:lnRef>
+          <a:fillRef idx="1">
+            <a:schemeClr val="accent1"/>
+          </a:fillRef>
+          <a:effectRef idx="0">
+            <a:schemeClr val="accent1"/>
+          </a:effectRef>
+          <a:fontRef idx="minor">
+            <a:schemeClr val="lt1"/>
+          </a:fontRef>
+        </p:style>
+        <p:txBody>
+          <a:bodyPr rtlCol="0" anchor="ctr"/>
+          <a:lstStyle/>
+          <a:p>
+            <a:pPr algn="ctr"/>
+            <a:r>
+              <a:rPr lang="en-US" altLang="zh-CN" dirty="0" smtClean="0"/>
+              <a:t>COMBO_ALBUMSET</a:t>
+            </a:r>
+            <a:endParaRPr lang="zh-CN" altLang="en-US" dirty="0"/>
+          </a:p>
+        </p:txBody>
+      </p:sp>
+      <p:sp>
+        <p:nvSpPr>
+          <p:cNvPr id="23" name="矩形 22"/>
+          <p:cNvSpPr/>
+          <p:nvPr/>
+        </p:nvSpPr>
+        <p:spPr>
+          <a:xfrm>
+            <a:off x="3071802" y="5572140"/>
+            <a:ext cx="2357454" cy="571504"/>
+          </a:xfrm>
+          <a:prstGeom prst="rect">
+            <a:avLst/>
+          </a:prstGeom>
+        </p:spPr>
+        <p:style>
+          <a:lnRef idx="2">
+            <a:schemeClr val="accent1">
+              <a:shade val="50000"/>
+            </a:schemeClr>
+          </a:lnRef>
+          <a:fillRef idx="1">
+            <a:schemeClr val="accent1"/>
+          </a:fillRef>
+          <a:effectRef idx="0">
+            <a:schemeClr val="accent1"/>
+          </a:effectRef>
+          <a:fontRef idx="minor">
+            <a:schemeClr val="lt1"/>
+          </a:fontRef>
+        </p:style>
+        <p:txBody>
+          <a:bodyPr rtlCol="0" anchor="ctr"/>
+          <a:lstStyle/>
+          <a:p>
+            <a:pPr algn="ctr"/>
+            <a:r>
+              <a:rPr lang="en-US" altLang="zh-CN" dirty="0" smtClean="0"/>
+              <a:t>COMBO_ALBUM</a:t>
+            </a:r>
+            <a:endParaRPr lang="zh-CN" altLang="en-US" dirty="0"/>
+          </a:p>
+        </p:txBody>
+      </p:sp>
+      <p:cxnSp>
+        <p:nvCxnSpPr>
+          <p:cNvPr id="25" name="直接连接符 24"/>
+          <p:cNvCxnSpPr>
+            <a:stCxn id="16" idx="6"/>
+            <a:endCxn id="22" idx="1"/>
+          </p:cNvCxnSpPr>
+          <p:nvPr/>
+        </p:nvCxnSpPr>
+        <p:spPr>
+          <a:xfrm>
+            <a:off x="2857488" y="4714886"/>
+            <a:ext cx="214314" cy="1588"/>
+          </a:xfrm>
+          <a:prstGeom prst="line">
+            <a:avLst/>
+          </a:prstGeom>
+        </p:spPr>
+        <p:style>
+          <a:lnRef idx="1">
+            <a:schemeClr val="accent1"/>
+          </a:lnRef>
+          <a:fillRef idx="0">
+            <a:schemeClr val="accent1"/>
+          </a:fillRef>
+          <a:effectRef idx="0">
+            <a:schemeClr val="accent1"/>
+          </a:effectRef>
+          <a:fontRef idx="minor">
+            <a:schemeClr val="tx1"/>
+          </a:fontRef>
+        </p:style>
+      </p:cxnSp>
+      <p:cxnSp>
+        <p:nvCxnSpPr>
+          <p:cNvPr id="29" name="直接连接符 28"/>
+          <p:cNvCxnSpPr>
+            <a:stCxn id="17" idx="6"/>
+            <a:endCxn id="23" idx="1"/>
+          </p:cNvCxnSpPr>
+          <p:nvPr/>
+        </p:nvCxnSpPr>
+        <p:spPr>
+          <a:xfrm>
+            <a:off x="2857488" y="5857892"/>
+            <a:ext cx="214314" cy="1588"/>
+          </a:xfrm>
+          <a:prstGeom prst="line">
+            <a:avLst/>
+          </a:prstGeom>
+        </p:spPr>
+        <p:style>
+          <a:lnRef idx="1">
+            <a:schemeClr val="accent1"/>
+          </a:lnRef>
+          <a:fillRef idx="0">
+            <a:schemeClr val="accent1"/>
+          </a:fillRef>
+          <a:effectRef idx="0">
+            <a:schemeClr val="accent1"/>
+          </a:effectRef>
+          <a:fontRef idx="minor">
+            <a:schemeClr val="tx1"/>
+          </a:fontRef>
+        </p:style>
+      </p:cxnSp>
+      <p:sp>
+        <p:nvSpPr>
+          <p:cNvPr id="31" name="TextBox 30"/>
+          <p:cNvSpPr txBox="1"/>
+          <p:nvPr/>
+        </p:nvSpPr>
+        <p:spPr>
+          <a:xfrm>
+            <a:off x="3214678" y="2428868"/>
+            <a:ext cx="4643470" cy="1938992"/>
+          </a:xfrm>
+          <a:prstGeom prst="rect">
+            <a:avLst/>
+          </a:prstGeom>
+          <a:noFill/>
+        </p:spPr>
+        <p:txBody>
+          <a:bodyPr wrap="square" rtlCol="0">
+            <a:spAutoFit/>
+          </a:bodyPr>
+          <a:lstStyle/>
+          <a:p>
+            <a:r>
+              <a:rPr lang="en-US" altLang="zh-CN" sz="2000" dirty="0" smtClean="0"/>
+              <a:t>switch (</a:t>
+            </a:r>
+            <a:r>
+              <a:rPr lang="en-US" altLang="zh-CN" sz="2000" dirty="0" err="1" smtClean="0"/>
+              <a:t>mMatcher.match</a:t>
+            </a:r>
+            <a:r>
+              <a:rPr lang="en-US" altLang="zh-CN" sz="2000" dirty="0" smtClean="0"/>
+              <a:t>(path)) {</a:t>
+            </a:r>
+          </a:p>
+          <a:p>
+            <a:r>
+              <a:rPr lang="en-US" altLang="zh-CN" sz="2000" dirty="0" smtClean="0"/>
+              <a:t>	case COMBO_ALBUMSET:</a:t>
+            </a:r>
+          </a:p>
+          <a:p>
+            <a:r>
+              <a:rPr lang="en-US" altLang="zh-CN" sz="2000" dirty="0" smtClean="0"/>
+              <a:t>		…</a:t>
+            </a:r>
+          </a:p>
+          <a:p>
+            <a:r>
+              <a:rPr lang="en-US" altLang="zh-CN" sz="2000" dirty="0" smtClean="0"/>
+              <a:t>	 case COMBO_ALBUM:</a:t>
+            </a:r>
+          </a:p>
+          <a:p>
+            <a:r>
+              <a:rPr lang="en-US" altLang="zh-CN" sz="2000" dirty="0" smtClean="0"/>
+              <a:t>		…</a:t>
+            </a:r>
+          </a:p>
+          <a:p>
+            <a:r>
+              <a:rPr lang="en-US" altLang="zh-CN" sz="2000" dirty="0" smtClean="0"/>
+              <a:t>}</a:t>
+            </a:r>
+            <a:endParaRPr lang="zh-CN" altLang="en-US" sz="2000" dirty="0"/>
+          </a:p>
+        </p:txBody>
+      </p:sp>
       <p:graphicFrame>
         <p:nvGraphicFramePr>
-          <p:cNvPr id="5" name="表格 4"/>
+          <p:cNvPr id="18" name="表格 17"/>
           <p:cNvGraphicFramePr>
             <a:graphicFrameLocks noGrp="1"/>
           </p:cNvGraphicFramePr>
           <p:nvPr/>
         </p:nvGraphicFramePr>
         <p:xfrm>
-          <a:off x="1357290" y="5572140"/>
-          <a:ext cx="6096000" cy="684578"/>
+          <a:off x="5715008" y="5072074"/>
+          <a:ext cx="3183080" cy="684578"/>
         </p:xfrm>
         <a:graphic>
           <a:graphicData uri="http://schemas.openxmlformats.org/drawingml/2006/table">
             <a:tbl>
               <a:tblPr/>
               <a:tblGrid>
-                <a:gridCol w="2249326"/>
-                <a:gridCol w="3846674"/>
+                <a:gridCol w="1259210"/>
+                <a:gridCol w="1923870"/>
               </a:tblGrid>
               <a:tr h="342289">
                 <a:tc>
@@ -5039,7 +6721,7 @@
                     <a:p>
                       <a:pPr algn="ctr" fontAlgn="ctr"/>
                       <a:r>
-                        <a:rPr lang="en-US" sz="1400" b="0" i="0" u="none" strike="noStrike" dirty="0">
+                        <a:rPr lang="en-US" sz="1500" b="0" i="0" u="none" strike="noStrike" dirty="0">
                           <a:solidFill>
                             <a:srgbClr val="000000"/>
                           </a:solidFill>
@@ -5049,7 +6731,7 @@
                       </a:r>
                     </a:p>
                   </a:txBody>
-                  <a:tcPr marL="8150" marR="8150" marT="8150" marB="0" anchor="ctr">
+                  <a:tcPr marL="8150" marR="8150" marT="8151" marB="0" anchor="ctr">
                     <a:lnL w="6350" cap="flat" cmpd="sng" algn="ctr">
                       <a:solidFill>
                         <a:srgbClr val="000000"/>
@@ -5098,7 +6780,7 @@
                     <a:p>
                       <a:pPr algn="ctr" fontAlgn="ctr"/>
                       <a:r>
-                        <a:rPr lang="en-US" sz="1400" b="1" i="0" u="none" strike="noStrike">
+                        <a:rPr lang="en-US" sz="1500" b="1" i="0" u="none" strike="noStrike" dirty="0" err="1">
                           <a:solidFill>
                             <a:srgbClr val="000000"/>
                           </a:solidFill>
@@ -5106,9 +6788,15 @@
                         </a:rPr>
                         <a:t>ComboAlbumSet</a:t>
                       </a:r>
+                      <a:endParaRPr lang="en-US" sz="1500" b="1" i="0" u="none" strike="noStrike" dirty="0">
+                        <a:solidFill>
+                          <a:srgbClr val="000000"/>
+                        </a:solidFill>
+                        <a:latin typeface="Calibri"/>
+                      </a:endParaRPr>
                     </a:p>
                   </a:txBody>
-                  <a:tcPr marL="8150" marR="8150" marT="8150" marB="0" anchor="ctr">
+                  <a:tcPr marL="8150" marR="8150" marT="8151" marB="0" anchor="ctr">
                     <a:lnL w="6350" cap="flat" cmpd="sng" algn="ctr">
                       <a:solidFill>
                         <a:srgbClr val="000000"/>
@@ -5159,7 +6847,7 @@
                     <a:p>
                       <a:pPr algn="ctr" fontAlgn="ctr"/>
                       <a:r>
-                        <a:rPr lang="en-US" sz="1400" b="0" i="0" u="none" strike="noStrike">
+                        <a:rPr lang="en-US" sz="1500" b="0" i="0" u="none" strike="noStrike">
                           <a:solidFill>
                             <a:srgbClr val="000000"/>
                           </a:solidFill>
@@ -5169,7 +6857,7 @@
                       </a:r>
                     </a:p>
                   </a:txBody>
-                  <a:tcPr marL="8150" marR="8150" marT="8150" marB="0" anchor="ctr">
+                  <a:tcPr marL="8150" marR="8150" marT="8151" marB="0" anchor="ctr">
                     <a:lnL w="6350" cap="flat" cmpd="sng" algn="ctr">
                       <a:solidFill>
                         <a:srgbClr val="000000"/>
@@ -5218,7 +6906,7 @@
                     <a:p>
                       <a:pPr algn="ctr" fontAlgn="ctr"/>
                       <a:r>
-                        <a:rPr lang="en-US" sz="1400" b="1" i="0" u="none" strike="noStrike" dirty="0">
+                        <a:rPr lang="en-US" sz="1500" b="1" i="0" u="none" strike="noStrike" dirty="0">
                           <a:solidFill>
                             <a:srgbClr val="000000"/>
                           </a:solidFill>
@@ -5228,7 +6916,7 @@
                       </a:r>
                     </a:p>
                   </a:txBody>
-                  <a:tcPr marL="8150" marR="8150" marT="8150" marB="0" anchor="ctr">
+                  <a:tcPr marL="8150" marR="8150" marT="8151" marB="0" anchor="ctr">
                     <a:lnL w="6350" cap="flat" cmpd="sng" algn="ctr">
                       <a:solidFill>
                         <a:srgbClr val="000000"/>
@@ -5290,7 +6978,7 @@
 </p:sld>
 </file>
 
-<file path=ppt/slides/slide6.xml><?xml version="1.0" encoding="utf-8"?>
+<file path=ppt/slides/slide7.xml><?xml version="1.0" encoding="utf-8"?>
 <p:sld xmlns:a="http://schemas.openxmlformats.org/drawingml/2006/main" xmlns:r="http://schemas.openxmlformats.org/officeDocument/2006/relationships" xmlns:p="http://schemas.openxmlformats.org/presentationml/2006/main">
   <p:cSld>
     <p:spTree>
@@ -5319,8 +7007,8 @@
         </p:nvSpPr>
         <p:spPr>
           <a:xfrm>
-            <a:off x="285720" y="214290"/>
-            <a:ext cx="6615130" cy="654032"/>
+            <a:off x="285720" y="642918"/>
+            <a:ext cx="6615130" cy="571504"/>
           </a:xfrm>
         </p:spPr>
         <p:txBody>
@@ -5347,43 +7035,13 @@
       </p:sp>
       <p:sp>
         <p:nvSpPr>
-          <p:cNvPr id="4" name="TextBox 3"/>
-          <p:cNvSpPr txBox="1"/>
-          <p:nvPr/>
-        </p:nvSpPr>
-        <p:spPr>
-          <a:xfrm>
-            <a:off x="428596" y="857232"/>
-            <a:ext cx="4929222" cy="461665"/>
-          </a:xfrm>
-          <a:prstGeom prst="rect">
-            <a:avLst/>
-          </a:prstGeom>
-          <a:noFill/>
-        </p:spPr>
-        <p:txBody>
-          <a:bodyPr wrap="square" rtlCol="0">
-            <a:spAutoFit/>
-          </a:bodyPr>
-          <a:lstStyle/>
-          <a:p>
-            <a:r>
-              <a:rPr lang="en-US" altLang="zh-CN" sz="2400" dirty="0" smtClean="0"/>
-              <a:t>add(String pattern, int kind)</a:t>
-            </a:r>
-            <a:endParaRPr lang="zh-CN" altLang="en-US" sz="2400" dirty="0"/>
-          </a:p>
-        </p:txBody>
-      </p:sp>
-      <p:sp>
-        <p:nvSpPr>
           <p:cNvPr id="5" name="椭圆 4"/>
           <p:cNvSpPr/>
           <p:nvPr/>
         </p:nvSpPr>
         <p:spPr>
           <a:xfrm>
-            <a:off x="1500166" y="1500174"/>
+            <a:off x="1500166" y="1857364"/>
             <a:ext cx="1285884" cy="857256"/>
           </a:xfrm>
           <a:prstGeom prst="ellipse">
@@ -5412,7 +7070,7 @@
           <a:p>
             <a:pPr algn="ctr"/>
             <a:r>
-              <a:rPr lang="en-US" altLang="zh-CN" dirty="0" err="1" smtClean="0"/>
+              <a:rPr lang="en-US" altLang="zh-CN" dirty="0" smtClean="0"/>
               <a:t>mRoot</a:t>
             </a:r>
             <a:endParaRPr lang="zh-CN" altLang="en-US" dirty="0"/>
@@ -5430,8 +7088,8 @@
         </p:nvCxnSpPr>
         <p:spPr>
           <a:xfrm rot="5400000">
-            <a:off x="1857356" y="2643182"/>
-            <a:ext cx="571504" cy="1588"/>
+            <a:off x="2035951" y="2821777"/>
+            <a:ext cx="214314" cy="1588"/>
           </a:xfrm>
           <a:prstGeom prst="line">
             <a:avLst/>
@@ -5460,8 +7118,8 @@
         </p:nvSpPr>
         <p:spPr>
           <a:xfrm>
-            <a:off x="3143240" y="1428736"/>
-            <a:ext cx="5786478" cy="707886"/>
+            <a:off x="1571604" y="1285860"/>
+            <a:ext cx="6357982" cy="400110"/>
           </a:xfrm>
           <a:prstGeom prst="rect">
             <a:avLst/>
@@ -5475,28 +7133,17 @@
           <a:lstStyle/>
           <a:p>
             <a:r>
-              <a:rPr lang="en-US" altLang="zh-CN" sz="2000" dirty="0" err="1" smtClean="0"/>
-              <a:t>mMatcher.add</a:t>
-            </a:r>
-            <a:r>
-              <a:rPr lang="en-US" altLang="zh-CN" sz="2000" dirty="0" smtClean="0"/>
-              <a:t>("/combo/*", COMBO_ALBUMSET</a:t>
-            </a:r>
-            <a:r>
-              <a:rPr lang="en-US" altLang="zh-CN" sz="2000" dirty="0" smtClean="0"/>
-              <a:t>);</a:t>
-            </a:r>
-          </a:p>
-          <a:p>
-            <a:r>
-              <a:rPr lang="en-US" altLang="zh-CN" sz="2000" dirty="0" err="1" smtClean="0"/>
-              <a:t>mMatcher.add</a:t>
-            </a:r>
-            <a:r>
-              <a:rPr lang="en-US" altLang="zh-CN" sz="2000" dirty="0" smtClean="0"/>
-              <a:t>("/combo/*/*", COMBO_ALBUM);</a:t>
-            </a:r>
-            <a:endParaRPr lang="zh-CN" altLang="en-US" sz="2000" dirty="0"/>
+              <a:rPr lang="zh-CN" altLang="en-US" sz="2000" dirty="0" smtClean="0"/>
+              <a:t>时间检索：</a:t>
+            </a:r>
+            <a:r>
+              <a:rPr lang="en-US" sz="2000" i="1" dirty="0" smtClean="0"/>
+              <a:t>"/cluster/{/local/camera}/time_byday"</a:t>
+            </a:r>
+            <a:r>
+              <a:rPr lang="en-US" sz="2000" dirty="0" smtClean="0"/>
+              <a:t> </a:t>
+            </a:r>
           </a:p>
         </p:txBody>
       </p:sp>
@@ -5538,7 +7185,7 @@
             <a:pPr algn="ctr"/>
             <a:r>
               <a:rPr lang="en-US" altLang="zh-CN" dirty="0" smtClean="0"/>
-              <a:t>combo</a:t>
+              <a:t>cluster</a:t>
             </a:r>
             <a:endParaRPr lang="zh-CN" altLang="en-US" dirty="0"/>
           </a:p>
@@ -5552,7 +7199,7 @@
         </p:nvSpPr>
         <p:spPr>
           <a:xfrm>
-            <a:off x="1428728" y="4286256"/>
+            <a:off x="1428728" y="4071942"/>
             <a:ext cx="1428760" cy="857256"/>
           </a:xfrm>
           <a:prstGeom prst="ellipse">
@@ -5596,7 +7243,7 @@
         </p:nvSpPr>
         <p:spPr>
           <a:xfrm>
-            <a:off x="1428728" y="5643578"/>
+            <a:off x="3500430" y="3500438"/>
             <a:ext cx="1428760" cy="857256"/>
           </a:xfrm>
           <a:prstGeom prst="ellipse">
@@ -5626,7 +7273,7 @@
             <a:pPr algn="ctr"/>
             <a:r>
               <a:rPr lang="en-US" altLang="zh-CN" dirty="0" smtClean="0"/>
-              <a:t>*</a:t>
+              <a:t>time_byday</a:t>
             </a:r>
             <a:endParaRPr lang="zh-CN" altLang="en-US" dirty="0"/>
           </a:p>
@@ -5643,8 +7290,8 @@
         </p:nvCxnSpPr>
         <p:spPr>
           <a:xfrm rot="5400000">
-            <a:off x="1893075" y="4036223"/>
-            <a:ext cx="500066" cy="1588"/>
+            <a:off x="2000232" y="3929066"/>
+            <a:ext cx="285752" cy="1588"/>
           </a:xfrm>
           <a:prstGeom prst="line">
             <a:avLst/>
@@ -5669,15 +7316,15 @@
         <p:nvCxnSpPr>
           <p:cNvPr id="21" name="直接连接符 20"/>
           <p:cNvCxnSpPr>
-            <a:stCxn id="16" idx="4"/>
-            <a:endCxn id="17" idx="0"/>
+            <a:stCxn id="16" idx="6"/>
+            <a:endCxn id="17" idx="2"/>
           </p:cNvCxnSpPr>
           <p:nvPr/>
         </p:nvCxnSpPr>
         <p:spPr>
-          <a:xfrm rot="5400000">
-            <a:off x="1893075" y="5393545"/>
-            <a:ext cx="500066" cy="1588"/>
+          <a:xfrm flipV="1">
+            <a:off x="2857488" y="3929066"/>
+            <a:ext cx="642942" cy="571504"/>
           </a:xfrm>
           <a:prstGeom prst="line">
             <a:avLst/>
@@ -5700,14 +7347,14 @@
       </p:cxnSp>
       <p:sp>
         <p:nvSpPr>
-          <p:cNvPr id="22" name="矩形 21"/>
+          <p:cNvPr id="23" name="矩形 22"/>
           <p:cNvSpPr/>
           <p:nvPr/>
         </p:nvSpPr>
         <p:spPr>
           <a:xfrm>
-            <a:off x="3071802" y="4429132"/>
-            <a:ext cx="2357454" cy="571504"/>
+            <a:off x="5357818" y="3643314"/>
+            <a:ext cx="3429024" cy="571504"/>
           </a:xfrm>
           <a:prstGeom prst="rect">
             <a:avLst/>
@@ -5736,24 +7383,57 @@
             <a:pPr algn="ctr"/>
             <a:r>
               <a:rPr lang="en-US" altLang="zh-CN" dirty="0" smtClean="0"/>
-              <a:t>COMBO_ALBUMSET</a:t>
+              <a:t>CLUSTER_ALBUMSET_TIME_BYDAY</a:t>
             </a:r>
             <a:endParaRPr lang="zh-CN" altLang="en-US" dirty="0"/>
           </a:p>
         </p:txBody>
       </p:sp>
-      <p:sp>
-        <p:nvSpPr>
-          <p:cNvPr id="23" name="矩形 22"/>
+      <p:cxnSp>
+        <p:nvCxnSpPr>
+          <p:cNvPr id="29" name="直接连接符 28"/>
+          <p:cNvCxnSpPr>
+            <a:stCxn id="17" idx="6"/>
+            <a:endCxn id="23" idx="1"/>
+          </p:cNvCxnSpPr>
+          <p:nvPr/>
+        </p:nvCxnSpPr>
+        <p:spPr>
+          <a:xfrm>
+            <a:off x="4929190" y="3929066"/>
+            <a:ext cx="428628" cy="1588"/>
+          </a:xfrm>
+          <a:prstGeom prst="line">
+            <a:avLst/>
+          </a:prstGeom>
+        </p:spPr>
+        <p:style>
+          <a:lnRef idx="1">
+            <a:schemeClr val="accent1"/>
+          </a:lnRef>
+          <a:fillRef idx="0">
+            <a:schemeClr val="accent1"/>
+          </a:fillRef>
+          <a:effectRef idx="0">
+            <a:schemeClr val="accent1"/>
+          </a:effectRef>
+          <a:fontRef idx="minor">
+            <a:schemeClr val="tx1"/>
+          </a:fontRef>
+        </p:style>
+      </p:cxnSp>
+      <p:sp>
+        <p:nvSpPr>
+          <p:cNvPr id="37" name="椭圆 36"/>
           <p:cNvSpPr/>
           <p:nvPr/>
         </p:nvSpPr>
         <p:spPr>
           <a:xfrm>
-            <a:off x="3071802" y="5786454"/>
-            <a:ext cx="2357454" cy="571504"/>
-          </a:xfrm>
-          <a:prstGeom prst="rect">
+            <a:off x="3500430" y="4643446"/>
+            <a:ext cx="1428760" cy="857256"/>
+          </a:xfrm>
+          <a:prstGeom prst="ellipse">
             <a:avLst/>
           </a:prstGeom>
         </p:spPr>
@@ -5779,8 +7459,8 @@
           <a:p>
             <a:pPr algn="ctr"/>
             <a:r>
-              <a:rPr lang="en-US" altLang="zh-CN" dirty="0" smtClean="0"/>
-              <a:t>COMBO_ALBUM</a:t>
+              <a:rPr lang="en-US" altLang="zh-CN" dirty="0" err="1" smtClean="0"/>
+              <a:t>time_bymonth</a:t>
             </a:r>
             <a:endParaRPr lang="zh-CN" altLang="en-US" dirty="0"/>
           </a:p>
@@ -5788,17 +7468,17 @@
       </p:sp>
       <p:cxnSp>
         <p:nvCxnSpPr>
-          <p:cNvPr id="25" name="直接连接符 24"/>
+          <p:cNvPr id="38" name="直接连接符 37"/>
           <p:cNvCxnSpPr>
             <a:stCxn id="16" idx="6"/>
-            <a:endCxn id="22" idx="1"/>
+            <a:endCxn id="37" idx="2"/>
           </p:cNvCxnSpPr>
           <p:nvPr/>
         </p:nvCxnSpPr>
         <p:spPr>
           <a:xfrm>
-            <a:off x="2857488" y="4714884"/>
-            <a:ext cx="214314" cy="1588"/>
+            <a:off x="2857488" y="4500570"/>
+            <a:ext cx="642942" cy="571504"/>
           </a:xfrm>
           <a:prstGeom prst="line">
             <a:avLst/>
@@ -5819,19 +7499,63 @@
           </a:fontRef>
         </p:style>
       </p:cxnSp>
+      <p:sp>
+        <p:nvSpPr>
+          <p:cNvPr id="42" name="矩形 41"/>
+          <p:cNvSpPr/>
+          <p:nvPr/>
+        </p:nvSpPr>
+        <p:spPr>
+          <a:xfrm>
+            <a:off x="5072066" y="4786322"/>
+            <a:ext cx="3857652" cy="571504"/>
+          </a:xfrm>
+          <a:prstGeom prst="rect">
+            <a:avLst/>
+          </a:prstGeom>
+        </p:spPr>
+        <p:style>
+          <a:lnRef idx="2">
+            <a:schemeClr val="accent1">
+              <a:shade val="50000"/>
+            </a:schemeClr>
+          </a:lnRef>
+          <a:fillRef idx="1">
+            <a:schemeClr val="accent1"/>
+          </a:fillRef>
+          <a:effectRef idx="0">
+            <a:schemeClr val="accent1"/>
+          </a:effectRef>
+          <a:fontRef idx="minor">
+            <a:schemeClr val="lt1"/>
+          </a:fontRef>
+        </p:style>
+        <p:txBody>
+          <a:bodyPr rtlCol="0" anchor="ctr"/>
+          <a:lstStyle/>
+          <a:p>
+            <a:pPr algn="ctr"/>
+            <a:r>
+              <a:rPr lang="en-US" altLang="zh-CN" dirty="0" smtClean="0"/>
+              <a:t>CLUSTER_ALBUMSET_TIME_BYMONTH</a:t>
+            </a:r>
+            <a:endParaRPr lang="zh-CN" altLang="en-US" dirty="0"/>
+          </a:p>
+        </p:txBody>
+      </p:sp>
       <p:cxnSp>
         <p:nvCxnSpPr>
-          <p:cNvPr id="29" name="直接连接符 28"/>
+          <p:cNvPr id="43" name="直接连接符 42"/>
           <p:cNvCxnSpPr>
-            <a:stCxn id="17" idx="6"/>
-            <a:endCxn id="23" idx="1"/>
+            <a:stCxn id="37" idx="6"/>
+            <a:endCxn id="42" idx="1"/>
           </p:cNvCxnSpPr>
           <p:nvPr/>
         </p:nvCxnSpPr>
         <p:spPr>
           <a:xfrm>
-            <a:off x="2857488" y="6072206"/>
-            <a:ext cx="214314" cy="1588"/>
+            <a:off x="4929190" y="5072074"/>
+            <a:ext cx="142876" cy="1588"/>
           </a:xfrm>
           <a:prstGeom prst="line">
             <a:avLst/>
@@ -5852,190 +7576,221 @@
           </a:fontRef>
         </p:style>
       </p:cxnSp>
-      <p:sp>
-        <p:nvSpPr>
-          <p:cNvPr id="31" name="TextBox 30"/>
-          <p:cNvSpPr txBox="1"/>
+      <p:graphicFrame>
+        <p:nvGraphicFramePr>
+          <p:cNvPr id="24" name="表格 23"/>
+          <p:cNvGraphicFramePr>
+            <a:graphicFrameLocks noGrp="1"/>
+          </p:cNvGraphicFramePr>
           <p:nvPr/>
-        </p:nvSpPr>
-        <p:spPr>
-          <a:xfrm>
-            <a:off x="3214678" y="2357430"/>
-            <a:ext cx="4643470" cy="1938992"/>
-          </a:xfrm>
-          <a:prstGeom prst="rect">
-            <a:avLst/>
-          </a:prstGeom>
-          <a:noFill/>
-        </p:spPr>
-        <p:txBody>
-          <a:bodyPr wrap="square" rtlCol="0">
-            <a:spAutoFit/>
-          </a:bodyPr>
-          <a:lstStyle/>
-          <a:p>
-            <a:r>
-              <a:rPr lang="en-US" altLang="zh-CN" sz="2000" dirty="0" smtClean="0"/>
-              <a:t>switch (</a:t>
-            </a:r>
-            <a:r>
-              <a:rPr lang="en-US" altLang="zh-CN" sz="2000" dirty="0" err="1" smtClean="0"/>
-              <a:t>mMatcher.match</a:t>
-            </a:r>
-            <a:r>
-              <a:rPr lang="en-US" altLang="zh-CN" sz="2000" dirty="0" smtClean="0"/>
-              <a:t>(path)) </a:t>
-            </a:r>
-            <a:r>
-              <a:rPr lang="en-US" altLang="zh-CN" sz="2000" dirty="0" smtClean="0"/>
-              <a:t>{</a:t>
-            </a:r>
-          </a:p>
-          <a:p>
-            <a:r>
-              <a:rPr lang="en-US" altLang="zh-CN" sz="2000" dirty="0" smtClean="0"/>
-              <a:t>	case </a:t>
-            </a:r>
-            <a:r>
-              <a:rPr lang="en-US" altLang="zh-CN" sz="2000" dirty="0" smtClean="0"/>
-              <a:t>COMBO_ALBUMSET</a:t>
-            </a:r>
-            <a:r>
-              <a:rPr lang="en-US" altLang="zh-CN" sz="2000" dirty="0" smtClean="0"/>
-              <a:t>:</a:t>
-            </a:r>
-          </a:p>
-          <a:p>
-            <a:r>
-              <a:rPr lang="en-US" altLang="zh-CN" sz="2000" dirty="0" smtClean="0"/>
-              <a:t>	</a:t>
-            </a:r>
-            <a:r>
-              <a:rPr lang="en-US" altLang="zh-CN" sz="2000" dirty="0" smtClean="0"/>
-              <a:t>	…</a:t>
-            </a:r>
-          </a:p>
-          <a:p>
-            <a:r>
-              <a:rPr lang="en-US" altLang="zh-CN" sz="2000" dirty="0" smtClean="0"/>
-              <a:t>	 case COMBO_ALBUM</a:t>
-            </a:r>
-            <a:r>
-              <a:rPr lang="en-US" altLang="zh-CN" sz="2000" dirty="0" smtClean="0"/>
-              <a:t>:</a:t>
-            </a:r>
-          </a:p>
-          <a:p>
-            <a:r>
-              <a:rPr lang="en-US" altLang="zh-CN" sz="2000" dirty="0" smtClean="0"/>
-              <a:t>	</a:t>
-            </a:r>
-            <a:r>
-              <a:rPr lang="en-US" altLang="zh-CN" sz="2000" dirty="0" smtClean="0"/>
-              <a:t>	…</a:t>
-            </a:r>
-          </a:p>
-          <a:p>
-            <a:r>
-              <a:rPr lang="en-US" altLang="zh-CN" sz="2000" dirty="0" smtClean="0"/>
-              <a:t>}</a:t>
-            </a:r>
-            <a:endParaRPr lang="zh-CN" altLang="en-US" sz="2000" dirty="0"/>
-          </a:p>
-        </p:txBody>
-      </p:sp>
-    </p:spTree>
-  </p:cSld>
-  <p:clrMapOvr>
-    <a:masterClrMapping/>
-  </p:clrMapOvr>
-  <p:timing>
-    <p:tnLst>
-      <p:par>
-        <p:cTn id="1" dur="indefinite" restart="never" nodeType="tmRoot"/>
-      </p:par>
-    </p:tnLst>
-  </p:timing>
-</p:sld>
-</file>
-
-<file path=ppt/slides/slide7.xml><?xml version="1.0" encoding="utf-8"?>
-<p:sld xmlns:a="http://schemas.openxmlformats.org/drawingml/2006/main" xmlns:r="http://schemas.openxmlformats.org/officeDocument/2006/relationships" xmlns:p="http://schemas.openxmlformats.org/presentationml/2006/main">
-  <p:cSld>
-    <p:spTree>
-      <p:nvGrpSpPr>
-        <p:cNvPr id="1" name=""/>
-        <p:cNvGrpSpPr/>
-        <p:nvPr/>
-      </p:nvGrpSpPr>
-      <p:grpSpPr>
-        <a:xfrm>
-          <a:off x="0" y="0"/>
-          <a:ext cx="0" cy="0"/>
-          <a:chOff x="0" y="0"/>
-          <a:chExt cx="0" cy="0"/>
-        </a:xfrm>
-      </p:grpSpPr>
-      <p:sp>
-        <p:nvSpPr>
-          <p:cNvPr id="2" name="标题 1"/>
-          <p:cNvSpPr>
-            <a:spLocks noGrp="1"/>
-          </p:cNvSpPr>
-          <p:nvPr>
-            <p:ph type="title"/>
-          </p:nvPr>
-        </p:nvSpPr>
-        <p:spPr>
-          <a:xfrm>
-            <a:off x="285720" y="214290"/>
-            <a:ext cx="6615130" cy="654032"/>
-          </a:xfrm>
-        </p:spPr>
-        <p:txBody>
-          <a:bodyPr>
-            <a:normAutofit/>
-          </a:bodyPr>
-          <a:lstStyle/>
-          <a:p>
-            <a:pPr algn="l">
-              <a:buFont typeface="Wingdings" pitchFamily="2" charset="2"/>
-              <a:buChar char="l"/>
-            </a:pPr>
-            <a:r>
-              <a:rPr lang="zh-CN" altLang="en-US" sz="2400" dirty="0" smtClean="0"/>
-              <a:t>数据获取</a:t>
-            </a:r>
-            <a:endParaRPr lang="zh-CN" altLang="en-US" sz="2400" dirty="0"/>
-          </a:p>
-        </p:txBody>
-      </p:sp>
-      <p:pic>
-        <p:nvPicPr>
-          <p:cNvPr id="2051" name="Picture 3" descr="D:\我的文档\桌面\Path--MediaObject.jpg"/>
-          <p:cNvPicPr>
-            <a:picLocks noChangeAspect="1" noChangeArrowheads="1"/>
-          </p:cNvPicPr>
-          <p:nvPr/>
-        </p:nvPicPr>
-        <p:blipFill>
-          <a:blip r:embed="rId3"/>
-          <a:srcRect/>
-          <a:stretch>
-            <a:fillRect/>
-          </a:stretch>
-        </p:blipFill>
-        <p:spPr bwMode="auto">
-          <a:xfrm>
-            <a:off x="428596" y="785794"/>
-            <a:ext cx="8143932" cy="6072206"/>
-          </a:xfrm>
-          <a:prstGeom prst="rect">
-            <a:avLst/>
-          </a:prstGeom>
-          <a:noFill/>
-        </p:spPr>
-      </p:pic>
+        </p:nvGraphicFramePr>
+        <p:xfrm>
+          <a:off x="3500430" y="2285992"/>
+          <a:ext cx="5429288" cy="684578"/>
+        </p:xfrm>
+        <a:graphic>
+          <a:graphicData uri="http://schemas.openxmlformats.org/drawingml/2006/table">
+            <a:tbl>
+              <a:tblPr/>
+              <a:tblGrid>
+                <a:gridCol w="2357454"/>
+                <a:gridCol w="3071834"/>
+              </a:tblGrid>
+              <a:tr h="342289">
+                <a:tc>
+                  <a:txBody>
+                    <a:bodyPr/>
+                    <a:lstStyle/>
+                    <a:p>
+                      <a:pPr algn="ctr" fontAlgn="ctr"/>
+                      <a:r>
+                        <a:rPr lang="en-US" sz="1400" b="0" i="0" u="none" strike="noStrike" dirty="0">
+                          <a:solidFill>
+                            <a:srgbClr val="000000"/>
+                          </a:solidFill>
+                          <a:latin typeface="Calibri"/>
+                        </a:rPr>
+                        <a:t>/cluster/*/time_byday</a:t>
+                      </a:r>
+                    </a:p>
+                  </a:txBody>
+                  <a:tcPr marL="8150" marR="8150" marT="8150" marB="0" anchor="ctr">
+                    <a:lnL w="6350" cap="flat" cmpd="sng" algn="ctr">
+                      <a:solidFill>
+                        <a:srgbClr val="000000"/>
+                      </a:solidFill>
+                      <a:prstDash val="solid"/>
+                      <a:round/>
+                      <a:headEnd type="none" w="med" len="med"/>
+                      <a:tailEnd type="none" w="med" len="med"/>
+                    </a:lnL>
+                    <a:lnR w="6350" cap="flat" cmpd="sng" algn="ctr">
+                      <a:solidFill>
+                        <a:srgbClr val="000000"/>
+                      </a:solidFill>
+                      <a:prstDash val="solid"/>
+                      <a:round/>
+                      <a:headEnd type="none" w="med" len="med"/>
+                      <a:tailEnd type="none" w="med" len="med"/>
+                    </a:lnR>
+                    <a:lnT w="6350" cap="flat" cmpd="sng" algn="ctr">
+                      <a:solidFill>
+                        <a:srgbClr val="000000"/>
+                      </a:solidFill>
+                      <a:prstDash val="solid"/>
+                      <a:round/>
+                      <a:headEnd type="none" w="med" len="med"/>
+                      <a:tailEnd type="none" w="med" len="med"/>
+                    </a:lnT>
+                    <a:lnB w="6350" cap="flat" cmpd="sng" algn="ctr">
+                      <a:solidFill>
+                        <a:srgbClr val="000000"/>
+                      </a:solidFill>
+                      <a:prstDash val="solid"/>
+                      <a:round/>
+                      <a:headEnd type="none" w="med" len="med"/>
+                      <a:tailEnd type="none" w="med" len="med"/>
+                    </a:lnB>
+                    <a:solidFill>
+                      <a:srgbClr val="B6DDE8"/>
+                    </a:solidFill>
+                  </a:tcPr>
+                </a:tc>
+                <a:tc rowSpan="2">
+                  <a:txBody>
+                    <a:bodyPr/>
+                    <a:lstStyle/>
+                    <a:p>
+                      <a:pPr algn="ctr" fontAlgn="ctr"/>
+                      <a:r>
+                        <a:rPr lang="en-US" sz="1400" b="1" i="0" u="none" strike="noStrike" dirty="0">
+                          <a:solidFill>
+                            <a:srgbClr val="000000"/>
+                          </a:solidFill>
+                          <a:latin typeface="Calibri"/>
+                        </a:rPr>
+                        <a:t>VivoCameraSortAlbum</a:t>
+                      </a:r>
+                    </a:p>
+                  </a:txBody>
+                  <a:tcPr marL="8150" marR="8150" marT="8150" marB="0" anchor="ctr">
+                    <a:lnL w="6350" cap="flat" cmpd="sng" algn="ctr">
+                      <a:solidFill>
+                        <a:srgbClr val="000000"/>
+                      </a:solidFill>
+                      <a:prstDash val="solid"/>
+                      <a:round/>
+                      <a:headEnd type="none" w="med" len="med"/>
+                      <a:tailEnd type="none" w="med" len="med"/>
+                    </a:lnL>
+                    <a:lnR w="6350" cap="flat" cmpd="sng" algn="ctr">
+                      <a:solidFill>
+                        <a:srgbClr val="000000"/>
+                      </a:solidFill>
+                      <a:prstDash val="solid"/>
+                      <a:round/>
+                      <a:headEnd type="none" w="med" len="med"/>
+                      <a:tailEnd type="none" w="med" len="med"/>
+                    </a:lnR>
+                    <a:lnT w="6350" cap="flat" cmpd="sng" algn="ctr">
+                      <a:solidFill>
+                        <a:srgbClr val="000000"/>
+                      </a:solidFill>
+                      <a:prstDash val="solid"/>
+                      <a:round/>
+                      <a:headEnd type="none" w="med" len="med"/>
+                      <a:tailEnd type="none" w="med" len="med"/>
+                    </a:lnT>
+                    <a:lnB w="6350" cap="flat" cmpd="sng" algn="ctr">
+                      <a:solidFill>
+                        <a:srgbClr val="000000"/>
+                      </a:solidFill>
+                      <a:prstDash val="solid"/>
+                      <a:round/>
+                      <a:headEnd type="none" w="med" len="med"/>
+                      <a:tailEnd type="none" w="med" len="med"/>
+                    </a:lnB>
+                    <a:solidFill>
+                      <a:srgbClr val="B6DDE8"/>
+                    </a:solidFill>
+                  </a:tcPr>
+                </a:tc>
+              </a:tr>
+              <a:tr h="342289">
+                <a:tc>
+                  <a:txBody>
+                    <a:bodyPr/>
+                    <a:lstStyle/>
+                    <a:p>
+                      <a:pPr algn="ctr" fontAlgn="ctr"/>
+                      <a:r>
+                        <a:rPr lang="en-US" sz="1400" b="0" i="0" u="none" strike="noStrike" dirty="0">
+                          <a:solidFill>
+                            <a:srgbClr val="000000"/>
+                          </a:solidFill>
+                          <a:latin typeface="Calibri"/>
+                        </a:rPr>
+                        <a:t>/cluster/*/time_bymonth</a:t>
+                      </a:r>
+                    </a:p>
+                  </a:txBody>
+                  <a:tcPr marL="8150" marR="8150" marT="8150" marB="0" anchor="ctr">
+                    <a:lnL w="6350" cap="flat" cmpd="sng" algn="ctr">
+                      <a:solidFill>
+                        <a:srgbClr val="000000"/>
+                      </a:solidFill>
+                      <a:prstDash val="solid"/>
+                      <a:round/>
+                      <a:headEnd type="none" w="med" len="med"/>
+                      <a:tailEnd type="none" w="med" len="med"/>
+                    </a:lnL>
+                    <a:lnR w="6350" cap="flat" cmpd="sng" algn="ctr">
+                      <a:solidFill>
+                        <a:srgbClr val="000000"/>
+                      </a:solidFill>
+                      <a:prstDash val="solid"/>
+                      <a:round/>
+                      <a:headEnd type="none" w="med" len="med"/>
+                      <a:tailEnd type="none" w="med" len="med"/>
+                    </a:lnR>
+                    <a:lnT w="6350" cap="flat" cmpd="sng" algn="ctr">
+                      <a:solidFill>
+                        <a:srgbClr val="000000"/>
+                      </a:solidFill>
+                      <a:prstDash val="solid"/>
+                      <a:round/>
+                      <a:headEnd type="none" w="med" len="med"/>
+                      <a:tailEnd type="none" w="med" len="med"/>
+                    </a:lnT>
+                    <a:lnB w="6350" cap="flat" cmpd="sng" algn="ctr">
+                      <a:solidFill>
+                        <a:srgbClr val="000000"/>
+                      </a:solidFill>
+                      <a:prstDash val="solid"/>
+                      <a:round/>
+                      <a:headEnd type="none" w="med" len="med"/>
+                      <a:tailEnd type="none" w="med" len="med"/>
+                    </a:lnB>
+                    <a:solidFill>
+                      <a:srgbClr val="B6DDE8"/>
+                    </a:solidFill>
+                  </a:tcPr>
+                </a:tc>
+                <a:tc vMerge="1">
+                  <a:txBody>
+                    <a:bodyPr/>
+                    <a:lstStyle/>
+                    <a:p>
+                      <a:endParaRPr lang="zh-CN" altLang="en-US"/>
+                    </a:p>
+                  </a:txBody>
+                  <a:tcPr/>
+                </a:tc>
+              </a:tr>
+            </a:tbl>
+          </a:graphicData>
+        </a:graphic>
+      </p:graphicFrame>
     </p:spTree>
   </p:cSld>
   <p:clrMapOvr>
@@ -6080,8 +7835,8 @@
         </p:nvSpPr>
         <p:spPr>
           <a:xfrm>
-            <a:off x="285720" y="214290"/>
-            <a:ext cx="6615130" cy="654032"/>
+            <a:off x="285720" y="642918"/>
+            <a:ext cx="6615130" cy="582594"/>
           </a:xfrm>
         </p:spPr>
         <p:txBody>
@@ -6096,7 +7851,7 @@
             </a:pPr>
             <a:r>
               <a:rPr lang="zh-CN" altLang="en-US" sz="2400" dirty="0" smtClean="0"/>
-              <a:t>选择管理</a:t>
+              <a:t>数据获取</a:t>
             </a:r>
             <a:endParaRPr lang="zh-CN" altLang="en-US" sz="2400" dirty="0"/>
           </a:p>
@@ -6104,14 +7859,14 @@
       </p:sp>
       <p:pic>
         <p:nvPicPr>
-          <p:cNvPr id="5122" name="Picture 2" descr="D:\我的文档\桌面\SelectionManager.jpg"/>
+          <p:cNvPr id="2051" name="Picture 3" descr="D:\我的文档\桌面\Path--MediaObject.jpg"/>
           <p:cNvPicPr>
             <a:picLocks noChangeAspect="1" noChangeArrowheads="1"/>
           </p:cNvPicPr>
           <p:nvPr/>
         </p:nvPicPr>
         <p:blipFill>
-          <a:blip r:embed="rId2"/>
+          <a:blip r:embed="rId3"/>
           <a:srcRect/>
           <a:stretch>
             <a:fillRect/>
@@ -6119,8 +7874,8 @@
         </p:blipFill>
         <p:spPr bwMode="auto">
           <a:xfrm>
-            <a:off x="214282" y="857232"/>
-            <a:ext cx="8715436" cy="5627605"/>
+            <a:off x="1214414" y="1214422"/>
+            <a:ext cx="6715172" cy="5006907"/>
           </a:xfrm>
           <a:prstGeom prst="rect">
             <a:avLst/>
@@ -6172,8 +7927,8 @@
         </p:nvSpPr>
         <p:spPr>
           <a:xfrm>
-            <a:off x="285720" y="214290"/>
-            <a:ext cx="6615130" cy="654032"/>
+            <a:off x="285720" y="642918"/>
+            <a:ext cx="6615130" cy="582594"/>
           </a:xfrm>
         </p:spPr>
         <p:txBody>
@@ -6188,9 +7943,77 @@
             </a:pPr>
             <a:r>
               <a:rPr lang="zh-CN" altLang="en-US" sz="2400" dirty="0" smtClean="0"/>
-              <a:t>数据获取</a:t>
+              <a:t>按钮状态改变与选择管理</a:t>
             </a:r>
             <a:endParaRPr lang="zh-CN" altLang="en-US" sz="2400" dirty="0"/>
+          </a:p>
+        </p:txBody>
+      </p:sp>
+      <p:pic>
+        <p:nvPicPr>
+          <p:cNvPr id="1026" name="Picture 2"/>
+          <p:cNvPicPr>
+            <a:picLocks noChangeAspect="1" noChangeArrowheads="1"/>
+          </p:cNvPicPr>
+          <p:nvPr/>
+        </p:nvPicPr>
+        <p:blipFill>
+          <a:blip r:embed="rId2"/>
+          <a:srcRect/>
+          <a:stretch>
+            <a:fillRect/>
+          </a:stretch>
+        </p:blipFill>
+        <p:spPr bwMode="auto">
+          <a:xfrm>
+            <a:off x="428596" y="1357299"/>
+            <a:ext cx="8429652" cy="3328951"/>
+          </a:xfrm>
+          <a:prstGeom prst="rect">
+            <a:avLst/>
+          </a:prstGeom>
+          <a:noFill/>
+          <a:ln w="9525">
+            <a:noFill/>
+            <a:miter lim="800000"/>
+            <a:headEnd/>
+            <a:tailEnd/>
+          </a:ln>
+          <a:effectLst/>
+        </p:spPr>
+      </p:pic>
+      <p:sp>
+        <p:nvSpPr>
+          <p:cNvPr id="4" name="TextBox 3"/>
+          <p:cNvSpPr txBox="1"/>
+          <p:nvPr/>
+        </p:nvSpPr>
+        <p:spPr>
+          <a:xfrm>
+            <a:off x="2428860" y="5500701"/>
+            <a:ext cx="4214842" cy="400110"/>
+          </a:xfrm>
+          <a:prstGeom prst="rect">
+            <a:avLst/>
+          </a:prstGeom>
+          <a:noFill/>
+        </p:spPr>
+        <p:txBody>
+          <a:bodyPr wrap="square" rtlCol="0">
+            <a:spAutoFit/>
+          </a:bodyPr>
+          <a:lstStyle/>
+          <a:p>
+            <a:pPr algn="ctr"/>
+            <a:r>
+              <a:rPr lang="en-US" altLang="zh-CN" sz="2000" dirty="0" smtClean="0"/>
+              <a:t>AllItemPage</a:t>
+            </a:r>
+            <a:r>
+              <a:rPr lang="zh-CN" altLang="en-US" sz="2000" dirty="0" smtClean="0"/>
+              <a:t>按钮菜单的初始化过程</a:t>
+            </a:r>
+            <a:endParaRPr lang="zh-CN" altLang="en-US" sz="2000" dirty="0"/>
           </a:p>
         </p:txBody>
       </p:sp>
@@ -6210,7 +8033,7 @@
 </file>
 
 <file path=ppt/theme/theme1.xml><?xml version="1.0" encoding="utf-8"?>
-<a:theme xmlns:a="http://schemas.openxmlformats.org/drawingml/2006/main" name="Office 主题">
+<a:theme xmlns:a="http://schemas.openxmlformats.org/drawingml/2006/main" name="主题1">
   <a:themeElements>
     <a:clrScheme name="Office">
       <a:dk1>

</xml_diff>

<commit_message>
update the uml and ppt
Signed-off-by: zhangzhenan <zhangzhenan@vivo.com.cn>
</commit_message>
<xml_diff>
--- a/11月25号答辩准备.pptx
+++ b/11月25号答辩准备.pptx
@@ -5,24 +5,29 @@
     <p:sldMasterId id="2147483696" r:id="rId1"/>
   </p:sldMasterIdLst>
   <p:notesMasterIdLst>
-    <p:notesMasterId r:id="rId17"/>
+    <p:notesMasterId r:id="rId22"/>
   </p:notesMasterIdLst>
   <p:sldIdLst>
     <p:sldId id="257" r:id="rId2"/>
     <p:sldId id="258" r:id="rId3"/>
     <p:sldId id="260" r:id="rId4"/>
-    <p:sldId id="261" r:id="rId5"/>
-    <p:sldId id="263" r:id="rId6"/>
-    <p:sldId id="264" r:id="rId7"/>
-    <p:sldId id="270" r:id="rId8"/>
-    <p:sldId id="262" r:id="rId9"/>
-    <p:sldId id="266" r:id="rId10"/>
-    <p:sldId id="265" r:id="rId11"/>
-    <p:sldId id="267" r:id="rId12"/>
-    <p:sldId id="268" r:id="rId13"/>
-    <p:sldId id="269" r:id="rId14"/>
-    <p:sldId id="271" r:id="rId15"/>
-    <p:sldId id="259" r:id="rId16"/>
+    <p:sldId id="272" r:id="rId5"/>
+    <p:sldId id="261" r:id="rId6"/>
+    <p:sldId id="273" r:id="rId7"/>
+    <p:sldId id="263" r:id="rId8"/>
+    <p:sldId id="264" r:id="rId9"/>
+    <p:sldId id="270" r:id="rId10"/>
+    <p:sldId id="262" r:id="rId11"/>
+    <p:sldId id="274" r:id="rId12"/>
+    <p:sldId id="266" r:id="rId13"/>
+    <p:sldId id="265" r:id="rId14"/>
+    <p:sldId id="275" r:id="rId15"/>
+    <p:sldId id="267" r:id="rId16"/>
+    <p:sldId id="268" r:id="rId17"/>
+    <p:sldId id="276" r:id="rId18"/>
+    <p:sldId id="269" r:id="rId19"/>
+    <p:sldId id="271" r:id="rId20"/>
+    <p:sldId id="259" r:id="rId21"/>
   </p:sldIdLst>
   <p:sldSz cx="9144000" cy="6858000" type="screen4x3"/>
   <p:notesSz cx="6858000" cy="9144000"/>
@@ -207,7 +212,7 @@
             <a:fld id="{73AFBD9E-6B2F-4020-8679-B62729E68172}" type="datetimeFigureOut">
               <a:rPr lang="zh-CN" altLang="en-US" smtClean="0"/>
               <a:pPr/>
-              <a:t>2014/11/24</a:t>
+              <a:t>2014/11/26</a:t>
             </a:fld>
             <a:endParaRPr lang="zh-CN" altLang="en-US"/>
           </a:p>
@@ -624,7 +629,41 @@
           <a:p>
             <a:r>
               <a:rPr lang="zh-CN" altLang="en-US" dirty="0" smtClean="0"/>
-              <a:t>界面切换过程：新页面的初始化</a:t>
+              <a:t>界面切换过程</a:t>
+            </a:r>
+            <a:r>
+              <a:rPr lang="zh-CN" altLang="en-US" dirty="0" smtClean="0"/>
+              <a:t>：通过</a:t>
+            </a:r>
+            <a:r>
+              <a:rPr lang="en-US" altLang="zh-CN" dirty="0" smtClean="0"/>
+              <a:t>intent</a:t>
+            </a:r>
+            <a:r>
+              <a:rPr lang="zh-CN" altLang="en-US" dirty="0" smtClean="0"/>
+              <a:t>跳转到对应的</a:t>
+            </a:r>
+            <a:r>
+              <a:rPr lang="en-US" altLang="zh-CN" dirty="0" smtClean="0"/>
+              <a:t>activity</a:t>
+            </a:r>
+            <a:r>
+              <a:rPr lang="en-US" altLang="zh-CN" baseline="0" dirty="0" smtClean="0"/>
+              <a:t> </a:t>
+            </a:r>
+            <a:r>
+              <a:rPr lang="en-US" altLang="zh-CN" baseline="0" dirty="0" smtClean="0">
+                <a:sym typeface="Wingdings" pitchFamily="2" charset="2"/>
+              </a:rPr>
+              <a:t> </a:t>
+            </a:r>
+            <a:r>
+              <a:rPr lang="zh-CN" altLang="en-US" dirty="0" smtClean="0"/>
+              <a:t>新</a:t>
+            </a:r>
+            <a:r>
+              <a:rPr lang="zh-CN" altLang="en-US" dirty="0" smtClean="0"/>
+              <a:t>页面的初始化</a:t>
             </a:r>
             <a:r>
               <a:rPr lang="en-US" altLang="zh-CN" dirty="0" smtClean="0"/>
@@ -688,7 +727,7 @@
             <a:fld id="{D350629B-5C7B-404E-93AF-6E6AD907B67B}" type="slidenum">
               <a:rPr lang="zh-CN" altLang="en-US" smtClean="0"/>
               <a:pPr/>
-              <a:t>4</a:t>
+              <a:t>5</a:t>
             </a:fld>
             <a:endParaRPr lang="zh-CN" altLang="en-US"/>
           </a:p>
@@ -753,6 +792,55 @@
           </a:bodyPr>
           <a:lstStyle/>
           <a:p>
+            <a:r>
+              <a:rPr lang="zh-CN" altLang="en-US" dirty="0" smtClean="0"/>
+              <a:t>每一个</a:t>
+            </a:r>
+            <a:r>
+              <a:rPr lang="en-US" altLang="zh-CN" dirty="0" smtClean="0"/>
+              <a:t>Page</a:t>
+            </a:r>
+            <a:r>
+              <a:rPr lang="zh-CN" altLang="en-US" dirty="0" smtClean="0"/>
+              <a:t>都会有对应的数据源，</a:t>
+            </a:r>
+            <a:r>
+              <a:rPr lang="en-US" altLang="zh-CN" dirty="0" err="1" smtClean="0"/>
+              <a:t>DataManager</a:t>
+            </a:r>
+            <a:r>
+              <a:rPr lang="zh-CN" altLang="en-US" dirty="0" smtClean="0"/>
+              <a:t>用于管理数据源</a:t>
+            </a:r>
+            <a:endParaRPr lang="en-US" altLang="zh-CN" dirty="0" smtClean="0"/>
+          </a:p>
+          <a:p>
+            <a:r>
+              <a:rPr lang="en-US" altLang="zh-CN" dirty="0" err="1" smtClean="0"/>
+              <a:t>DataManager</a:t>
+            </a:r>
+            <a:r>
+              <a:rPr lang="zh-CN" altLang="en-US" dirty="0" smtClean="0"/>
+              <a:t>维护了一个</a:t>
+            </a:r>
+            <a:r>
+              <a:rPr lang="en-US" altLang="zh-CN" dirty="0" err="1" smtClean="0"/>
+              <a:t>hashMap</a:t>
+            </a:r>
+            <a:r>
+              <a:rPr lang="zh-CN" altLang="en-US" dirty="0" smtClean="0"/>
+              <a:t>中</a:t>
+            </a:r>
+            <a:r>
+              <a:rPr lang="zh-CN" altLang="en-US" baseline="0" dirty="0" smtClean="0"/>
+              <a:t> 数据源以键值对的形式存储</a:t>
+            </a:r>
+            <a:endParaRPr lang="en-US" altLang="zh-CN" baseline="0" dirty="0" smtClean="0"/>
+          </a:p>
+          <a:p>
+            <a:endParaRPr lang="en-US" altLang="zh-CN" baseline="0" dirty="0" smtClean="0"/>
+          </a:p>
+          <a:p>
             <a:endParaRPr lang="zh-CN" altLang="en-US" dirty="0"/>
           </a:p>
         </p:txBody>
@@ -775,7 +863,7 @@
             <a:fld id="{D350629B-5C7B-404E-93AF-6E6AD907B67B}" type="slidenum">
               <a:rPr lang="zh-CN" altLang="en-US" smtClean="0"/>
               <a:pPr/>
-              <a:t>5</a:t>
+              <a:t>7</a:t>
             </a:fld>
             <a:endParaRPr lang="zh-CN" altLang="en-US"/>
           </a:p>
@@ -842,6 +930,85 @@
           <a:p>
             <a:r>
               <a:rPr lang="zh-CN" altLang="en-US" dirty="0" smtClean="0"/>
+              <a:t>讲数据获取需要先讲解</a:t>
+            </a:r>
+            <a:endParaRPr lang="en-US" altLang="zh-CN" dirty="0" smtClean="0"/>
+          </a:p>
+          <a:p>
+            <a:endParaRPr lang="en-US" altLang="zh-CN" dirty="0" smtClean="0"/>
+          </a:p>
+          <a:p>
+            <a:r>
+              <a:rPr lang="en-US" altLang="zh-CN" dirty="0" err="1" smtClean="0"/>
+              <a:t>PathMatcher</a:t>
+            </a:r>
+            <a:r>
+              <a:rPr lang="zh-CN" altLang="en-US" dirty="0" smtClean="0"/>
+              <a:t>类：用于路径匹配</a:t>
+            </a:r>
+            <a:endParaRPr lang="en-US" altLang="zh-CN" dirty="0" smtClean="0"/>
+          </a:p>
+          <a:p>
+            <a:r>
+              <a:rPr lang="zh-CN" altLang="en-US" dirty="0" smtClean="0"/>
+              <a:t>两个主要方法：</a:t>
+            </a:r>
+            <a:endParaRPr lang="en-US" altLang="zh-CN" dirty="0" smtClean="0"/>
+          </a:p>
+          <a:p>
+            <a:r>
+              <a:rPr lang="en-US" altLang="zh-CN" sz="1200" dirty="0" smtClean="0"/>
+              <a:t>Add</a:t>
+            </a:r>
+            <a:r>
+              <a:rPr lang="zh-CN" altLang="en-US" sz="1200" dirty="0" smtClean="0"/>
+              <a:t>：</a:t>
+            </a:r>
+            <a:endParaRPr lang="en-US" altLang="zh-CN" dirty="0" smtClean="0"/>
+          </a:p>
+          <a:p>
+            <a:r>
+              <a:rPr lang="zh-CN" altLang="en-US" dirty="0" smtClean="0"/>
+              <a:t>路径转换成树状结构进行维护。</a:t>
+            </a:r>
+            <a:endParaRPr lang="en-US" altLang="zh-CN" dirty="0" smtClean="0"/>
+          </a:p>
+          <a:p>
+            <a:r>
+              <a:rPr lang="en-US" altLang="zh-CN" sz="1200" dirty="0" smtClean="0"/>
+              <a:t>Match</a:t>
+            </a:r>
+            <a:r>
+              <a:rPr lang="zh-CN" altLang="en-US" sz="1200" dirty="0" smtClean="0"/>
+              <a:t>：</a:t>
+            </a:r>
+            <a:endParaRPr lang="en-US" altLang="zh-CN" dirty="0" smtClean="0"/>
+          </a:p>
+          <a:p>
+            <a:r>
+              <a:rPr lang="zh-CN" altLang="en-US" dirty="0" smtClean="0"/>
+              <a:t>根据路径返回对应的类型（</a:t>
+            </a:r>
+            <a:r>
+              <a:rPr lang="en-US" altLang="zh-CN" dirty="0" err="1" smtClean="0"/>
+              <a:t>int</a:t>
+            </a:r>
+            <a:r>
+              <a:rPr lang="en-US" altLang="zh-CN" dirty="0" smtClean="0"/>
+              <a:t> kind</a:t>
+            </a:r>
+            <a:r>
+              <a:rPr lang="zh-CN" altLang="en-US" dirty="0" smtClean="0"/>
+              <a:t>）</a:t>
+            </a:r>
+            <a:endParaRPr lang="en-US" altLang="zh-CN" dirty="0" smtClean="0"/>
+          </a:p>
+          <a:p>
+            <a:endParaRPr lang="en-US" altLang="zh-CN" dirty="0" smtClean="0"/>
+          </a:p>
+          <a:p>
+            <a:r>
+              <a:rPr lang="zh-CN" altLang="en-US" dirty="0" smtClean="0"/>
               <a:t>打开电子表格 </a:t>
             </a:r>
             <a:r>
@@ -882,7 +1049,7 @@
             <a:fld id="{D350629B-5C7B-404E-93AF-6E6AD907B67B}" type="slidenum">
               <a:rPr lang="zh-CN" altLang="en-US" smtClean="0"/>
               <a:pPr/>
-              <a:t>6</a:t>
+              <a:t>8</a:t>
             </a:fld>
             <a:endParaRPr lang="zh-CN" altLang="en-US"/>
           </a:p>
@@ -967,6 +1134,24 @@
               <a:rPr lang="zh-CN" altLang="en-US" dirty="0" smtClean="0"/>
               <a:t>子类过程</a:t>
             </a:r>
+            <a:endParaRPr lang="en-US" altLang="zh-CN" dirty="0" smtClean="0"/>
+          </a:p>
+          <a:p>
+            <a:endParaRPr lang="en-US" altLang="zh-CN" dirty="0" smtClean="0"/>
+          </a:p>
+          <a:p>
+            <a:r>
+              <a:rPr lang="zh-CN" altLang="en-US" dirty="0" smtClean="0"/>
+              <a:t>打开</a:t>
+            </a:r>
+            <a:r>
+              <a:rPr lang="en-US" altLang="zh-CN" dirty="0" smtClean="0"/>
+              <a:t>UML</a:t>
+            </a:r>
+            <a:r>
+              <a:rPr lang="zh-CN" altLang="en-US" smtClean="0"/>
+              <a:t>数据获取</a:t>
+            </a:r>
             <a:endParaRPr lang="zh-CN" altLang="en-US" dirty="0"/>
           </a:p>
         </p:txBody>
@@ -989,7 +1174,7 @@
             <a:fld id="{D350629B-5C7B-404E-93AF-6E6AD907B67B}" type="slidenum">
               <a:rPr lang="zh-CN" altLang="en-US" smtClean="0"/>
               <a:pPr/>
-              <a:t>7</a:t>
+              <a:t>9</a:t>
             </a:fld>
             <a:endParaRPr lang="zh-CN" altLang="en-US"/>
           </a:p>
@@ -1084,7 +1269,7 @@
             <a:fld id="{D350629B-5C7B-404E-93AF-6E6AD907B67B}" type="slidenum">
               <a:rPr lang="zh-CN" altLang="en-US" smtClean="0"/>
               <a:pPr/>
-              <a:t>8</a:t>
+              <a:t>10</a:t>
             </a:fld>
             <a:endParaRPr lang="zh-CN" altLang="en-US"/>
           </a:p>
@@ -1166,7 +1351,138 @@
             <a:fld id="{D350629B-5C7B-404E-93AF-6E6AD907B67B}" type="slidenum">
               <a:rPr lang="zh-CN" altLang="en-US" smtClean="0"/>
               <a:pPr/>
-              <a:t>10</a:t>
+              <a:t>13</a:t>
+            </a:fld>
+            <a:endParaRPr lang="zh-CN" altLang="en-US"/>
+          </a:p>
+        </p:txBody>
+      </p:sp>
+    </p:spTree>
+  </p:cSld>
+  <p:clrMapOvr>
+    <a:masterClrMapping/>
+  </p:clrMapOvr>
+</p:notes>
+</file>
+
+<file path=ppt/notesSlides/notesSlide7.xml><?xml version="1.0" encoding="utf-8"?>
+<p:notes xmlns:a="http://schemas.openxmlformats.org/drawingml/2006/main" xmlns:r="http://schemas.openxmlformats.org/officeDocument/2006/relationships" xmlns:p="http://schemas.openxmlformats.org/presentationml/2006/main">
+  <p:cSld>
+    <p:spTree>
+      <p:nvGrpSpPr>
+        <p:cNvPr id="1" name=""/>
+        <p:cNvGrpSpPr/>
+        <p:nvPr/>
+      </p:nvGrpSpPr>
+      <p:grpSpPr>
+        <a:xfrm>
+          <a:off x="0" y="0"/>
+          <a:ext cx="0" cy="0"/>
+          <a:chOff x="0" y="0"/>
+          <a:chExt cx="0" cy="0"/>
+        </a:xfrm>
+      </p:grpSpPr>
+      <p:sp>
+        <p:nvSpPr>
+          <p:cNvPr id="2" name="幻灯片图像占位符 1"/>
+          <p:cNvSpPr>
+            <a:spLocks noGrp="1" noRot="1" noChangeAspect="1"/>
+          </p:cNvSpPr>
+          <p:nvPr>
+            <p:ph type="sldImg"/>
+          </p:nvPr>
+        </p:nvSpPr>
+        <p:spPr/>
+      </p:sp>
+      <p:sp>
+        <p:nvSpPr>
+          <p:cNvPr id="3" name="备注占位符 2"/>
+          <p:cNvSpPr>
+            <a:spLocks noGrp="1"/>
+          </p:cNvSpPr>
+          <p:nvPr>
+            <p:ph type="body" idx="1"/>
+          </p:nvPr>
+        </p:nvSpPr>
+        <p:spPr/>
+        <p:txBody>
+          <a:bodyPr>
+            <a:normAutofit/>
+          </a:bodyPr>
+          <a:lstStyle/>
+          <a:p>
+            <a:r>
+              <a:rPr lang="en-US" altLang="zh-CN" dirty="0" err="1" smtClean="0"/>
+              <a:t>Scalegesturedetector</a:t>
+            </a:r>
+            <a:r>
+              <a:rPr lang="en-US" altLang="zh-CN" dirty="0" smtClean="0"/>
+              <a:t> </a:t>
+            </a:r>
+            <a:r>
+              <a:rPr lang="zh-CN" altLang="en-US" dirty="0" smtClean="0"/>
+              <a:t>缩放手势相关</a:t>
+            </a:r>
+            <a:endParaRPr lang="en-US" altLang="zh-CN" dirty="0" smtClean="0"/>
+          </a:p>
+          <a:p>
+            <a:r>
+              <a:rPr lang="en-US" altLang="zh-CN" dirty="0" err="1" smtClean="0"/>
+              <a:t>downupDetector</a:t>
+            </a:r>
+            <a:r>
+              <a:rPr lang="en-US" altLang="zh-CN" dirty="0" smtClean="0"/>
+              <a:t> </a:t>
+            </a:r>
+            <a:r>
+              <a:rPr lang="zh-CN" altLang="en-US" dirty="0" smtClean="0"/>
+              <a:t>全屏图片的旋转</a:t>
+            </a:r>
+            <a:endParaRPr lang="en-US" altLang="zh-CN" dirty="0" smtClean="0"/>
+          </a:p>
+          <a:p>
+            <a:r>
+              <a:rPr lang="en-US" altLang="zh-CN" dirty="0" smtClean="0"/>
+              <a:t>Listener &amp; </a:t>
+            </a:r>
+            <a:r>
+              <a:rPr lang="en-US" altLang="zh-CN" dirty="0" err="1" smtClean="0"/>
+              <a:t>GestureDetector</a:t>
+            </a:r>
+            <a:r>
+              <a:rPr lang="en-US" altLang="zh-CN" baseline="0" dirty="0" smtClean="0"/>
+              <a:t> </a:t>
+            </a:r>
+            <a:r>
+              <a:rPr lang="zh-CN" altLang="en-US" baseline="0" dirty="0" smtClean="0"/>
+              <a:t>处理大部分的手势</a:t>
+            </a:r>
+            <a:endParaRPr lang="en-US" altLang="zh-CN" dirty="0" smtClean="0"/>
+          </a:p>
+          <a:p>
+            <a:endParaRPr lang="zh-CN" altLang="en-US" dirty="0"/>
+          </a:p>
+        </p:txBody>
+      </p:sp>
+      <p:sp>
+        <p:nvSpPr>
+          <p:cNvPr id="4" name="灯片编号占位符 3"/>
+          <p:cNvSpPr>
+            <a:spLocks noGrp="1"/>
+          </p:cNvSpPr>
+          <p:nvPr>
+            <p:ph type="sldNum" sz="quarter" idx="10"/>
+          </p:nvPr>
+        </p:nvSpPr>
+        <p:spPr/>
+        <p:txBody>
+          <a:bodyPr/>
+          <a:lstStyle/>
+          <a:p>
+            <a:fld id="{D350629B-5C7B-404E-93AF-6E6AD907B67B}" type="slidenum">
+              <a:rPr lang="zh-CN" altLang="en-US" smtClean="0"/>
+              <a:pPr/>
+              <a:t>19</a:t>
             </a:fld>
             <a:endParaRPr lang="zh-CN" altLang="en-US"/>
           </a:p>
@@ -1362,7 +1678,7 @@
             <a:fld id="{530820CF-B880-4189-942D-D702A7CBA730}" type="datetimeFigureOut">
               <a:rPr lang="zh-CN" altLang="en-US" smtClean="0"/>
               <a:pPr/>
-              <a:t>2014/11/24</a:t>
+              <a:t>2014/11/26</a:t>
             </a:fld>
             <a:endParaRPr lang="zh-CN" altLang="en-US"/>
           </a:p>
@@ -1529,7 +1845,7 @@
             <a:fld id="{530820CF-B880-4189-942D-D702A7CBA730}" type="datetimeFigureOut">
               <a:rPr lang="zh-CN" altLang="en-US" smtClean="0"/>
               <a:pPr/>
-              <a:t>2014/11/24</a:t>
+              <a:t>2014/11/26</a:t>
             </a:fld>
             <a:endParaRPr lang="zh-CN" altLang="en-US"/>
           </a:p>
@@ -1706,7 +2022,7 @@
             <a:fld id="{530820CF-B880-4189-942D-D702A7CBA730}" type="datetimeFigureOut">
               <a:rPr lang="zh-CN" altLang="en-US" smtClean="0"/>
               <a:pPr/>
-              <a:t>2014/11/24</a:t>
+              <a:t>2014/11/26</a:t>
             </a:fld>
             <a:endParaRPr lang="zh-CN" altLang="en-US"/>
           </a:p>
@@ -1873,7 +2189,7 @@
             <a:fld id="{530820CF-B880-4189-942D-D702A7CBA730}" type="datetimeFigureOut">
               <a:rPr lang="zh-CN" altLang="en-US" smtClean="0"/>
               <a:pPr/>
-              <a:t>2014/11/24</a:t>
+              <a:t>2014/11/26</a:t>
             </a:fld>
             <a:endParaRPr lang="zh-CN" altLang="en-US"/>
           </a:p>
@@ -2116,7 +2432,7 @@
             <a:fld id="{530820CF-B880-4189-942D-D702A7CBA730}" type="datetimeFigureOut">
               <a:rPr lang="zh-CN" altLang="en-US" smtClean="0"/>
               <a:pPr/>
-              <a:t>2014/11/24</a:t>
+              <a:t>2014/11/26</a:t>
             </a:fld>
             <a:endParaRPr lang="zh-CN" altLang="en-US"/>
           </a:p>
@@ -2401,7 +2717,7 @@
             <a:fld id="{530820CF-B880-4189-942D-D702A7CBA730}" type="datetimeFigureOut">
               <a:rPr lang="zh-CN" altLang="en-US" smtClean="0"/>
               <a:pPr/>
-              <a:t>2014/11/24</a:t>
+              <a:t>2014/11/26</a:t>
             </a:fld>
             <a:endParaRPr lang="zh-CN" altLang="en-US"/>
           </a:p>
@@ -2820,7 +3136,7 @@
             <a:fld id="{530820CF-B880-4189-942D-D702A7CBA730}" type="datetimeFigureOut">
               <a:rPr lang="zh-CN" altLang="en-US" smtClean="0"/>
               <a:pPr/>
-              <a:t>2014/11/24</a:t>
+              <a:t>2014/11/26</a:t>
             </a:fld>
             <a:endParaRPr lang="zh-CN" altLang="en-US"/>
           </a:p>
@@ -2935,7 +3251,7 @@
             <a:fld id="{530820CF-B880-4189-942D-D702A7CBA730}" type="datetimeFigureOut">
               <a:rPr lang="zh-CN" altLang="en-US" smtClean="0"/>
               <a:pPr/>
-              <a:t>2014/11/24</a:t>
+              <a:t>2014/11/26</a:t>
             </a:fld>
             <a:endParaRPr lang="zh-CN" altLang="en-US"/>
           </a:p>
@@ -3027,7 +3343,7 @@
             <a:fld id="{530820CF-B880-4189-942D-D702A7CBA730}" type="datetimeFigureOut">
               <a:rPr lang="zh-CN" altLang="en-US" smtClean="0"/>
               <a:pPr/>
-              <a:t>2014/11/24</a:t>
+              <a:t>2014/11/26</a:t>
             </a:fld>
             <a:endParaRPr lang="zh-CN" altLang="en-US"/>
           </a:p>
@@ -3301,7 +3617,7 @@
             <a:fld id="{530820CF-B880-4189-942D-D702A7CBA730}" type="datetimeFigureOut">
               <a:rPr lang="zh-CN" altLang="en-US" smtClean="0"/>
               <a:pPr/>
-              <a:t>2014/11/24</a:t>
+              <a:t>2014/11/26</a:t>
             </a:fld>
             <a:endParaRPr lang="zh-CN" altLang="en-US"/>
           </a:p>
@@ -3555,7 +3871,7 @@
             <a:fld id="{530820CF-B880-4189-942D-D702A7CBA730}" type="datetimeFigureOut">
               <a:rPr lang="zh-CN" altLang="en-US" smtClean="0"/>
               <a:pPr/>
-              <a:t>2014/11/24</a:t>
+              <a:t>2014/11/26</a:t>
             </a:fld>
             <a:endParaRPr lang="zh-CN" altLang="en-US"/>
           </a:p>
@@ -3765,7 +4081,7 @@
             <a:fld id="{530820CF-B880-4189-942D-D702A7CBA730}" type="datetimeFigureOut">
               <a:rPr lang="zh-CN" altLang="en-US" smtClean="0"/>
               <a:pPr/>
-              <a:t>2014/11/24</a:t>
+              <a:t>2014/11/26</a:t>
             </a:fld>
             <a:endParaRPr lang="zh-CN" altLang="en-US"/>
           </a:p>
@@ -4231,6 +4547,47 @@
           </a:p>
         </p:txBody>
       </p:sp>
+      <p:sp>
+        <p:nvSpPr>
+          <p:cNvPr id="5" name="TextBox 4"/>
+          <p:cNvSpPr txBox="1"/>
+          <p:nvPr/>
+        </p:nvSpPr>
+        <p:spPr>
+          <a:xfrm>
+            <a:off x="5429256" y="4214818"/>
+            <a:ext cx="2714644" cy="830997"/>
+          </a:xfrm>
+          <a:prstGeom prst="rect">
+            <a:avLst/>
+          </a:prstGeom>
+          <a:noFill/>
+        </p:spPr>
+        <p:txBody>
+          <a:bodyPr wrap="square" rtlCol="0">
+            <a:spAutoFit/>
+          </a:bodyPr>
+          <a:lstStyle/>
+          <a:p>
+            <a:r>
+              <a:rPr lang="zh-CN" altLang="en-US" sz="2400" b="1" dirty="0" smtClean="0"/>
+              <a:t>多媒体组：</a:t>
+            </a:r>
+            <a:endParaRPr lang="en-US" altLang="zh-CN" sz="2400" b="1" dirty="0" smtClean="0"/>
+          </a:p>
+          <a:p>
+            <a:r>
+              <a:rPr lang="en-US" altLang="zh-CN" sz="2400" b="1" dirty="0" smtClean="0"/>
+              <a:t>	</a:t>
+            </a:r>
+            <a:r>
+              <a:rPr lang="zh-CN" altLang="en-US" sz="2400" b="1" dirty="0" smtClean="0"/>
+              <a:t>张哲楠</a:t>
+            </a:r>
+            <a:endParaRPr lang="zh-CN" altLang="en-US" sz="2400" b="1" dirty="0"/>
+          </a:p>
+        </p:txBody>
+      </p:sp>
     </p:spTree>
   </p:cSld>
   <p:clrMapOvr>
@@ -4247,6 +4604,299 @@
 </file>
 
 <file path=ppt/slides/slide10.xml><?xml version="1.0" encoding="utf-8"?>
+<p:sld xmlns:a="http://schemas.openxmlformats.org/drawingml/2006/main" xmlns:r="http://schemas.openxmlformats.org/officeDocument/2006/relationships" xmlns:p="http://schemas.openxmlformats.org/presentationml/2006/main">
+  <p:cSld>
+    <p:spTree>
+      <p:nvGrpSpPr>
+        <p:cNvPr id="1" name=""/>
+        <p:cNvGrpSpPr/>
+        <p:nvPr/>
+      </p:nvGrpSpPr>
+      <p:grpSpPr>
+        <a:xfrm>
+          <a:off x="0" y="0"/>
+          <a:ext cx="0" cy="0"/>
+          <a:chOff x="0" y="0"/>
+          <a:chExt cx="0" cy="0"/>
+        </a:xfrm>
+      </p:grpSpPr>
+      <p:sp>
+        <p:nvSpPr>
+          <p:cNvPr id="2" name="标题 1"/>
+          <p:cNvSpPr>
+            <a:spLocks noGrp="1"/>
+          </p:cNvSpPr>
+          <p:nvPr>
+            <p:ph type="title"/>
+          </p:nvPr>
+        </p:nvSpPr>
+        <p:spPr>
+          <a:xfrm>
+            <a:off x="285720" y="642918"/>
+            <a:ext cx="6615130" cy="582594"/>
+          </a:xfrm>
+        </p:spPr>
+        <p:txBody>
+          <a:bodyPr>
+            <a:normAutofit/>
+          </a:bodyPr>
+          <a:lstStyle/>
+          <a:p>
+            <a:pPr algn="l">
+              <a:buFont typeface="Wingdings" pitchFamily="2" charset="2"/>
+              <a:buChar char="l"/>
+            </a:pPr>
+            <a:r>
+              <a:rPr lang="zh-CN" altLang="en-US" sz="2400" dirty="0" smtClean="0"/>
+              <a:t>数据获取</a:t>
+            </a:r>
+            <a:endParaRPr lang="zh-CN" altLang="en-US" sz="2400" dirty="0"/>
+          </a:p>
+        </p:txBody>
+      </p:sp>
+      <p:pic>
+        <p:nvPicPr>
+          <p:cNvPr id="2051" name="Picture 3" descr="D:\我的文档\桌面\Path--MediaObject.jpg"/>
+          <p:cNvPicPr>
+            <a:picLocks noChangeAspect="1" noChangeArrowheads="1"/>
+          </p:cNvPicPr>
+          <p:nvPr/>
+        </p:nvPicPr>
+        <p:blipFill>
+          <a:blip r:embed="rId3"/>
+          <a:srcRect/>
+          <a:stretch>
+            <a:fillRect/>
+          </a:stretch>
+        </p:blipFill>
+        <p:spPr bwMode="auto">
+          <a:xfrm>
+            <a:off x="1214414" y="1214422"/>
+            <a:ext cx="6715172" cy="5006907"/>
+          </a:xfrm>
+          <a:prstGeom prst="rect">
+            <a:avLst/>
+          </a:prstGeom>
+          <a:noFill/>
+        </p:spPr>
+      </p:pic>
+    </p:spTree>
+  </p:cSld>
+  <p:clrMapOvr>
+    <a:masterClrMapping/>
+  </p:clrMapOvr>
+  <p:timing>
+    <p:tnLst>
+      <p:par>
+        <p:cTn id="1" dur="indefinite" restart="never" nodeType="tmRoot"/>
+      </p:par>
+    </p:tnLst>
+  </p:timing>
+</p:sld>
+</file>
+
+<file path=ppt/slides/slide11.xml><?xml version="1.0" encoding="utf-8"?>
+<p:sld xmlns:a="http://schemas.openxmlformats.org/drawingml/2006/main" xmlns:r="http://schemas.openxmlformats.org/officeDocument/2006/relationships" xmlns:p="http://schemas.openxmlformats.org/presentationml/2006/main">
+  <p:cSld>
+    <p:spTree>
+      <p:nvGrpSpPr>
+        <p:cNvPr id="1" name=""/>
+        <p:cNvGrpSpPr/>
+        <p:nvPr/>
+      </p:nvGrpSpPr>
+      <p:grpSpPr>
+        <a:xfrm>
+          <a:off x="0" y="0"/>
+          <a:ext cx="0" cy="0"/>
+          <a:chOff x="0" y="0"/>
+          <a:chExt cx="0" cy="0"/>
+        </a:xfrm>
+      </p:grpSpPr>
+      <p:sp>
+        <p:nvSpPr>
+          <p:cNvPr id="3" name="内容占位符 2"/>
+          <p:cNvSpPr>
+            <a:spLocks noGrp="1"/>
+          </p:cNvSpPr>
+          <p:nvPr>
+            <p:ph idx="1"/>
+          </p:nvPr>
+        </p:nvSpPr>
+        <p:spPr>
+          <a:xfrm>
+            <a:off x="357158" y="2143116"/>
+            <a:ext cx="8229600" cy="1500198"/>
+          </a:xfrm>
+        </p:spPr>
+        <p:txBody>
+          <a:bodyPr>
+            <a:normAutofit/>
+          </a:bodyPr>
+          <a:lstStyle/>
+          <a:p>
+            <a:pPr algn="ctr">
+              <a:buNone/>
+            </a:pPr>
+            <a:r>
+              <a:rPr lang="zh-CN" altLang="en-US" dirty="0" smtClean="0"/>
+              <a:t>按钮状态改变与选择管理</a:t>
+            </a:r>
+          </a:p>
+          <a:p>
+            <a:endParaRPr lang="zh-CN" altLang="en-US" dirty="0"/>
+          </a:p>
+        </p:txBody>
+      </p:sp>
+    </p:spTree>
+  </p:cSld>
+  <p:clrMapOvr>
+    <a:masterClrMapping/>
+  </p:clrMapOvr>
+  <p:timing>
+    <p:tnLst>
+      <p:par>
+        <p:cTn id="1" dur="indefinite" restart="never" nodeType="tmRoot"/>
+      </p:par>
+    </p:tnLst>
+  </p:timing>
+</p:sld>
+</file>
+
+<file path=ppt/slides/slide12.xml><?xml version="1.0" encoding="utf-8"?>
+<p:sld xmlns:a="http://schemas.openxmlformats.org/drawingml/2006/main" xmlns:r="http://schemas.openxmlformats.org/officeDocument/2006/relationships" xmlns:p="http://schemas.openxmlformats.org/presentationml/2006/main">
+  <p:cSld>
+    <p:spTree>
+      <p:nvGrpSpPr>
+        <p:cNvPr id="1" name=""/>
+        <p:cNvGrpSpPr/>
+        <p:nvPr/>
+      </p:nvGrpSpPr>
+      <p:grpSpPr>
+        <a:xfrm>
+          <a:off x="0" y="0"/>
+          <a:ext cx="0" cy="0"/>
+          <a:chOff x="0" y="0"/>
+          <a:chExt cx="0" cy="0"/>
+        </a:xfrm>
+      </p:grpSpPr>
+      <p:sp>
+        <p:nvSpPr>
+          <p:cNvPr id="2" name="标题 1"/>
+          <p:cNvSpPr>
+            <a:spLocks noGrp="1"/>
+          </p:cNvSpPr>
+          <p:nvPr>
+            <p:ph type="title"/>
+          </p:nvPr>
+        </p:nvSpPr>
+        <p:spPr>
+          <a:xfrm>
+            <a:off x="285720" y="642918"/>
+            <a:ext cx="6615130" cy="582594"/>
+          </a:xfrm>
+        </p:spPr>
+        <p:txBody>
+          <a:bodyPr>
+            <a:normAutofit/>
+          </a:bodyPr>
+          <a:lstStyle/>
+          <a:p>
+            <a:pPr algn="l">
+              <a:buFont typeface="Wingdings" pitchFamily="2" charset="2"/>
+              <a:buChar char="l"/>
+            </a:pPr>
+            <a:r>
+              <a:rPr lang="zh-CN" altLang="en-US" sz="2400" dirty="0" smtClean="0"/>
+              <a:t>按钮状态改变与选择管理</a:t>
+            </a:r>
+            <a:endParaRPr lang="zh-CN" altLang="en-US" sz="2400" dirty="0"/>
+          </a:p>
+        </p:txBody>
+      </p:sp>
+      <p:pic>
+        <p:nvPicPr>
+          <p:cNvPr id="1026" name="Picture 2"/>
+          <p:cNvPicPr>
+            <a:picLocks noChangeAspect="1" noChangeArrowheads="1"/>
+          </p:cNvPicPr>
+          <p:nvPr/>
+        </p:nvPicPr>
+        <p:blipFill>
+          <a:blip r:embed="rId2"/>
+          <a:srcRect/>
+          <a:stretch>
+            <a:fillRect/>
+          </a:stretch>
+        </p:blipFill>
+        <p:spPr bwMode="auto">
+          <a:xfrm>
+            <a:off x="428596" y="1357299"/>
+            <a:ext cx="8429652" cy="3328951"/>
+          </a:xfrm>
+          <a:prstGeom prst="rect">
+            <a:avLst/>
+          </a:prstGeom>
+          <a:noFill/>
+          <a:ln w="9525">
+            <a:noFill/>
+            <a:miter lim="800000"/>
+            <a:headEnd/>
+            <a:tailEnd/>
+          </a:ln>
+          <a:effectLst/>
+        </p:spPr>
+      </p:pic>
+      <p:sp>
+        <p:nvSpPr>
+          <p:cNvPr id="4" name="TextBox 3"/>
+          <p:cNvSpPr txBox="1"/>
+          <p:nvPr/>
+        </p:nvSpPr>
+        <p:spPr>
+          <a:xfrm>
+            <a:off x="2428860" y="5500701"/>
+            <a:ext cx="4214842" cy="400110"/>
+          </a:xfrm>
+          <a:prstGeom prst="rect">
+            <a:avLst/>
+          </a:prstGeom>
+          <a:noFill/>
+        </p:spPr>
+        <p:txBody>
+          <a:bodyPr wrap="square" rtlCol="0">
+            <a:spAutoFit/>
+          </a:bodyPr>
+          <a:lstStyle/>
+          <a:p>
+            <a:pPr algn="ctr"/>
+            <a:r>
+              <a:rPr lang="en-US" altLang="zh-CN" sz="2000" dirty="0" smtClean="0"/>
+              <a:t>AllItemPage</a:t>
+            </a:r>
+            <a:r>
+              <a:rPr lang="zh-CN" altLang="en-US" sz="2000" dirty="0" smtClean="0"/>
+              <a:t>按钮菜单的初始化过程</a:t>
+            </a:r>
+            <a:endParaRPr lang="zh-CN" altLang="en-US" sz="2000" dirty="0"/>
+          </a:p>
+        </p:txBody>
+      </p:sp>
+    </p:spTree>
+  </p:cSld>
+  <p:clrMapOvr>
+    <a:masterClrMapping/>
+  </p:clrMapOvr>
+  <p:timing>
+    <p:tnLst>
+      <p:par>
+        <p:cTn id="1" dur="indefinite" restart="never" nodeType="tmRoot"/>
+      </p:par>
+    </p:tnLst>
+  </p:timing>
+</p:sld>
+</file>
+
+<file path=ppt/slides/slide13.xml><?xml version="1.0" encoding="utf-8"?>
 <p:sld xmlns:a="http://schemas.openxmlformats.org/drawingml/2006/main" xmlns:r="http://schemas.openxmlformats.org/officeDocument/2006/relationships" xmlns:p="http://schemas.openxmlformats.org/presentationml/2006/main">
   <p:cSld>
     <p:spTree>
@@ -4338,7 +4988,77 @@
 </p:sld>
 </file>
 
-<file path=ppt/slides/slide11.xml><?xml version="1.0" encoding="utf-8"?>
+<file path=ppt/slides/slide14.xml><?xml version="1.0" encoding="utf-8"?>
+<p:sld xmlns:a="http://schemas.openxmlformats.org/drawingml/2006/main" xmlns:r="http://schemas.openxmlformats.org/officeDocument/2006/relationships" xmlns:p="http://schemas.openxmlformats.org/presentationml/2006/main">
+  <p:cSld>
+    <p:spTree>
+      <p:nvGrpSpPr>
+        <p:cNvPr id="1" name=""/>
+        <p:cNvGrpSpPr/>
+        <p:nvPr/>
+      </p:nvGrpSpPr>
+      <p:grpSpPr>
+        <a:xfrm>
+          <a:off x="0" y="0"/>
+          <a:ext cx="0" cy="0"/>
+          <a:chOff x="0" y="0"/>
+          <a:chExt cx="0" cy="0"/>
+        </a:xfrm>
+      </p:grpSpPr>
+      <p:sp>
+        <p:nvSpPr>
+          <p:cNvPr id="3" name="内容占位符 2"/>
+          <p:cNvSpPr>
+            <a:spLocks noGrp="1"/>
+          </p:cNvSpPr>
+          <p:nvPr>
+            <p:ph idx="1"/>
+          </p:nvPr>
+        </p:nvSpPr>
+        <p:spPr>
+          <a:xfrm>
+            <a:off x="357158" y="2143116"/>
+            <a:ext cx="8229600" cy="1500198"/>
+          </a:xfrm>
+        </p:spPr>
+        <p:txBody>
+          <a:bodyPr>
+            <a:normAutofit/>
+          </a:bodyPr>
+          <a:lstStyle/>
+          <a:p>
+            <a:pPr algn="ctr">
+              <a:buNone/>
+            </a:pPr>
+            <a:r>
+              <a:rPr lang="zh-CN" altLang="en-US" dirty="0" smtClean="0"/>
+              <a:t>图片数据库结构</a:t>
+            </a:r>
+          </a:p>
+          <a:p>
+            <a:pPr>
+              <a:buNone/>
+            </a:pPr>
+            <a:endParaRPr lang="zh-CN" altLang="en-US" dirty="0"/>
+          </a:p>
+        </p:txBody>
+      </p:sp>
+    </p:spTree>
+  </p:cSld>
+  <p:clrMapOvr>
+    <a:masterClrMapping/>
+  </p:clrMapOvr>
+  <p:timing>
+    <p:tnLst>
+      <p:par>
+        <p:cTn id="1" dur="indefinite" restart="never" nodeType="tmRoot"/>
+      </p:par>
+    </p:tnLst>
+  </p:timing>
+</p:sld>
+</file>
+
+<file path=ppt/slides/slide15.xml><?xml version="1.0" encoding="utf-8"?>
 <p:sld xmlns:a="http://schemas.openxmlformats.org/drawingml/2006/main" xmlns:r="http://schemas.openxmlformats.org/officeDocument/2006/relationships" xmlns:p="http://schemas.openxmlformats.org/presentationml/2006/main">
   <p:cSld>
     <p:spTree>
@@ -4683,7 +5403,11 @@
                       <a:pPr algn="ctr"/>
                       <a:r>
                         <a:rPr lang="zh-CN" altLang="en-US" sz="1900" dirty="0" smtClean="0"/>
-                        <a:t>时间检索</a:t>
+                        <a:t>拍摄时间 用于时间</a:t>
+                      </a:r>
+                      <a:r>
+                        <a:rPr lang="zh-CN" altLang="en-US" sz="1900" dirty="0" smtClean="0"/>
+                        <a:t>检索</a:t>
                       </a:r>
                       <a:endParaRPr lang="zh-CN" altLang="en-US" sz="1900" dirty="0"/>
                     </a:p>
@@ -4874,7 +5598,7 @@
 </p:sld>
 </file>
 
-<file path=ppt/slides/slide12.xml><?xml version="1.0" encoding="utf-8"?>
+<file path=ppt/slides/slide16.xml><?xml version="1.0" encoding="utf-8"?>
 <p:sld xmlns:a="http://schemas.openxmlformats.org/drawingml/2006/main" xmlns:r="http://schemas.openxmlformats.org/officeDocument/2006/relationships" xmlns:p="http://schemas.openxmlformats.org/presentationml/2006/main">
   <p:cSld>
     <p:spTree>
@@ -4973,7 +5697,7 @@
 </p:sld>
 </file>
 
-<file path=ppt/slides/slide13.xml><?xml version="1.0" encoding="utf-8"?>
+<file path=ppt/slides/slide17.xml><?xml version="1.0" encoding="utf-8"?>
 <p:sld xmlns:a="http://schemas.openxmlformats.org/drawingml/2006/main" xmlns:r="http://schemas.openxmlformats.org/officeDocument/2006/relationships" xmlns:p="http://schemas.openxmlformats.org/presentationml/2006/main">
   <p:cSld>
     <p:spTree>
@@ -4992,6 +5716,73 @@
       </p:grpSpPr>
       <p:sp>
         <p:nvSpPr>
+          <p:cNvPr id="3" name="内容占位符 2"/>
+          <p:cNvSpPr>
+            <a:spLocks noGrp="1"/>
+          </p:cNvSpPr>
+          <p:nvPr>
+            <p:ph idx="1"/>
+          </p:nvPr>
+        </p:nvSpPr>
+        <p:spPr>
+          <a:xfrm>
+            <a:off x="357158" y="2143116"/>
+            <a:ext cx="8229600" cy="1500198"/>
+          </a:xfrm>
+        </p:spPr>
+        <p:txBody>
+          <a:bodyPr>
+            <a:normAutofit/>
+          </a:bodyPr>
+          <a:lstStyle/>
+          <a:p>
+            <a:pPr algn="ctr">
+              <a:buNone/>
+            </a:pPr>
+            <a:r>
+              <a:rPr lang="zh-CN" altLang="en-US" dirty="0" smtClean="0"/>
+              <a:t>照片编辑与手势操作</a:t>
+            </a:r>
+          </a:p>
+          <a:p>
+            <a:endParaRPr lang="zh-CN" altLang="en-US" dirty="0"/>
+          </a:p>
+        </p:txBody>
+      </p:sp>
+    </p:spTree>
+  </p:cSld>
+  <p:clrMapOvr>
+    <a:masterClrMapping/>
+  </p:clrMapOvr>
+  <p:timing>
+    <p:tnLst>
+      <p:par>
+        <p:cTn id="1" dur="indefinite" restart="never" nodeType="tmRoot"/>
+      </p:par>
+    </p:tnLst>
+  </p:timing>
+</p:sld>
+</file>
+
+<file path=ppt/slides/slide18.xml><?xml version="1.0" encoding="utf-8"?>
+<p:sld xmlns:a="http://schemas.openxmlformats.org/drawingml/2006/main" xmlns:r="http://schemas.openxmlformats.org/officeDocument/2006/relationships" xmlns:p="http://schemas.openxmlformats.org/presentationml/2006/main">
+  <p:cSld>
+    <p:spTree>
+      <p:nvGrpSpPr>
+        <p:cNvPr id="1" name=""/>
+        <p:cNvGrpSpPr/>
+        <p:nvPr/>
+      </p:nvGrpSpPr>
+      <p:grpSpPr>
+        <a:xfrm>
+          <a:off x="0" y="0"/>
+          <a:ext cx="0" cy="0"/>
+          <a:chOff x="0" y="0"/>
+          <a:chExt cx="0" cy="0"/>
+        </a:xfrm>
+      </p:grpSpPr>
+      <p:sp>
+        <p:nvSpPr>
           <p:cNvPr id="2" name="标题 1"/>
           <p:cNvSpPr>
             <a:spLocks noGrp="1"/>
@@ -5018,11 +5809,7 @@
             </a:pPr>
             <a:r>
               <a:rPr lang="zh-CN" altLang="en-US" sz="2400" dirty="0" smtClean="0"/>
-              <a:t>照片</a:t>
-            </a:r>
-            <a:r>
-              <a:rPr lang="zh-CN" altLang="en-US" sz="2400" dirty="0" smtClean="0"/>
-              <a:t>编辑</a:t>
+              <a:t>照片编辑</a:t>
             </a:r>
             <a:endParaRPr lang="zh-CN" altLang="en-US" sz="2400" dirty="0"/>
           </a:p>
@@ -5069,7 +5856,7 @@
 </p:sld>
 </file>
 
-<file path=ppt/slides/slide14.xml><?xml version="1.0" encoding="utf-8"?>
+<file path=ppt/slides/slide19.xml><?xml version="1.0" encoding="utf-8"?>
 <p:sld xmlns:a="http://schemas.openxmlformats.org/drawingml/2006/main" xmlns:r="http://schemas.openxmlformats.org/officeDocument/2006/relationships" xmlns:p="http://schemas.openxmlformats.org/presentationml/2006/main">
   <p:cSld>
     <p:spTree>
@@ -5120,85 +5907,16 @@
           </a:p>
         </p:txBody>
       </p:sp>
-    </p:spTree>
-  </p:cSld>
-  <p:clrMapOvr>
-    <a:masterClrMapping/>
-  </p:clrMapOvr>
-  <p:timing>
-    <p:tnLst>
-      <p:par>
-        <p:cTn id="1" dur="indefinite" restart="never" nodeType="tmRoot"/>
-      </p:par>
-    </p:tnLst>
-  </p:timing>
-</p:sld>
-</file>
-
-<file path=ppt/slides/slide15.xml><?xml version="1.0" encoding="utf-8"?>
-<p:sld xmlns:a="http://schemas.openxmlformats.org/drawingml/2006/main" xmlns:r="http://schemas.openxmlformats.org/officeDocument/2006/relationships" xmlns:p="http://schemas.openxmlformats.org/presentationml/2006/main">
-  <p:cSld>
-    <p:spTree>
-      <p:nvGrpSpPr>
-        <p:cNvPr id="1" name=""/>
-        <p:cNvGrpSpPr/>
-        <p:nvPr/>
-      </p:nvGrpSpPr>
-      <p:grpSpPr>
-        <a:xfrm>
-          <a:off x="0" y="0"/>
-          <a:ext cx="0" cy="0"/>
-          <a:chOff x="0" y="0"/>
-          <a:chExt cx="0" cy="0"/>
-        </a:xfrm>
-      </p:grpSpPr>
-      <p:sp>
-        <p:nvSpPr>
-          <p:cNvPr id="2" name="标题 1"/>
-          <p:cNvSpPr>
-            <a:spLocks noGrp="1"/>
-          </p:cNvSpPr>
-          <p:nvPr>
-            <p:ph type="title"/>
-          </p:nvPr>
-        </p:nvSpPr>
-        <p:spPr>
-          <a:xfrm>
-            <a:off x="428596" y="642918"/>
-            <a:ext cx="8229600" cy="1143000"/>
-          </a:xfrm>
-        </p:spPr>
-        <p:txBody>
-          <a:bodyPr>
-            <a:normAutofit/>
-          </a:bodyPr>
-          <a:lstStyle/>
-          <a:p>
-            <a:pPr algn="l"/>
-            <a:r>
-              <a:rPr lang="zh-CN" altLang="en-US" sz="4000" b="1" dirty="0" smtClean="0">
-                <a:latin typeface="黑体" pitchFamily="49" charset="-122"/>
-                <a:ea typeface="黑体" pitchFamily="49" charset="-122"/>
-              </a:rPr>
-              <a:t>其他工作</a:t>
-            </a:r>
-            <a:endParaRPr lang="zh-CN" altLang="en-US" sz="4000" b="1" dirty="0">
-              <a:latin typeface="黑体" pitchFamily="49" charset="-122"/>
-              <a:ea typeface="黑体" pitchFamily="49" charset="-122"/>
-            </a:endParaRPr>
-          </a:p>
-        </p:txBody>
-      </p:sp>
       <p:pic>
         <p:nvPicPr>
-          <p:cNvPr id="1029" name="Picture 5" descr="http://www.portableappc.com/wp-content/uploads/2011/09/appicon_1282.png"/>
+          <p:cNvPr id="1026" name="Picture 2" descr="D:\我的文档\桌面\手势操作.jpg"/>
           <p:cNvPicPr>
             <a:picLocks noChangeAspect="1" noChangeArrowheads="1"/>
           </p:cNvPicPr>
           <p:nvPr/>
         </p:nvPicPr>
         <p:blipFill>
-          <a:blip r:embed="rId2"/>
+          <a:blip r:embed="rId3"/>
           <a:srcRect/>
           <a:stretch>
             <a:fillRect/>
@@ -5206,8 +5924,8 @@
         </p:blipFill>
         <p:spPr bwMode="auto">
           <a:xfrm>
-            <a:off x="7072330" y="1142984"/>
-            <a:ext cx="1219200" cy="1219201"/>
+            <a:off x="785786" y="1285860"/>
+            <a:ext cx="7572428" cy="4921591"/>
           </a:xfrm>
           <a:prstGeom prst="rect">
             <a:avLst/>
@@ -5215,90 +5933,6 @@
           <a:noFill/>
         </p:spPr>
       </p:pic>
-      <p:sp>
-        <p:nvSpPr>
-          <p:cNvPr id="5" name="内容占位符 2"/>
-          <p:cNvSpPr>
-            <a:spLocks noGrp="1"/>
-          </p:cNvSpPr>
-          <p:nvPr>
-            <p:ph idx="1"/>
-          </p:nvPr>
-        </p:nvSpPr>
-        <p:spPr>
-          <a:xfrm>
-            <a:off x="428596" y="1785926"/>
-            <a:ext cx="8229600" cy="3757625"/>
-          </a:xfrm>
-        </p:spPr>
-        <p:txBody>
-          <a:bodyPr/>
-          <a:lstStyle/>
-          <a:p>
-            <a:r>
-              <a:rPr lang="zh-CN" altLang="en-US" dirty="0" smtClean="0"/>
-              <a:t>日常：</a:t>
-            </a:r>
-            <a:r>
-              <a:rPr lang="en-US" altLang="zh-CN" dirty="0" smtClean="0"/>
-              <a:t>patch/BUG</a:t>
-            </a:r>
-            <a:r>
-              <a:rPr lang="zh-CN" altLang="en-US" dirty="0" smtClean="0"/>
-              <a:t>处理 </a:t>
-            </a:r>
-            <a:endParaRPr lang="en-US" altLang="zh-CN" dirty="0" smtClean="0"/>
-          </a:p>
-          <a:p>
-            <a:pPr>
-              <a:buNone/>
-            </a:pPr>
-            <a:r>
-              <a:rPr lang="en-US" altLang="zh-CN" dirty="0" smtClean="0"/>
-              <a:t>		       </a:t>
-            </a:r>
-            <a:r>
-              <a:rPr lang="zh-CN" altLang="en-US" dirty="0" smtClean="0"/>
-              <a:t>缅甸文超长字符串处理</a:t>
-            </a:r>
-            <a:endParaRPr lang="en-US" altLang="zh-CN" dirty="0" smtClean="0"/>
-          </a:p>
-          <a:p>
-            <a:pPr>
-              <a:buNone/>
-            </a:pPr>
-            <a:r>
-              <a:rPr lang="en-US" altLang="zh-CN" dirty="0" smtClean="0"/>
-              <a:t>		       </a:t>
-            </a:r>
-            <a:r>
-              <a:rPr lang="zh-CN" altLang="en-US" dirty="0" smtClean="0"/>
-              <a:t>源码阅读与文档整理</a:t>
-            </a:r>
-            <a:endParaRPr lang="en-US" altLang="zh-CN" dirty="0" smtClean="0"/>
-          </a:p>
-          <a:p>
-            <a:r>
-              <a:rPr lang="zh-CN" altLang="en-US" dirty="0" smtClean="0"/>
-              <a:t>学习：</a:t>
-            </a:r>
-            <a:r>
-              <a:rPr lang="en-US" altLang="zh-CN" dirty="0" smtClean="0"/>
-              <a:t>Android&amp;Java / OpenGL / Git</a:t>
-            </a:r>
-          </a:p>
-          <a:p>
-            <a:r>
-              <a:rPr lang="zh-CN" altLang="en-US" dirty="0" smtClean="0"/>
-              <a:t>专利：文档书写、想法记录</a:t>
-            </a:r>
-            <a:endParaRPr lang="en-US" altLang="zh-CN" dirty="0" smtClean="0"/>
-          </a:p>
-          <a:p>
-            <a:endParaRPr lang="zh-CN" altLang="en-US" dirty="0"/>
-          </a:p>
-        </p:txBody>
-      </p:sp>
     </p:spTree>
   </p:cSld>
   <p:clrMapOvr>
@@ -5390,6 +6024,9 @@
           </a:bodyPr>
           <a:lstStyle/>
           <a:p>
+            <a:pPr>
+              <a:buNone/>
+            </a:pPr>
             <a:r>
               <a:rPr lang="zh-CN" altLang="en-US" sz="3600" dirty="0" smtClean="0">
                 <a:latin typeface="+mn-ea"/>
@@ -5401,6 +6038,9 @@
             </a:endParaRPr>
           </a:p>
           <a:p>
+            <a:pPr>
+              <a:buNone/>
+            </a:pPr>
             <a:r>
               <a:rPr lang="zh-CN" altLang="en-US" sz="3600" dirty="0" smtClean="0">
                 <a:latin typeface="+mn-ea"/>
@@ -5410,6 +6050,185 @@
             <a:endParaRPr lang="zh-CN" altLang="en-US" sz="3600" dirty="0">
               <a:latin typeface="+mn-ea"/>
             </a:endParaRPr>
+          </a:p>
+        </p:txBody>
+      </p:sp>
+    </p:spTree>
+  </p:cSld>
+  <p:clrMapOvr>
+    <a:masterClrMapping/>
+  </p:clrMapOvr>
+  <p:timing>
+    <p:tnLst>
+      <p:par>
+        <p:cTn id="1" dur="indefinite" restart="never" nodeType="tmRoot"/>
+      </p:par>
+    </p:tnLst>
+  </p:timing>
+</p:sld>
+</file>
+
+<file path=ppt/slides/slide20.xml><?xml version="1.0" encoding="utf-8"?>
+<p:sld xmlns:a="http://schemas.openxmlformats.org/drawingml/2006/main" xmlns:r="http://schemas.openxmlformats.org/officeDocument/2006/relationships" xmlns:p="http://schemas.openxmlformats.org/presentationml/2006/main">
+  <p:cSld>
+    <p:spTree>
+      <p:nvGrpSpPr>
+        <p:cNvPr id="1" name=""/>
+        <p:cNvGrpSpPr/>
+        <p:nvPr/>
+      </p:nvGrpSpPr>
+      <p:grpSpPr>
+        <a:xfrm>
+          <a:off x="0" y="0"/>
+          <a:ext cx="0" cy="0"/>
+          <a:chOff x="0" y="0"/>
+          <a:chExt cx="0" cy="0"/>
+        </a:xfrm>
+      </p:grpSpPr>
+      <p:sp>
+        <p:nvSpPr>
+          <p:cNvPr id="2" name="标题 1"/>
+          <p:cNvSpPr>
+            <a:spLocks noGrp="1"/>
+          </p:cNvSpPr>
+          <p:nvPr>
+            <p:ph type="title"/>
+          </p:nvPr>
+        </p:nvSpPr>
+        <p:spPr>
+          <a:xfrm>
+            <a:off x="428596" y="642918"/>
+            <a:ext cx="8229600" cy="1143000"/>
+          </a:xfrm>
+        </p:spPr>
+        <p:txBody>
+          <a:bodyPr>
+            <a:normAutofit/>
+          </a:bodyPr>
+          <a:lstStyle/>
+          <a:p>
+            <a:pPr algn="l"/>
+            <a:r>
+              <a:rPr lang="zh-CN" altLang="en-US" sz="4000" b="1" dirty="0" smtClean="0">
+                <a:latin typeface="黑体" pitchFamily="49" charset="-122"/>
+                <a:ea typeface="黑体" pitchFamily="49" charset="-122"/>
+              </a:rPr>
+              <a:t>其他工作</a:t>
+            </a:r>
+            <a:endParaRPr lang="zh-CN" altLang="en-US" sz="4000" b="1" dirty="0">
+              <a:latin typeface="黑体" pitchFamily="49" charset="-122"/>
+              <a:ea typeface="黑体" pitchFamily="49" charset="-122"/>
+            </a:endParaRPr>
+          </a:p>
+        </p:txBody>
+      </p:sp>
+      <p:pic>
+        <p:nvPicPr>
+          <p:cNvPr id="1029" name="Picture 5" descr="http://www.portableappc.com/wp-content/uploads/2011/09/appicon_1282.png"/>
+          <p:cNvPicPr>
+            <a:picLocks noChangeAspect="1" noChangeArrowheads="1"/>
+          </p:cNvPicPr>
+          <p:nvPr/>
+        </p:nvPicPr>
+        <p:blipFill>
+          <a:blip r:embed="rId2"/>
+          <a:srcRect/>
+          <a:stretch>
+            <a:fillRect/>
+          </a:stretch>
+        </p:blipFill>
+        <p:spPr bwMode="auto">
+          <a:xfrm>
+            <a:off x="7072330" y="1142984"/>
+            <a:ext cx="1219200" cy="1219201"/>
+          </a:xfrm>
+          <a:prstGeom prst="rect">
+            <a:avLst/>
+          </a:prstGeom>
+          <a:noFill/>
+        </p:spPr>
+      </p:pic>
+      <p:sp>
+        <p:nvSpPr>
+          <p:cNvPr id="5" name="内容占位符 2"/>
+          <p:cNvSpPr>
+            <a:spLocks noGrp="1"/>
+          </p:cNvSpPr>
+          <p:nvPr>
+            <p:ph idx="1"/>
+          </p:nvPr>
+        </p:nvSpPr>
+        <p:spPr>
+          <a:xfrm>
+            <a:off x="428596" y="1785926"/>
+            <a:ext cx="8229600" cy="3757625"/>
+          </a:xfrm>
+        </p:spPr>
+        <p:txBody>
+          <a:bodyPr/>
+          <a:lstStyle/>
+          <a:p>
+            <a:r>
+              <a:rPr lang="zh-CN" altLang="en-US" dirty="0" smtClean="0"/>
+              <a:t>日常：</a:t>
+            </a:r>
+            <a:r>
+              <a:rPr lang="en-US" altLang="zh-CN" dirty="0" smtClean="0"/>
+              <a:t>patch/BUG</a:t>
+            </a:r>
+            <a:r>
+              <a:rPr lang="zh-CN" altLang="en-US" dirty="0" smtClean="0"/>
+              <a:t>处理 </a:t>
+            </a:r>
+            <a:endParaRPr lang="en-US" altLang="zh-CN" dirty="0" smtClean="0"/>
+          </a:p>
+          <a:p>
+            <a:pPr>
+              <a:buNone/>
+            </a:pPr>
+            <a:r>
+              <a:rPr lang="en-US" altLang="zh-CN" dirty="0" smtClean="0"/>
+              <a:t>		       </a:t>
+            </a:r>
+            <a:r>
+              <a:rPr lang="zh-CN" altLang="en-US" dirty="0" smtClean="0"/>
+              <a:t>缅甸文超长字符串处理</a:t>
+            </a:r>
+            <a:endParaRPr lang="en-US" altLang="zh-CN" dirty="0" smtClean="0"/>
+          </a:p>
+          <a:p>
+            <a:pPr>
+              <a:buNone/>
+            </a:pPr>
+            <a:r>
+              <a:rPr lang="en-US" altLang="zh-CN" dirty="0" smtClean="0"/>
+              <a:t>		       </a:t>
+            </a:r>
+            <a:r>
+              <a:rPr lang="zh-CN" altLang="en-US" dirty="0" smtClean="0"/>
+              <a:t>源码阅读与文档整理</a:t>
+            </a:r>
+            <a:endParaRPr lang="en-US" altLang="zh-CN" dirty="0" smtClean="0"/>
+          </a:p>
+          <a:p>
+            <a:r>
+              <a:rPr lang="zh-CN" altLang="en-US" dirty="0" smtClean="0"/>
+              <a:t>学习：</a:t>
+            </a:r>
+            <a:r>
+              <a:rPr lang="en-US" altLang="zh-CN" dirty="0" smtClean="0"/>
+              <a:t>Android&amp;Java / OpenGL / Git</a:t>
+            </a:r>
+          </a:p>
+          <a:p>
+            <a:r>
+              <a:rPr lang="zh-CN" altLang="en-US" dirty="0" smtClean="0"/>
+              <a:t>专利：文档书写、想法记录</a:t>
+            </a:r>
+            <a:endParaRPr lang="en-US" altLang="zh-CN" dirty="0" smtClean="0"/>
+          </a:p>
+          <a:p>
+            <a:endParaRPr lang="zh-CN" altLang="en-US" dirty="0"/>
           </a:p>
         </p:txBody>
       </p:sp>
@@ -5511,15 +6330,7 @@
           <a:p>
             <a:r>
               <a:rPr lang="zh-CN" altLang="en-US" dirty="0" smtClean="0"/>
-              <a:t>数据获取（以</a:t>
-            </a:r>
-            <a:r>
-              <a:rPr lang="en-US" altLang="zh-CN" dirty="0" smtClean="0"/>
-              <a:t>VivoAlbumSetPage</a:t>
-            </a:r>
-            <a:r>
-              <a:rPr lang="zh-CN" altLang="en-US" dirty="0" smtClean="0"/>
-              <a:t>为例）</a:t>
+              <a:t>数据获取</a:t>
             </a:r>
             <a:endParaRPr lang="en-US" altLang="zh-CN" dirty="0" smtClean="0"/>
           </a:p>
@@ -5586,6 +6397,75 @@
       </p:grpSpPr>
       <p:sp>
         <p:nvSpPr>
+          <p:cNvPr id="3" name="内容占位符 2"/>
+          <p:cNvSpPr>
+            <a:spLocks noGrp="1"/>
+          </p:cNvSpPr>
+          <p:nvPr>
+            <p:ph idx="1"/>
+          </p:nvPr>
+        </p:nvSpPr>
+        <p:spPr>
+          <a:xfrm>
+            <a:off x="357158" y="2143116"/>
+            <a:ext cx="8229600" cy="1500198"/>
+          </a:xfrm>
+        </p:spPr>
+        <p:txBody>
+          <a:bodyPr/>
+          <a:lstStyle/>
+          <a:p>
+            <a:pPr algn="ctr">
+              <a:buNone/>
+            </a:pPr>
+            <a:r>
+              <a:rPr lang="zh-CN" altLang="en-US" dirty="0" smtClean="0"/>
+              <a:t>主体结构与界面管理</a:t>
+            </a:r>
+            <a:endParaRPr lang="en-US" altLang="zh-CN" dirty="0" smtClean="0"/>
+          </a:p>
+          <a:p>
+            <a:endParaRPr lang="en-US" altLang="zh-CN" dirty="0" smtClean="0"/>
+          </a:p>
+          <a:p>
+            <a:endParaRPr lang="zh-CN" altLang="en-US" dirty="0"/>
+          </a:p>
+        </p:txBody>
+      </p:sp>
+    </p:spTree>
+  </p:cSld>
+  <p:clrMapOvr>
+    <a:masterClrMapping/>
+  </p:clrMapOvr>
+  <p:timing>
+    <p:tnLst>
+      <p:par>
+        <p:cTn id="1" dur="indefinite" restart="never" nodeType="tmRoot"/>
+      </p:par>
+    </p:tnLst>
+  </p:timing>
+</p:sld>
+</file>
+
+<file path=ppt/slides/slide5.xml><?xml version="1.0" encoding="utf-8"?>
+<p:sld xmlns:a="http://schemas.openxmlformats.org/drawingml/2006/main" xmlns:r="http://schemas.openxmlformats.org/officeDocument/2006/relationships" xmlns:p="http://schemas.openxmlformats.org/presentationml/2006/main">
+  <p:cSld>
+    <p:spTree>
+      <p:nvGrpSpPr>
+        <p:cNvPr id="1" name=""/>
+        <p:cNvGrpSpPr/>
+        <p:nvPr/>
+      </p:nvGrpSpPr>
+      <p:grpSpPr>
+        <a:xfrm>
+          <a:off x="0" y="0"/>
+          <a:ext cx="0" cy="0"/>
+          <a:chOff x="0" y="0"/>
+          <a:chExt cx="0" cy="0"/>
+        </a:xfrm>
+      </p:grpSpPr>
+      <p:sp>
+        <p:nvSpPr>
           <p:cNvPr id="2" name="标题 1"/>
           <p:cNvSpPr>
             <a:spLocks noGrp="1"/>
@@ -5635,7 +6515,7 @@
         </p:blipFill>
         <p:spPr bwMode="auto">
           <a:xfrm>
-            <a:off x="785786" y="1142984"/>
+            <a:off x="785786" y="1071546"/>
             <a:ext cx="7572428" cy="5055298"/>
           </a:xfrm>
           <a:prstGeom prst="rect">
@@ -5644,6 +6524,607 @@
           <a:noFill/>
         </p:spPr>
       </p:pic>
+      <p:sp>
+        <p:nvSpPr>
+          <p:cNvPr id="4" name="TextBox 3"/>
+          <p:cNvSpPr txBox="1"/>
+          <p:nvPr/>
+        </p:nvSpPr>
+        <p:spPr>
+          <a:xfrm>
+            <a:off x="4714876" y="1928802"/>
+            <a:ext cx="3143272" cy="369332"/>
+          </a:xfrm>
+          <a:prstGeom prst="rect">
+            <a:avLst/>
+          </a:prstGeom>
+          <a:noFill/>
+        </p:spPr>
+        <p:txBody>
+          <a:bodyPr wrap="square" rtlCol="0">
+            <a:spAutoFit/>
+          </a:bodyPr>
+          <a:lstStyle/>
+          <a:p>
+            <a:endParaRPr lang="zh-CN" altLang="en-US" dirty="0"/>
+          </a:p>
+        </p:txBody>
+      </p:sp>
+      <p:sp>
+        <p:nvSpPr>
+          <p:cNvPr id="5" name="TextBox 4"/>
+          <p:cNvSpPr txBox="1"/>
+          <p:nvPr/>
+        </p:nvSpPr>
+        <p:spPr>
+          <a:xfrm>
+            <a:off x="4000464" y="4286257"/>
+            <a:ext cx="4572064" cy="1107996"/>
+          </a:xfrm>
+          <a:prstGeom prst="rect">
+            <a:avLst/>
+          </a:prstGeom>
+          <a:solidFill>
+            <a:srgbClr val="00B0F0"/>
+          </a:solidFill>
+        </p:spPr>
+        <p:txBody>
+          <a:bodyPr wrap="square" rtlCol="0">
+            <a:spAutoFit/>
+          </a:bodyPr>
+          <a:lstStyle/>
+          <a:p>
+            <a:r>
+              <a:rPr lang="zh-CN" altLang="en-US" sz="1600" dirty="0" smtClean="0">
+                <a:solidFill>
+                  <a:schemeClr val="bg1"/>
+                </a:solidFill>
+              </a:rPr>
+              <a:t>通过</a:t>
+            </a:r>
+            <a:r>
+              <a:rPr lang="en-US" altLang="zh-CN" sz="1600" dirty="0" err="1" smtClean="0">
+                <a:solidFill>
+                  <a:schemeClr val="bg1"/>
+                </a:solidFill>
+              </a:rPr>
+              <a:t>StateManager</a:t>
+            </a:r>
+            <a:r>
+              <a:rPr lang="zh-CN" altLang="en-US" sz="1600" dirty="0" smtClean="0">
+                <a:solidFill>
+                  <a:schemeClr val="bg1"/>
+                </a:solidFill>
+              </a:rPr>
+              <a:t>管理所有</a:t>
+            </a:r>
+            <a:r>
+              <a:rPr lang="en-US" altLang="zh-CN" sz="1600" dirty="0" err="1" smtClean="0">
+                <a:solidFill>
+                  <a:schemeClr val="bg1"/>
+                </a:solidFill>
+              </a:rPr>
+              <a:t>ActivityState</a:t>
+            </a:r>
+            <a:r>
+              <a:rPr lang="zh-CN" altLang="en-US" sz="1600" dirty="0" smtClean="0">
+                <a:solidFill>
+                  <a:schemeClr val="bg1"/>
+                </a:solidFill>
+              </a:rPr>
+              <a:t>的派生类</a:t>
+            </a:r>
+            <a:endParaRPr lang="en-US" altLang="zh-CN" sz="1600" dirty="0" smtClean="0">
+              <a:solidFill>
+                <a:schemeClr val="bg1"/>
+              </a:solidFill>
+            </a:endParaRPr>
+          </a:p>
+          <a:p>
+            <a:r>
+              <a:rPr lang="en-US" altLang="zh-CN" sz="1600" dirty="0" smtClean="0">
+                <a:solidFill>
+                  <a:schemeClr val="bg1"/>
+                </a:solidFill>
+              </a:rPr>
+              <a:t>Stack&lt;</a:t>
+            </a:r>
+            <a:r>
+              <a:rPr lang="en-US" altLang="zh-CN" sz="1600" dirty="0" err="1" smtClean="0">
+                <a:solidFill>
+                  <a:schemeClr val="bg1"/>
+                </a:solidFill>
+              </a:rPr>
+              <a:t>StateEntry</a:t>
+            </a:r>
+            <a:r>
+              <a:rPr lang="en-US" altLang="zh-CN" sz="1600" dirty="0" smtClean="0">
+                <a:solidFill>
+                  <a:schemeClr val="bg1"/>
+                </a:solidFill>
+              </a:rPr>
+              <a:t>&gt; </a:t>
+            </a:r>
+            <a:r>
+              <a:rPr lang="en-US" altLang="zh-CN" sz="1600" dirty="0" err="1" smtClean="0">
+                <a:solidFill>
+                  <a:schemeClr val="bg1"/>
+                </a:solidFill>
+              </a:rPr>
+              <a:t>mStack</a:t>
+            </a:r>
+            <a:r>
+              <a:rPr lang="zh-CN" altLang="en-US" sz="1600" dirty="0" smtClean="0">
+                <a:solidFill>
+                  <a:schemeClr val="bg1"/>
+                </a:solidFill>
+              </a:rPr>
+              <a:t>：以栈的形式管理界面</a:t>
+            </a:r>
+            <a:endParaRPr lang="en-US" altLang="zh-CN" sz="1600" dirty="0" smtClean="0">
+              <a:solidFill>
+                <a:schemeClr val="bg1"/>
+              </a:solidFill>
+            </a:endParaRPr>
+          </a:p>
+          <a:p>
+            <a:r>
+              <a:rPr lang="en-US" altLang="zh-CN" sz="1600" dirty="0" err="1" smtClean="0">
+                <a:solidFill>
+                  <a:schemeClr val="bg1"/>
+                </a:solidFill>
+              </a:rPr>
+              <a:t>StateEntry</a:t>
+            </a:r>
+            <a:r>
+              <a:rPr lang="zh-CN" altLang="en-US" sz="1600" dirty="0" smtClean="0">
+                <a:solidFill>
+                  <a:schemeClr val="bg1"/>
+                </a:solidFill>
+              </a:rPr>
+              <a:t>：</a:t>
+            </a:r>
+            <a:r>
+              <a:rPr lang="en-US" altLang="zh-CN" sz="1600" dirty="0" smtClean="0">
+                <a:solidFill>
+                  <a:schemeClr val="bg1"/>
+                </a:solidFill>
+              </a:rPr>
+              <a:t>data | </a:t>
+            </a:r>
+            <a:r>
+              <a:rPr lang="en-US" altLang="zh-CN" sz="1600" dirty="0" err="1" smtClean="0">
+                <a:solidFill>
+                  <a:schemeClr val="bg1"/>
+                </a:solidFill>
+              </a:rPr>
+              <a:t>activityState</a:t>
+            </a:r>
+            <a:endParaRPr lang="zh-CN" altLang="en-US" sz="1600" dirty="0" smtClean="0">
+              <a:solidFill>
+                <a:schemeClr val="bg1"/>
+              </a:solidFill>
+            </a:endParaRPr>
+          </a:p>
+          <a:p>
+            <a:endParaRPr lang="zh-CN" altLang="en-US" dirty="0">
+              <a:solidFill>
+                <a:schemeClr val="bg1"/>
+              </a:solidFill>
+            </a:endParaRPr>
+          </a:p>
+        </p:txBody>
+      </p:sp>
+      <p:sp>
+        <p:nvSpPr>
+          <p:cNvPr id="6" name="TextBox 5"/>
+          <p:cNvSpPr txBox="1"/>
+          <p:nvPr/>
+        </p:nvSpPr>
+        <p:spPr>
+          <a:xfrm>
+            <a:off x="4000496" y="4286256"/>
+            <a:ext cx="4572064" cy="1107996"/>
+          </a:xfrm>
+          <a:prstGeom prst="rect">
+            <a:avLst/>
+          </a:prstGeom>
+          <a:solidFill>
+            <a:srgbClr val="00B0F0"/>
+          </a:solidFill>
+        </p:spPr>
+        <p:txBody>
+          <a:bodyPr wrap="square" rtlCol="0">
+            <a:spAutoFit/>
+          </a:bodyPr>
+          <a:lstStyle/>
+          <a:p>
+            <a:r>
+              <a:rPr lang="zh-CN" altLang="en-US" sz="1600" dirty="0" smtClean="0">
+                <a:solidFill>
+                  <a:schemeClr val="bg1"/>
+                </a:solidFill>
+              </a:rPr>
+              <a:t>界面切换过程：通过</a:t>
+            </a:r>
+            <a:r>
+              <a:rPr lang="en-US" altLang="zh-CN" sz="1600" dirty="0" smtClean="0">
+                <a:solidFill>
+                  <a:schemeClr val="bg1"/>
+                </a:solidFill>
+              </a:rPr>
+              <a:t>intent</a:t>
+            </a:r>
+            <a:r>
+              <a:rPr lang="zh-CN" altLang="en-US" sz="1600" dirty="0" smtClean="0">
+                <a:solidFill>
+                  <a:schemeClr val="bg1"/>
+                </a:solidFill>
+              </a:rPr>
+              <a:t>跳转到对应的</a:t>
+            </a:r>
+            <a:r>
+              <a:rPr lang="en-US" altLang="zh-CN" sz="1600" dirty="0" smtClean="0">
+                <a:solidFill>
+                  <a:schemeClr val="bg1"/>
+                </a:solidFill>
+              </a:rPr>
+              <a:t>activity </a:t>
+            </a:r>
+            <a:r>
+              <a:rPr lang="en-US" altLang="zh-CN" sz="1600" dirty="0" smtClean="0">
+                <a:solidFill>
+                  <a:schemeClr val="bg1"/>
+                </a:solidFill>
+                <a:sym typeface="Wingdings" pitchFamily="2" charset="2"/>
+              </a:rPr>
+              <a:t> </a:t>
+            </a:r>
+            <a:r>
+              <a:rPr lang="zh-CN" altLang="en-US" sz="1600" dirty="0" smtClean="0">
+                <a:solidFill>
+                  <a:schemeClr val="bg1"/>
+                </a:solidFill>
+              </a:rPr>
+              <a:t>新页面的初始化</a:t>
+            </a:r>
+            <a:r>
+              <a:rPr lang="en-US" altLang="zh-CN" sz="1600" dirty="0" err="1" smtClean="0">
+                <a:solidFill>
+                  <a:schemeClr val="bg1"/>
+                </a:solidFill>
+              </a:rPr>
+              <a:t>startState</a:t>
+            </a:r>
+            <a:r>
+              <a:rPr lang="zh-CN" altLang="en-US" sz="1600" dirty="0" smtClean="0">
+                <a:solidFill>
+                  <a:schemeClr val="bg1"/>
+                </a:solidFill>
+              </a:rPr>
+              <a:t> </a:t>
+            </a:r>
+            <a:endParaRPr lang="en-US" altLang="zh-CN" sz="1600" dirty="0" smtClean="0">
+              <a:solidFill>
+                <a:schemeClr val="bg1"/>
+              </a:solidFill>
+            </a:endParaRPr>
+          </a:p>
+          <a:p>
+            <a:r>
+              <a:rPr lang="zh-CN" altLang="en-US" sz="1600" dirty="0" smtClean="0">
+                <a:solidFill>
+                  <a:schemeClr val="bg1"/>
+                </a:solidFill>
+              </a:rPr>
+              <a:t>页面</a:t>
+            </a:r>
+            <a:r>
+              <a:rPr lang="zh-CN" altLang="en-US" sz="1600" dirty="0" smtClean="0">
+                <a:solidFill>
+                  <a:schemeClr val="bg1"/>
+                </a:solidFill>
+              </a:rPr>
+              <a:t>结束</a:t>
+            </a:r>
+            <a:r>
+              <a:rPr lang="en-US" altLang="zh-CN" sz="1600" dirty="0" err="1" smtClean="0">
+                <a:solidFill>
+                  <a:schemeClr val="bg1"/>
+                </a:solidFill>
+              </a:rPr>
+              <a:t>finishState</a:t>
+            </a:r>
+            <a:endParaRPr lang="en-US" altLang="zh-CN" sz="1600" dirty="0" smtClean="0">
+              <a:solidFill>
+                <a:schemeClr val="bg1"/>
+              </a:solidFill>
+            </a:endParaRPr>
+          </a:p>
+          <a:p>
+            <a:endParaRPr lang="zh-CN" altLang="en-US" dirty="0">
+              <a:solidFill>
+                <a:schemeClr val="bg1"/>
+              </a:solidFill>
+            </a:endParaRPr>
+          </a:p>
+        </p:txBody>
+      </p:sp>
+    </p:spTree>
+  </p:cSld>
+  <p:clrMapOvr>
+    <a:masterClrMapping/>
+  </p:clrMapOvr>
+  <p:timing>
+    <p:tnLst>
+      <p:par>
+        <p:cTn id="1" dur="indefinite" restart="never" nodeType="tmRoot">
+          <p:childTnLst>
+            <p:seq concurrent="1" nextAc="seek">
+              <p:cTn id="2" dur="indefinite" nodeType="mainSeq">
+                <p:childTnLst>
+                  <p:par>
+                    <p:cTn id="3" fill="hold">
+                      <p:stCondLst>
+                        <p:cond delay="indefinite"/>
+                      </p:stCondLst>
+                      <p:childTnLst>
+                        <p:par>
+                          <p:cTn id="4" fill="hold">
+                            <p:stCondLst>
+                              <p:cond delay="0"/>
+                            </p:stCondLst>
+                            <p:childTnLst>
+                              <p:par>
+                                <p:cTn id="5" presetID="2" presetClass="entr" presetSubtype="4" fill="hold" grpId="0" nodeType="clickEffect">
+                                  <p:stCondLst>
+                                    <p:cond delay="0"/>
+                                  </p:stCondLst>
+                                  <p:childTnLst>
+                                    <p:set>
+                                      <p:cBhvr>
+                                        <p:cTn id="6" dur="1" fill="hold">
+                                          <p:stCondLst>
+                                            <p:cond delay="0"/>
+                                          </p:stCondLst>
+                                        </p:cTn>
+                                        <p:tgtEl>
+                                          <p:spTgt spid="5"/>
+                                        </p:tgtEl>
+                                        <p:attrNameLst>
+                                          <p:attrName>style.visibility</p:attrName>
+                                        </p:attrNameLst>
+                                      </p:cBhvr>
+                                      <p:to>
+                                        <p:strVal val="visible"/>
+                                      </p:to>
+                                    </p:set>
+                                    <p:anim calcmode="lin" valueType="num">
+                                      <p:cBhvr additive="base">
+                                        <p:cTn id="7" dur="500" fill="hold"/>
+                                        <p:tgtEl>
+                                          <p:spTgt spid="5"/>
+                                        </p:tgtEl>
+                                        <p:attrNameLst>
+                                          <p:attrName>ppt_x</p:attrName>
+                                        </p:attrNameLst>
+                                      </p:cBhvr>
+                                      <p:tavLst>
+                                        <p:tav tm="0">
+                                          <p:val>
+                                            <p:strVal val="#ppt_x"/>
+                                          </p:val>
+                                        </p:tav>
+                                        <p:tav tm="100000">
+                                          <p:val>
+                                            <p:strVal val="#ppt_x"/>
+                                          </p:val>
+                                        </p:tav>
+                                      </p:tavLst>
+                                    </p:anim>
+                                    <p:anim calcmode="lin" valueType="num">
+                                      <p:cBhvr additive="base">
+                                        <p:cTn id="8" dur="500" fill="hold"/>
+                                        <p:tgtEl>
+                                          <p:spTgt spid="5"/>
+                                        </p:tgtEl>
+                                        <p:attrNameLst>
+                                          <p:attrName>ppt_y</p:attrName>
+                                        </p:attrNameLst>
+                                      </p:cBhvr>
+                                      <p:tavLst>
+                                        <p:tav tm="0">
+                                          <p:val>
+                                            <p:strVal val="1+#ppt_h/2"/>
+                                          </p:val>
+                                        </p:tav>
+                                        <p:tav tm="100000">
+                                          <p:val>
+                                            <p:strVal val="#ppt_y"/>
+                                          </p:val>
+                                        </p:tav>
+                                      </p:tavLst>
+                                    </p:anim>
+                                  </p:childTnLst>
+                                </p:cTn>
+                              </p:par>
+                            </p:childTnLst>
+                          </p:cTn>
+                        </p:par>
+                      </p:childTnLst>
+                    </p:cTn>
+                  </p:par>
+                  <p:par>
+                    <p:cTn id="9" fill="hold">
+                      <p:stCondLst>
+                        <p:cond delay="indefinite"/>
+                      </p:stCondLst>
+                      <p:childTnLst>
+                        <p:par>
+                          <p:cTn id="10" fill="hold">
+                            <p:stCondLst>
+                              <p:cond delay="0"/>
+                            </p:stCondLst>
+                            <p:childTnLst>
+                              <p:par>
+                                <p:cTn id="11" presetID="2" presetClass="entr" presetSubtype="4" fill="hold" grpId="0" nodeType="clickEffect">
+                                  <p:stCondLst>
+                                    <p:cond delay="0"/>
+                                  </p:stCondLst>
+                                  <p:childTnLst>
+                                    <p:set>
+                                      <p:cBhvr>
+                                        <p:cTn id="12" dur="1" fill="hold">
+                                          <p:stCondLst>
+                                            <p:cond delay="0"/>
+                                          </p:stCondLst>
+                                        </p:cTn>
+                                        <p:tgtEl>
+                                          <p:spTgt spid="6"/>
+                                        </p:tgtEl>
+                                        <p:attrNameLst>
+                                          <p:attrName>style.visibility</p:attrName>
+                                        </p:attrNameLst>
+                                      </p:cBhvr>
+                                      <p:to>
+                                        <p:strVal val="visible"/>
+                                      </p:to>
+                                    </p:set>
+                                    <p:anim calcmode="lin" valueType="num">
+                                      <p:cBhvr additive="base">
+                                        <p:cTn id="13" dur="500" fill="hold"/>
+                                        <p:tgtEl>
+                                          <p:spTgt spid="6"/>
+                                        </p:tgtEl>
+                                        <p:attrNameLst>
+                                          <p:attrName>ppt_x</p:attrName>
+                                        </p:attrNameLst>
+                                      </p:cBhvr>
+                                      <p:tavLst>
+                                        <p:tav tm="0">
+                                          <p:val>
+                                            <p:strVal val="#ppt_x"/>
+                                          </p:val>
+                                        </p:tav>
+                                        <p:tav tm="100000">
+                                          <p:val>
+                                            <p:strVal val="#ppt_x"/>
+                                          </p:val>
+                                        </p:tav>
+                                      </p:tavLst>
+                                    </p:anim>
+                                    <p:anim calcmode="lin" valueType="num">
+                                      <p:cBhvr additive="base">
+                                        <p:cTn id="14" dur="500" fill="hold"/>
+                                        <p:tgtEl>
+                                          <p:spTgt spid="6"/>
+                                        </p:tgtEl>
+                                        <p:attrNameLst>
+                                          <p:attrName>ppt_y</p:attrName>
+                                        </p:attrNameLst>
+                                      </p:cBhvr>
+                                      <p:tavLst>
+                                        <p:tav tm="0">
+                                          <p:val>
+                                            <p:strVal val="1+#ppt_h/2"/>
+                                          </p:val>
+                                        </p:tav>
+                                        <p:tav tm="100000">
+                                          <p:val>
+                                            <p:strVal val="#ppt_y"/>
+                                          </p:val>
+                                        </p:tav>
+                                      </p:tavLst>
+                                    </p:anim>
+                                  </p:childTnLst>
+                                </p:cTn>
+                              </p:par>
+                            </p:childTnLst>
+                          </p:cTn>
+                        </p:par>
+                      </p:childTnLst>
+                    </p:cTn>
+                  </p:par>
+                </p:childTnLst>
+              </p:cTn>
+              <p:prevCondLst>
+                <p:cond evt="onPrev" delay="0">
+                  <p:tgtEl>
+                    <p:sldTgt/>
+                  </p:tgtEl>
+                </p:cond>
+              </p:prevCondLst>
+              <p:nextCondLst>
+                <p:cond evt="onNext" delay="0">
+                  <p:tgtEl>
+                    <p:sldTgt/>
+                  </p:tgtEl>
+                </p:cond>
+              </p:nextCondLst>
+            </p:seq>
+          </p:childTnLst>
+        </p:cTn>
+      </p:par>
+    </p:tnLst>
+    <p:bldLst>
+      <p:bldP spid="5" grpId="0" animBg="1"/>
+      <p:bldP spid="6" grpId="0" animBg="1"/>
+    </p:bldLst>
+  </p:timing>
+</p:sld>
+</file>
+
+<file path=ppt/slides/slide6.xml><?xml version="1.0" encoding="utf-8"?>
+<p:sld xmlns:a="http://schemas.openxmlformats.org/drawingml/2006/main" xmlns:r="http://schemas.openxmlformats.org/officeDocument/2006/relationships" xmlns:p="http://schemas.openxmlformats.org/presentationml/2006/main">
+  <p:cSld>
+    <p:spTree>
+      <p:nvGrpSpPr>
+        <p:cNvPr id="1" name=""/>
+        <p:cNvGrpSpPr/>
+        <p:nvPr/>
+      </p:nvGrpSpPr>
+      <p:grpSpPr>
+        <a:xfrm>
+          <a:off x="0" y="0"/>
+          <a:ext cx="0" cy="0"/>
+          <a:chOff x="0" y="0"/>
+          <a:chExt cx="0" cy="0"/>
+        </a:xfrm>
+      </p:grpSpPr>
+      <p:sp>
+        <p:nvSpPr>
+          <p:cNvPr id="3" name="内容占位符 2"/>
+          <p:cNvSpPr>
+            <a:spLocks noGrp="1"/>
+          </p:cNvSpPr>
+          <p:nvPr>
+            <p:ph idx="1"/>
+          </p:nvPr>
+        </p:nvSpPr>
+        <p:spPr>
+          <a:xfrm>
+            <a:off x="357158" y="2143116"/>
+            <a:ext cx="8229600" cy="1500198"/>
+          </a:xfrm>
+        </p:spPr>
+        <p:txBody>
+          <a:bodyPr/>
+          <a:lstStyle/>
+          <a:p>
+            <a:pPr algn="ctr">
+              <a:buNone/>
+            </a:pPr>
+            <a:r>
+              <a:rPr lang="zh-CN" altLang="en-US" dirty="0" smtClean="0"/>
+              <a:t>数据获取</a:t>
+            </a:r>
+            <a:endParaRPr lang="en-US" altLang="zh-CN" dirty="0" smtClean="0"/>
+          </a:p>
+          <a:p>
+            <a:endParaRPr lang="zh-CN" altLang="en-US" dirty="0"/>
+          </a:p>
+        </p:txBody>
+      </p:sp>
     </p:spTree>
   </p:cSld>
   <p:clrMapOvr>
@@ -5659,7 +7140,7 @@
 </p:sld>
 </file>
 
-<file path=ppt/slides/slide5.xml><?xml version="1.0" encoding="utf-8"?>
+<file path=ppt/slides/slide7.xml><?xml version="1.0" encoding="utf-8"?>
 <p:sld xmlns:a="http://schemas.openxmlformats.org/drawingml/2006/main" xmlns:r="http://schemas.openxmlformats.org/officeDocument/2006/relationships" xmlns:p="http://schemas.openxmlformats.org/presentationml/2006/main">
   <p:cSld>
     <p:spTree>
@@ -6067,7 +7548,7 @@
 </p:sld>
 </file>
 
-<file path=ppt/slides/slide6.xml><?xml version="1.0" encoding="utf-8"?>
+<file path=ppt/slides/slide8.xml><?xml version="1.0" encoding="utf-8"?>
 <p:sld xmlns:a="http://schemas.openxmlformats.org/drawingml/2006/main" xmlns:r="http://schemas.openxmlformats.org/officeDocument/2006/relationships" xmlns:p="http://schemas.openxmlformats.org/presentationml/2006/main">
   <p:cSld>
     <p:spTree>
@@ -6130,7 +7611,7 @@
         </p:nvSpPr>
         <p:spPr>
           <a:xfrm>
-            <a:off x="1000100" y="1285860"/>
+            <a:off x="2500298" y="1285860"/>
             <a:ext cx="4929222" cy="461665"/>
           </a:xfrm>
           <a:prstGeom prst="rect">
@@ -6146,7 +7627,7 @@
           <a:p>
             <a:r>
               <a:rPr lang="en-US" altLang="zh-CN" sz="2400" dirty="0" smtClean="0"/>
-              <a:t>add(String pattern, int kind)</a:t>
+              <a:t>ComboSource:</a:t>
             </a:r>
             <a:endParaRPr lang="zh-CN" altLang="en-US" sz="2400" dirty="0"/>
           </a:p>
@@ -6252,22 +7733,14 @@
           <a:lstStyle/>
           <a:p>
             <a:r>
-              <a:rPr lang="en-US" altLang="zh-CN" sz="2000" dirty="0" err="1" smtClean="0"/>
-              <a:t>mMatcher.add</a:t>
-            </a:r>
-            <a:r>
               <a:rPr lang="en-US" altLang="zh-CN" sz="2000" dirty="0" smtClean="0"/>
-              <a:t>("/combo/*", COMBO_ALBUMSET);</a:t>
-            </a:r>
-          </a:p>
-          <a:p>
-            <a:r>
-              <a:rPr lang="en-US" altLang="zh-CN" sz="2000" dirty="0" err="1" smtClean="0"/>
-              <a:t>mMatcher.add</a:t>
-            </a:r>
+              <a:t>mMatcher.add("/combo/*", COMBO_ALBUMSET);</a:t>
+            </a:r>
+          </a:p>
+          <a:p>
             <a:r>
               <a:rPr lang="en-US" altLang="zh-CN" sz="2000" dirty="0" smtClean="0"/>
-              <a:t>("/combo/*/*", COMBO_ALBUM);</a:t>
+              <a:t>mMatcher.add("/combo/*/*", COMBO_ALBUM);</a:t>
             </a:r>
             <a:endParaRPr lang="zh-CN" altLang="en-US" sz="2000" dirty="0"/>
           </a:p>
@@ -6649,15 +8122,7 @@
           <a:p>
             <a:r>
               <a:rPr lang="en-US" altLang="zh-CN" sz="2000" dirty="0" smtClean="0"/>
-              <a:t>switch (</a:t>
-            </a:r>
-            <a:r>
-              <a:rPr lang="en-US" altLang="zh-CN" sz="2000" dirty="0" err="1" smtClean="0"/>
-              <a:t>mMatcher.match</a:t>
-            </a:r>
-            <a:r>
-              <a:rPr lang="en-US" altLang="zh-CN" sz="2000" dirty="0" smtClean="0"/>
-              <a:t>(path)) {</a:t>
+              <a:t>switch (mMatcher.match(path)) {</a:t>
             </a:r>
           </a:p>
           <a:p>
@@ -6978,7 +8443,7 @@
 </p:sld>
 </file>
 
-<file path=ppt/slides/slide7.xml><?xml version="1.0" encoding="utf-8"?>
+<file path=ppt/slides/slide9.xml><?xml version="1.0" encoding="utf-8"?>
 <p:sld xmlns:a="http://schemas.openxmlformats.org/drawingml/2006/main" xmlns:r="http://schemas.openxmlformats.org/officeDocument/2006/relationships" xmlns:p="http://schemas.openxmlformats.org/presentationml/2006/main">
   <p:cSld>
     <p:spTree>
@@ -7791,232 +9256,6 @@
           </a:graphicData>
         </a:graphic>
       </p:graphicFrame>
-    </p:spTree>
-  </p:cSld>
-  <p:clrMapOvr>
-    <a:masterClrMapping/>
-  </p:clrMapOvr>
-  <p:timing>
-    <p:tnLst>
-      <p:par>
-        <p:cTn id="1" dur="indefinite" restart="never" nodeType="tmRoot"/>
-      </p:par>
-    </p:tnLst>
-  </p:timing>
-</p:sld>
-</file>
-
-<file path=ppt/slides/slide8.xml><?xml version="1.0" encoding="utf-8"?>
-<p:sld xmlns:a="http://schemas.openxmlformats.org/drawingml/2006/main" xmlns:r="http://schemas.openxmlformats.org/officeDocument/2006/relationships" xmlns:p="http://schemas.openxmlformats.org/presentationml/2006/main">
-  <p:cSld>
-    <p:spTree>
-      <p:nvGrpSpPr>
-        <p:cNvPr id="1" name=""/>
-        <p:cNvGrpSpPr/>
-        <p:nvPr/>
-      </p:nvGrpSpPr>
-      <p:grpSpPr>
-        <a:xfrm>
-          <a:off x="0" y="0"/>
-          <a:ext cx="0" cy="0"/>
-          <a:chOff x="0" y="0"/>
-          <a:chExt cx="0" cy="0"/>
-        </a:xfrm>
-      </p:grpSpPr>
-      <p:sp>
-        <p:nvSpPr>
-          <p:cNvPr id="2" name="标题 1"/>
-          <p:cNvSpPr>
-            <a:spLocks noGrp="1"/>
-          </p:cNvSpPr>
-          <p:nvPr>
-            <p:ph type="title"/>
-          </p:nvPr>
-        </p:nvSpPr>
-        <p:spPr>
-          <a:xfrm>
-            <a:off x="285720" y="642918"/>
-            <a:ext cx="6615130" cy="582594"/>
-          </a:xfrm>
-        </p:spPr>
-        <p:txBody>
-          <a:bodyPr>
-            <a:normAutofit/>
-          </a:bodyPr>
-          <a:lstStyle/>
-          <a:p>
-            <a:pPr algn="l">
-              <a:buFont typeface="Wingdings" pitchFamily="2" charset="2"/>
-              <a:buChar char="l"/>
-            </a:pPr>
-            <a:r>
-              <a:rPr lang="zh-CN" altLang="en-US" sz="2400" dirty="0" smtClean="0"/>
-              <a:t>数据获取</a:t>
-            </a:r>
-            <a:endParaRPr lang="zh-CN" altLang="en-US" sz="2400" dirty="0"/>
-          </a:p>
-        </p:txBody>
-      </p:sp>
-      <p:pic>
-        <p:nvPicPr>
-          <p:cNvPr id="2051" name="Picture 3" descr="D:\我的文档\桌面\Path--MediaObject.jpg"/>
-          <p:cNvPicPr>
-            <a:picLocks noChangeAspect="1" noChangeArrowheads="1"/>
-          </p:cNvPicPr>
-          <p:nvPr/>
-        </p:nvPicPr>
-        <p:blipFill>
-          <a:blip r:embed="rId3"/>
-          <a:srcRect/>
-          <a:stretch>
-            <a:fillRect/>
-          </a:stretch>
-        </p:blipFill>
-        <p:spPr bwMode="auto">
-          <a:xfrm>
-            <a:off x="1214414" y="1214422"/>
-            <a:ext cx="6715172" cy="5006907"/>
-          </a:xfrm>
-          <a:prstGeom prst="rect">
-            <a:avLst/>
-          </a:prstGeom>
-          <a:noFill/>
-        </p:spPr>
-      </p:pic>
-    </p:spTree>
-  </p:cSld>
-  <p:clrMapOvr>
-    <a:masterClrMapping/>
-  </p:clrMapOvr>
-  <p:timing>
-    <p:tnLst>
-      <p:par>
-        <p:cTn id="1" dur="indefinite" restart="never" nodeType="tmRoot"/>
-      </p:par>
-    </p:tnLst>
-  </p:timing>
-</p:sld>
-</file>
-
-<file path=ppt/slides/slide9.xml><?xml version="1.0" encoding="utf-8"?>
-<p:sld xmlns:a="http://schemas.openxmlformats.org/drawingml/2006/main" xmlns:r="http://schemas.openxmlformats.org/officeDocument/2006/relationships" xmlns:p="http://schemas.openxmlformats.org/presentationml/2006/main">
-  <p:cSld>
-    <p:spTree>
-      <p:nvGrpSpPr>
-        <p:cNvPr id="1" name=""/>
-        <p:cNvGrpSpPr/>
-        <p:nvPr/>
-      </p:nvGrpSpPr>
-      <p:grpSpPr>
-        <a:xfrm>
-          <a:off x="0" y="0"/>
-          <a:ext cx="0" cy="0"/>
-          <a:chOff x="0" y="0"/>
-          <a:chExt cx="0" cy="0"/>
-        </a:xfrm>
-      </p:grpSpPr>
-      <p:sp>
-        <p:nvSpPr>
-          <p:cNvPr id="2" name="标题 1"/>
-          <p:cNvSpPr>
-            <a:spLocks noGrp="1"/>
-          </p:cNvSpPr>
-          <p:nvPr>
-            <p:ph type="title"/>
-          </p:nvPr>
-        </p:nvSpPr>
-        <p:spPr>
-          <a:xfrm>
-            <a:off x="285720" y="642918"/>
-            <a:ext cx="6615130" cy="582594"/>
-          </a:xfrm>
-        </p:spPr>
-        <p:txBody>
-          <a:bodyPr>
-            <a:normAutofit/>
-          </a:bodyPr>
-          <a:lstStyle/>
-          <a:p>
-            <a:pPr algn="l">
-              <a:buFont typeface="Wingdings" pitchFamily="2" charset="2"/>
-              <a:buChar char="l"/>
-            </a:pPr>
-            <a:r>
-              <a:rPr lang="zh-CN" altLang="en-US" sz="2400" dirty="0" smtClean="0"/>
-              <a:t>按钮状态改变与选择管理</a:t>
-            </a:r>
-            <a:endParaRPr lang="zh-CN" altLang="en-US" sz="2400" dirty="0"/>
-          </a:p>
-        </p:txBody>
-      </p:sp>
-      <p:pic>
-        <p:nvPicPr>
-          <p:cNvPr id="1026" name="Picture 2"/>
-          <p:cNvPicPr>
-            <a:picLocks noChangeAspect="1" noChangeArrowheads="1"/>
-          </p:cNvPicPr>
-          <p:nvPr/>
-        </p:nvPicPr>
-        <p:blipFill>
-          <a:blip r:embed="rId2"/>
-          <a:srcRect/>
-          <a:stretch>
-            <a:fillRect/>
-          </a:stretch>
-        </p:blipFill>
-        <p:spPr bwMode="auto">
-          <a:xfrm>
-            <a:off x="428596" y="1357299"/>
-            <a:ext cx="8429652" cy="3328951"/>
-          </a:xfrm>
-          <a:prstGeom prst="rect">
-            <a:avLst/>
-          </a:prstGeom>
-          <a:noFill/>
-          <a:ln w="9525">
-            <a:noFill/>
-            <a:miter lim="800000"/>
-            <a:headEnd/>
-            <a:tailEnd/>
-          </a:ln>
-          <a:effectLst/>
-        </p:spPr>
-      </p:pic>
-      <p:sp>
-        <p:nvSpPr>
-          <p:cNvPr id="4" name="TextBox 3"/>
-          <p:cNvSpPr txBox="1"/>
-          <p:nvPr/>
-        </p:nvSpPr>
-        <p:spPr>
-          <a:xfrm>
-            <a:off x="2428860" y="5500701"/>
-            <a:ext cx="4214842" cy="400110"/>
-          </a:xfrm>
-          <a:prstGeom prst="rect">
-            <a:avLst/>
-          </a:prstGeom>
-          <a:noFill/>
-        </p:spPr>
-        <p:txBody>
-          <a:bodyPr wrap="square" rtlCol="0">
-            <a:spAutoFit/>
-          </a:bodyPr>
-          <a:lstStyle/>
-          <a:p>
-            <a:pPr algn="ctr"/>
-            <a:r>
-              <a:rPr lang="en-US" altLang="zh-CN" sz="2000" dirty="0" smtClean="0"/>
-              <a:t>AllItemPage</a:t>
-            </a:r>
-            <a:r>
-              <a:rPr lang="zh-CN" altLang="en-US" sz="2000" dirty="0" smtClean="0"/>
-              <a:t>按钮菜单的初始化过程</a:t>
-            </a:r>
-            <a:endParaRPr lang="zh-CN" altLang="en-US" sz="2000" dirty="0"/>
-          </a:p>
-        </p:txBody>
-      </p:sp>
     </p:spTree>
   </p:cSld>
   <p:clrMapOvr>

</xml_diff>